<commit_message>
adding/refining infor for ppt
</commit_message>
<xml_diff>
--- a/The Omniscient Crypto Oracle.pptx
+++ b/The Omniscient Crypto Oracle.pptx
@@ -9776,12 +9776,54 @@
           </a:p>
         </p:txBody>
       </p:sp>
+      <p:sp>
+        <p:nvSpPr>
+          <p:cNvPr id="11" name="Title 1">
+            <a:extLst>
+              <a:ext uri="{FF2B5EF4-FFF2-40B4-BE49-F238E27FC236}">
+                <a16:creationId xmlns:a16="http://schemas.microsoft.com/office/drawing/2014/main" id="{4AAE4539-EB48-2E6F-9A72-4FD54F0EB71F}"/>
+              </a:ext>
+            </a:extLst>
+          </p:cNvPr>
+          <p:cNvSpPr>
+            <a:spLocks noGrp="1"/>
+          </p:cNvSpPr>
+          <p:nvPr>
+            <p:ph type="title"/>
+          </p:nvPr>
+        </p:nvSpPr>
+        <p:spPr>
+          <a:xfrm>
+            <a:off x="913795" y="96520"/>
+            <a:ext cx="10353762" cy="687070"/>
+          </a:xfrm>
+        </p:spPr>
+        <p:txBody>
+          <a:bodyPr>
+            <a:normAutofit fontScale="90000"/>
+          </a:bodyPr>
+          <a:lstStyle/>
+          <a:p>
+            <a:r>
+              <a:rPr lang="en-US" dirty="0">
+                <a:solidFill>
+                  <a:schemeClr val="bg2">
+                    <a:lumMod val="10000"/>
+                    <a:lumOff val="90000"/>
+                  </a:schemeClr>
+                </a:solidFill>
+              </a:rPr>
+              <a:t>Metric Results</a:t>
+            </a:r>
+          </a:p>
+        </p:txBody>
+      </p:sp>
       <p:graphicFrame>
         <p:nvGraphicFramePr>
-          <p:cNvPr id="9" name="Table 10">
+          <p:cNvPr id="2" name="Table 2">
             <a:extLst>
               <a:ext uri="{FF2B5EF4-FFF2-40B4-BE49-F238E27FC236}">
-                <a16:creationId xmlns:a16="http://schemas.microsoft.com/office/drawing/2014/main" id="{92AE1A0C-0F89-1FD7-5281-7991B653608D}"/>
+                <a16:creationId xmlns:a16="http://schemas.microsoft.com/office/drawing/2014/main" id="{53D23664-1D5A-FBA4-BC48-A28E09DD5B3D}"/>
               </a:ext>
             </a:extLst>
           </p:cNvPr>
@@ -9791,14 +9833,14 @@
           <p:nvPr>
             <p:extLst>
               <p:ext uri="{D42A27DB-BD31-4B8C-83A1-F6EECF244321}">
-                <p14:modId xmlns:p14="http://schemas.microsoft.com/office/powerpoint/2010/main" val="810241295"/>
+                <p14:modId xmlns:p14="http://schemas.microsoft.com/office/powerpoint/2010/main" val="2201376156"/>
               </p:ext>
             </p:extLst>
           </p:nvPr>
         </p:nvGraphicFramePr>
         <p:xfrm>
-          <a:off x="1587991" y="880110"/>
-          <a:ext cx="9362660" cy="5298897"/>
+          <a:off x="264306" y="1135283"/>
+          <a:ext cx="11652740" cy="4966638"/>
         </p:xfrm>
         <a:graphic>
           <a:graphicData uri="http://schemas.openxmlformats.org/drawingml/2006/table">
@@ -9807,42 +9849,190 @@
                 <a:tableStyleId>{5C22544A-7EE6-4342-B048-85BDC9FD1C3A}</a:tableStyleId>
               </a:tblPr>
               <a:tblGrid>
-                <a:gridCol w="2340665">
+                <a:gridCol w="1664676">
                   <a:extLst>
                     <a:ext uri="{9D8B030D-6E8A-4147-A177-3AD203B41FA5}">
-                      <a16:colId xmlns:a16="http://schemas.microsoft.com/office/drawing/2014/main" val="1198423160"/>
+                      <a16:colId xmlns:a16="http://schemas.microsoft.com/office/drawing/2014/main" val="153193842"/>
                     </a:ext>
                   </a:extLst>
                 </a:gridCol>
-                <a:gridCol w="2340665">
+                <a:gridCol w="2602523">
                   <a:extLst>
                     <a:ext uri="{9D8B030D-6E8A-4147-A177-3AD203B41FA5}">
-                      <a16:colId xmlns:a16="http://schemas.microsoft.com/office/drawing/2014/main" val="2986914511"/>
+                      <a16:colId xmlns:a16="http://schemas.microsoft.com/office/drawing/2014/main" val="2945434334"/>
                     </a:ext>
                   </a:extLst>
                 </a:gridCol>
-                <a:gridCol w="2340665">
+                <a:gridCol w="2428956">
                   <a:extLst>
                     <a:ext uri="{9D8B030D-6E8A-4147-A177-3AD203B41FA5}">
-                      <a16:colId xmlns:a16="http://schemas.microsoft.com/office/drawing/2014/main" val="3262790631"/>
+                      <a16:colId xmlns:a16="http://schemas.microsoft.com/office/drawing/2014/main" val="2828018521"/>
                     </a:ext>
                   </a:extLst>
                 </a:gridCol>
-                <a:gridCol w="2340665">
+                <a:gridCol w="2359143">
                   <a:extLst>
                     <a:ext uri="{9D8B030D-6E8A-4147-A177-3AD203B41FA5}">
-                      <a16:colId xmlns:a16="http://schemas.microsoft.com/office/drawing/2014/main" val="1664188810"/>
+                      <a16:colId xmlns:a16="http://schemas.microsoft.com/office/drawing/2014/main" val="3574522233"/>
+                    </a:ext>
+                  </a:extLst>
+                </a:gridCol>
+                <a:gridCol w="2597442">
+                  <a:extLst>
+                    <a:ext uri="{9D8B030D-6E8A-4147-A177-3AD203B41FA5}">
+                      <a16:colId xmlns:a16="http://schemas.microsoft.com/office/drawing/2014/main" val="4042072306"/>
                     </a:ext>
                   </a:extLst>
                 </a:gridCol>
               </a:tblGrid>
-              <a:tr h="448467">
+              <a:tr h="904533">
                 <a:tc>
                   <a:txBody>
                     <a:bodyPr/>
                     <a:lstStyle/>
                     <a:p>
                       <a:pPr algn="ctr"/>
+                      <a:r>
+                        <a:rPr lang="en-US" sz="2200" dirty="0">
+                          <a:solidFill>
+                            <a:schemeClr val="bg1"/>
+                          </a:solidFill>
+                        </a:rPr>
+                        <a:t>Metric/</a:t>
+                      </a:r>
+                    </a:p>
+                    <a:p>
+                      <a:pPr algn="ctr"/>
+                      <a:r>
+                        <a:rPr lang="en-US" sz="2200" dirty="0" err="1">
+                          <a:solidFill>
+                            <a:schemeClr val="bg1"/>
+                          </a:solidFill>
+                        </a:rPr>
+                        <a:t>Cryptocoin</a:t>
+                      </a:r>
+                      <a:endParaRPr lang="en-US" sz="2200" dirty="0">
+                        <a:solidFill>
+                          <a:schemeClr val="bg1"/>
+                        </a:solidFill>
+                      </a:endParaRPr>
+                    </a:p>
+                  </a:txBody>
+                  <a:tcPr/>
+                </a:tc>
+                <a:tc>
+                  <a:txBody>
+                    <a:bodyPr/>
+                    <a:lstStyle/>
+                    <a:p>
+                      <a:r>
+                        <a:rPr lang="en-US" sz="2400" dirty="0">
+                          <a:solidFill>
+                            <a:schemeClr val="bg1"/>
+                          </a:solidFill>
+                        </a:rPr>
+                        <a:t>MSE – Mean Squared Error</a:t>
+                      </a:r>
+                    </a:p>
+                  </a:txBody>
+                  <a:tcPr/>
+                </a:tc>
+                <a:tc>
+                  <a:txBody>
+                    <a:bodyPr/>
+                    <a:lstStyle/>
+                    <a:p>
+                      <a:r>
+                        <a:rPr lang="en-US" sz="2400" dirty="0">
+                          <a:solidFill>
+                            <a:schemeClr val="bg1"/>
+                          </a:solidFill>
+                        </a:rPr>
+                        <a:t>MAE – Mean Absolute Error</a:t>
+                      </a:r>
+                    </a:p>
+                  </a:txBody>
+                  <a:tcPr/>
+                </a:tc>
+                <a:tc>
+                  <a:txBody>
+                    <a:bodyPr/>
+                    <a:lstStyle/>
+                    <a:p>
+                      <a:r>
+                        <a:rPr lang="en-US" sz="2400" dirty="0">
+                          <a:solidFill>
+                            <a:schemeClr val="bg1"/>
+                          </a:solidFill>
+                        </a:rPr>
+                        <a:t>Coefficient of Determination</a:t>
+                      </a:r>
+                    </a:p>
+                  </a:txBody>
+                  <a:tcPr/>
+                </a:tc>
+                <a:tc>
+                  <a:txBody>
+                    <a:bodyPr/>
+                    <a:lstStyle/>
+                    <a:p>
+                      <a:r>
+                        <a:rPr lang="en-US" sz="2400" dirty="0">
+                          <a:solidFill>
+                            <a:schemeClr val="bg1"/>
+                          </a:solidFill>
+                        </a:rPr>
+                        <a:t>RMSE from MSE</a:t>
+                      </a:r>
+                    </a:p>
+                  </a:txBody>
+                  <a:tcPr/>
+                </a:tc>
+                <a:extLst>
+                  <a:ext uri="{0D108BD9-81ED-4DB2-BD59-A6C34878D82A}">
+                    <a16:rowId xmlns:a16="http://schemas.microsoft.com/office/drawing/2014/main" val="1697505377"/>
+                  </a:ext>
+                </a:extLst>
+              </a:tr>
+              <a:tr h="812421">
+                <a:tc>
+                  <a:txBody>
+                    <a:bodyPr/>
+                    <a:lstStyle/>
+                    <a:p>
+                      <a:pPr algn="ctr"/>
+                      <a:r>
+                        <a:rPr lang="en-US" sz="2200" dirty="0">
+                          <a:solidFill>
+                            <a:schemeClr val="bg1"/>
+                          </a:solidFill>
+                        </a:rPr>
+                        <a:t>Bitcoin</a:t>
+                      </a:r>
+                    </a:p>
+                    <a:p>
+                      <a:pPr algn="ctr"/>
+                      <a:r>
+                        <a:rPr lang="en-US" sz="2200" dirty="0">
+                          <a:solidFill>
+                            <a:schemeClr val="bg1"/>
+                          </a:solidFill>
+                        </a:rPr>
+                        <a:t>(BTC)</a:t>
+                      </a:r>
+                    </a:p>
+                  </a:txBody>
+                  <a:tcPr/>
+                </a:tc>
+                <a:tc>
+                  <a:txBody>
+                    <a:bodyPr/>
+                    <a:lstStyle/>
+                    <a:p>
+                      <a:r>
+                        <a:rPr lang="en-US" dirty="0"/>
+                        <a:t>0.0033186599612236023</a:t>
+                      </a:r>
                       <a:endParaRPr lang="en-US" dirty="0">
                         <a:solidFill>
                           <a:schemeClr val="bg1"/>
@@ -9857,7 +10047,10 @@
                     <a:bodyPr/>
                     <a:lstStyle/>
                     <a:p>
-                      <a:pPr algn="ctr"/>
+                      <a:r>
+                        <a:rPr lang="en-US" dirty="0"/>
+                        <a:t>0.04206134844135157</a:t>
+                      </a:r>
                       <a:endParaRPr lang="en-US" dirty="0">
                         <a:solidFill>
                           <a:schemeClr val="bg1"/>
@@ -9872,7 +10065,10 @@
                     <a:bodyPr/>
                     <a:lstStyle/>
                     <a:p>
-                      <a:pPr algn="ctr"/>
+                      <a:r>
+                        <a:rPr lang="en-US" dirty="0"/>
+                        <a:t>0.9307371227625145</a:t>
+                      </a:r>
                       <a:endParaRPr lang="en-US" dirty="0">
                         <a:solidFill>
                           <a:schemeClr val="bg1"/>
@@ -9887,7 +10083,10 @@
                     <a:bodyPr/>
                     <a:lstStyle/>
                     <a:p>
-                      <a:pPr algn="ctr"/>
+                      <a:r>
+                        <a:rPr lang="en-US" dirty="0"/>
+                        <a:t>0.057607811633697756</a:t>
+                      </a:r>
                       <a:endParaRPr lang="en-US" dirty="0">
                         <a:solidFill>
                           <a:schemeClr val="bg1"/>
@@ -9899,17 +10098,45 @@
                 </a:tc>
                 <a:extLst>
                   <a:ext uri="{0D108BD9-81ED-4DB2-BD59-A6C34878D82A}">
-                    <a16:rowId xmlns:a16="http://schemas.microsoft.com/office/drawing/2014/main" val="2009616362"/>
+                    <a16:rowId xmlns:a16="http://schemas.microsoft.com/office/drawing/2014/main" val="2418841996"/>
                   </a:ext>
                 </a:extLst>
               </a:tr>
-              <a:tr h="448467">
+              <a:tr h="812421">
                 <a:tc>
                   <a:txBody>
                     <a:bodyPr/>
                     <a:lstStyle/>
                     <a:p>
                       <a:pPr algn="ctr"/>
+                      <a:r>
+                        <a:rPr lang="en-US" sz="2200" dirty="0">
+                          <a:solidFill>
+                            <a:schemeClr val="bg1"/>
+                          </a:solidFill>
+                        </a:rPr>
+                        <a:t>Dogecoin</a:t>
+                      </a:r>
+                    </a:p>
+                    <a:p>
+                      <a:pPr algn="ctr"/>
+                      <a:r>
+                        <a:rPr lang="en-US" sz="2200" dirty="0">
+                          <a:solidFill>
+                            <a:schemeClr val="bg1"/>
+                          </a:solidFill>
+                        </a:rPr>
+                        <a:t>(Doge)</a:t>
+                      </a:r>
+                    </a:p>
+                  </a:txBody>
+                  <a:tcPr/>
+                </a:tc>
+                <a:tc>
+                  <a:txBody>
+                    <a:bodyPr/>
+                    <a:lstStyle/>
+                    <a:p>
                       <a:endParaRPr lang="en-US" dirty="0">
                         <a:solidFill>
                           <a:schemeClr val="bg1"/>
@@ -9924,7 +10151,6 @@
                     <a:bodyPr/>
                     <a:lstStyle/>
                     <a:p>
-                      <a:pPr algn="ctr"/>
                       <a:endParaRPr lang="en-US" dirty="0">
                         <a:solidFill>
                           <a:schemeClr val="bg1"/>
@@ -9939,7 +10165,84 @@
                     <a:bodyPr/>
                     <a:lstStyle/>
                     <a:p>
+                      <a:endParaRPr lang="en-US">
+                        <a:solidFill>
+                          <a:schemeClr val="bg1"/>
+                        </a:solidFill>
+                      </a:endParaRPr>
+                    </a:p>
+                  </a:txBody>
+                  <a:tcPr/>
+                </a:tc>
+                <a:tc>
+                  <a:txBody>
+                    <a:bodyPr/>
+                    <a:lstStyle/>
+                    <a:p>
+                      <a:endParaRPr lang="en-US" dirty="0">
+                        <a:solidFill>
+                          <a:schemeClr val="bg1"/>
+                        </a:solidFill>
+                      </a:endParaRPr>
+                    </a:p>
+                  </a:txBody>
+                  <a:tcPr/>
+                </a:tc>
+                <a:extLst>
+                  <a:ext uri="{0D108BD9-81ED-4DB2-BD59-A6C34878D82A}">
+                    <a16:rowId xmlns:a16="http://schemas.microsoft.com/office/drawing/2014/main" val="66660427"/>
+                  </a:ext>
+                </a:extLst>
+              </a:tr>
+              <a:tr h="812421">
+                <a:tc>
+                  <a:txBody>
+                    <a:bodyPr/>
+                    <a:lstStyle/>
+                    <a:p>
                       <a:pPr algn="ctr"/>
+                      <a:r>
+                        <a:rPr lang="en-US" sz="2200" dirty="0">
+                          <a:solidFill>
+                            <a:schemeClr val="bg1"/>
+                          </a:solidFill>
+                        </a:rPr>
+                        <a:t>Ethereum</a:t>
+                      </a:r>
+                    </a:p>
+                    <a:p>
+                      <a:pPr algn="ctr"/>
+                      <a:r>
+                        <a:rPr lang="en-US" sz="2200" dirty="0">
+                          <a:solidFill>
+                            <a:schemeClr val="bg1"/>
+                          </a:solidFill>
+                        </a:rPr>
+                        <a:t>(ETH)</a:t>
+                      </a:r>
+                    </a:p>
+                  </a:txBody>
+                  <a:tcPr/>
+                </a:tc>
+                <a:tc>
+                  <a:txBody>
+                    <a:bodyPr/>
+                    <a:lstStyle/>
+                    <a:p>
+                      <a:endParaRPr lang="en-US">
+                        <a:solidFill>
+                          <a:schemeClr val="bg1"/>
+                        </a:solidFill>
+                      </a:endParaRPr>
+                    </a:p>
+                  </a:txBody>
+                  <a:tcPr/>
+                </a:tc>
+                <a:tc>
+                  <a:txBody>
+                    <a:bodyPr/>
+                    <a:lstStyle/>
+                    <a:p>
                       <a:endParaRPr lang="en-US" dirty="0">
                         <a:solidFill>
                           <a:schemeClr val="bg1"/>
@@ -9954,7 +10257,20 @@
                     <a:bodyPr/>
                     <a:lstStyle/>
                     <a:p>
-                      <a:pPr algn="ctr"/>
+                      <a:endParaRPr lang="en-US">
+                        <a:solidFill>
+                          <a:schemeClr val="bg1"/>
+                        </a:solidFill>
+                      </a:endParaRPr>
+                    </a:p>
+                  </a:txBody>
+                  <a:tcPr/>
+                </a:tc>
+                <a:tc>
+                  <a:txBody>
+                    <a:bodyPr/>
+                    <a:lstStyle/>
+                    <a:p>
                       <a:endParaRPr lang="en-US" dirty="0">
                         <a:solidFill>
                           <a:schemeClr val="bg1"/>
@@ -9966,17 +10282,45 @@
                 </a:tc>
                 <a:extLst>
                   <a:ext uri="{0D108BD9-81ED-4DB2-BD59-A6C34878D82A}">
-                    <a16:rowId xmlns:a16="http://schemas.microsoft.com/office/drawing/2014/main" val="3416111183"/>
+                    <a16:rowId xmlns:a16="http://schemas.microsoft.com/office/drawing/2014/main" val="278246535"/>
                   </a:ext>
                 </a:extLst>
               </a:tr>
-              <a:tr h="179395">
+              <a:tr h="812421">
                 <a:tc>
                   <a:txBody>
                     <a:bodyPr/>
                     <a:lstStyle/>
                     <a:p>
                       <a:pPr algn="ctr"/>
+                      <a:r>
+                        <a:rPr lang="en-US" sz="2200" dirty="0">
+                          <a:solidFill>
+                            <a:schemeClr val="bg1"/>
+                          </a:solidFill>
+                        </a:rPr>
+                        <a:t>Litecoin</a:t>
+                      </a:r>
+                    </a:p>
+                    <a:p>
+                      <a:pPr algn="ctr"/>
+                      <a:r>
+                        <a:rPr lang="en-US" sz="2200" dirty="0">
+                          <a:solidFill>
+                            <a:schemeClr val="bg1"/>
+                          </a:solidFill>
+                        </a:rPr>
+                        <a:t>(LTC)</a:t>
+                      </a:r>
+                    </a:p>
+                  </a:txBody>
+                  <a:tcPr/>
+                </a:tc>
+                <a:tc>
+                  <a:txBody>
+                    <a:bodyPr/>
+                    <a:lstStyle/>
+                    <a:p>
                       <a:endParaRPr lang="en-US" dirty="0">
                         <a:solidFill>
                           <a:schemeClr val="bg1"/>
@@ -9991,23 +10335,6 @@
                     <a:bodyPr/>
                     <a:lstStyle/>
                     <a:p>
-                      <a:pPr marL="0" marR="0" lvl="0" indent="0" algn="ctr" defTabSz="457200" rtl="0" eaLnBrk="1" fontAlgn="auto" latinLnBrk="0" hangingPunct="1">
-                        <a:lnSpc>
-                          <a:spcPct val="100000"/>
-                        </a:lnSpc>
-                        <a:spcBef>
-                          <a:spcPts val="0"/>
-                        </a:spcBef>
-                        <a:spcAft>
-                          <a:spcPts val="0"/>
-                        </a:spcAft>
-                        <a:buClrTx/>
-                        <a:buSzTx/>
-                        <a:buFontTx/>
-                        <a:buNone/>
-                        <a:tabLst/>
-                        <a:defRPr/>
-                      </a:pPr>
                       <a:endParaRPr lang="en-US" dirty="0">
                         <a:solidFill>
                           <a:schemeClr val="bg1"/>
@@ -10022,312 +10349,6 @@
                     <a:bodyPr/>
                     <a:lstStyle/>
                     <a:p>
-                      <a:pPr algn="ctr"/>
-                      <a:endParaRPr lang="en-US" dirty="0">
-                        <a:solidFill>
-                          <a:schemeClr val="bg1"/>
-                        </a:solidFill>
-                      </a:endParaRPr>
-                    </a:p>
-                  </a:txBody>
-                  <a:tcPr/>
-                </a:tc>
-                <a:tc>
-                  <a:txBody>
-                    <a:bodyPr/>
-                    <a:lstStyle/>
-                    <a:p>
-                      <a:pPr algn="ctr"/>
-                      <a:endParaRPr lang="en-US" dirty="0">
-                        <a:solidFill>
-                          <a:schemeClr val="bg1"/>
-                        </a:solidFill>
-                      </a:endParaRPr>
-                    </a:p>
-                  </a:txBody>
-                  <a:tcPr/>
-                </a:tc>
-                <a:extLst>
-                  <a:ext uri="{0D108BD9-81ED-4DB2-BD59-A6C34878D82A}">
-                    <a16:rowId xmlns:a16="http://schemas.microsoft.com/office/drawing/2014/main" val="2424280642"/>
-                  </a:ext>
-                </a:extLst>
-              </a:tr>
-              <a:tr h="448467">
-                <a:tc>
-                  <a:txBody>
-                    <a:bodyPr/>
-                    <a:lstStyle/>
-                    <a:p>
-                      <a:pPr algn="ctr"/>
-                      <a:endParaRPr lang="en-US" dirty="0">
-                        <a:solidFill>
-                          <a:schemeClr val="bg1"/>
-                        </a:solidFill>
-                      </a:endParaRPr>
-                    </a:p>
-                  </a:txBody>
-                  <a:tcPr/>
-                </a:tc>
-                <a:tc>
-                  <a:txBody>
-                    <a:bodyPr/>
-                    <a:lstStyle/>
-                    <a:p>
-                      <a:pPr algn="ctr"/>
-                      <a:endParaRPr lang="en-US" dirty="0">
-                        <a:solidFill>
-                          <a:schemeClr val="bg1"/>
-                        </a:solidFill>
-                      </a:endParaRPr>
-                    </a:p>
-                  </a:txBody>
-                  <a:tcPr/>
-                </a:tc>
-                <a:tc>
-                  <a:txBody>
-                    <a:bodyPr/>
-                    <a:lstStyle/>
-                    <a:p>
-                      <a:pPr algn="ctr"/>
-                      <a:endParaRPr lang="en-US" dirty="0">
-                        <a:solidFill>
-                          <a:schemeClr val="bg1"/>
-                        </a:solidFill>
-                      </a:endParaRPr>
-                    </a:p>
-                  </a:txBody>
-                  <a:tcPr/>
-                </a:tc>
-                <a:tc>
-                  <a:txBody>
-                    <a:bodyPr/>
-                    <a:lstStyle/>
-                    <a:p>
-                      <a:pPr algn="ctr"/>
-                      <a:endParaRPr lang="en-US" dirty="0">
-                        <a:solidFill>
-                          <a:schemeClr val="bg1"/>
-                        </a:solidFill>
-                      </a:endParaRPr>
-                    </a:p>
-                  </a:txBody>
-                  <a:tcPr/>
-                </a:tc>
-                <a:extLst>
-                  <a:ext uri="{0D108BD9-81ED-4DB2-BD59-A6C34878D82A}">
-                    <a16:rowId xmlns:a16="http://schemas.microsoft.com/office/drawing/2014/main" val="3628490987"/>
-                  </a:ext>
-                </a:extLst>
-              </a:tr>
-              <a:tr h="448467">
-                <a:tc>
-                  <a:txBody>
-                    <a:bodyPr/>
-                    <a:lstStyle/>
-                    <a:p>
-                      <a:pPr algn="ctr"/>
-                      <a:endParaRPr lang="en-US" dirty="0">
-                        <a:solidFill>
-                          <a:schemeClr val="bg1"/>
-                        </a:solidFill>
-                      </a:endParaRPr>
-                    </a:p>
-                  </a:txBody>
-                  <a:tcPr/>
-                </a:tc>
-                <a:tc>
-                  <a:txBody>
-                    <a:bodyPr/>
-                    <a:lstStyle/>
-                    <a:p>
-                      <a:pPr algn="ctr"/>
-                      <a:endParaRPr lang="en-US" dirty="0">
-                        <a:solidFill>
-                          <a:schemeClr val="bg1"/>
-                        </a:solidFill>
-                      </a:endParaRPr>
-                    </a:p>
-                  </a:txBody>
-                  <a:tcPr/>
-                </a:tc>
-                <a:tc>
-                  <a:txBody>
-                    <a:bodyPr/>
-                    <a:lstStyle/>
-                    <a:p>
-                      <a:pPr algn="ctr"/>
-                      <a:endParaRPr lang="en-US" dirty="0">
-                        <a:solidFill>
-                          <a:schemeClr val="bg1"/>
-                        </a:solidFill>
-                      </a:endParaRPr>
-                    </a:p>
-                  </a:txBody>
-                  <a:tcPr/>
-                </a:tc>
-                <a:tc>
-                  <a:txBody>
-                    <a:bodyPr/>
-                    <a:lstStyle/>
-                    <a:p>
-                      <a:pPr algn="ctr"/>
-                      <a:endParaRPr lang="en-US" dirty="0">
-                        <a:solidFill>
-                          <a:schemeClr val="bg1"/>
-                        </a:solidFill>
-                      </a:endParaRPr>
-                    </a:p>
-                  </a:txBody>
-                  <a:tcPr/>
-                </a:tc>
-                <a:extLst>
-                  <a:ext uri="{0D108BD9-81ED-4DB2-BD59-A6C34878D82A}">
-                    <a16:rowId xmlns:a16="http://schemas.microsoft.com/office/drawing/2014/main" val="869746675"/>
-                  </a:ext>
-                </a:extLst>
-              </a:tr>
-              <a:tr h="448467">
-                <a:tc>
-                  <a:txBody>
-                    <a:bodyPr/>
-                    <a:lstStyle/>
-                    <a:p>
-                      <a:pPr algn="ctr"/>
-                      <a:endParaRPr lang="en-US" dirty="0">
-                        <a:solidFill>
-                          <a:schemeClr val="bg1"/>
-                        </a:solidFill>
-                      </a:endParaRPr>
-                    </a:p>
-                  </a:txBody>
-                  <a:tcPr/>
-                </a:tc>
-                <a:tc>
-                  <a:txBody>
-                    <a:bodyPr/>
-                    <a:lstStyle/>
-                    <a:p>
-                      <a:pPr algn="ctr"/>
-                      <a:endParaRPr lang="en-US" dirty="0">
-                        <a:solidFill>
-                          <a:schemeClr val="bg1"/>
-                        </a:solidFill>
-                      </a:endParaRPr>
-                    </a:p>
-                  </a:txBody>
-                  <a:tcPr/>
-                </a:tc>
-                <a:tc>
-                  <a:txBody>
-                    <a:bodyPr/>
-                    <a:lstStyle/>
-                    <a:p>
-                      <a:pPr algn="ctr"/>
-                      <a:endParaRPr lang="en-US" dirty="0">
-                        <a:solidFill>
-                          <a:schemeClr val="bg1"/>
-                        </a:solidFill>
-                      </a:endParaRPr>
-                    </a:p>
-                  </a:txBody>
-                  <a:tcPr/>
-                </a:tc>
-                <a:tc>
-                  <a:txBody>
-                    <a:bodyPr/>
-                    <a:lstStyle/>
-                    <a:p>
-                      <a:pPr algn="ctr"/>
-                      <a:endParaRPr lang="en-US" dirty="0">
-                        <a:solidFill>
-                          <a:schemeClr val="bg1"/>
-                        </a:solidFill>
-                      </a:endParaRPr>
-                    </a:p>
-                  </a:txBody>
-                  <a:tcPr/>
-                </a:tc>
-                <a:extLst>
-                  <a:ext uri="{0D108BD9-81ED-4DB2-BD59-A6C34878D82A}">
-                    <a16:rowId xmlns:a16="http://schemas.microsoft.com/office/drawing/2014/main" val="1891970372"/>
-                  </a:ext>
-                </a:extLst>
-              </a:tr>
-              <a:tr h="448467">
-                <a:tc>
-                  <a:txBody>
-                    <a:bodyPr/>
-                    <a:lstStyle/>
-                    <a:p>
-                      <a:pPr algn="ctr"/>
-                      <a:endParaRPr lang="en-US" dirty="0">
-                        <a:solidFill>
-                          <a:schemeClr val="bg1"/>
-                        </a:solidFill>
-                      </a:endParaRPr>
-                    </a:p>
-                  </a:txBody>
-                  <a:tcPr/>
-                </a:tc>
-                <a:tc>
-                  <a:txBody>
-                    <a:bodyPr/>
-                    <a:lstStyle/>
-                    <a:p>
-                      <a:pPr algn="ctr"/>
-                      <a:endParaRPr lang="en-US" dirty="0">
-                        <a:solidFill>
-                          <a:schemeClr val="bg1"/>
-                        </a:solidFill>
-                      </a:endParaRPr>
-                    </a:p>
-                  </a:txBody>
-                  <a:tcPr/>
-                </a:tc>
-                <a:tc>
-                  <a:txBody>
-                    <a:bodyPr/>
-                    <a:lstStyle/>
-                    <a:p>
-                      <a:pPr algn="ctr"/>
-                      <a:endParaRPr lang="en-US" dirty="0">
-                        <a:solidFill>
-                          <a:schemeClr val="bg1"/>
-                        </a:solidFill>
-                      </a:endParaRPr>
-                    </a:p>
-                  </a:txBody>
-                  <a:tcPr/>
-                </a:tc>
-                <a:tc>
-                  <a:txBody>
-                    <a:bodyPr/>
-                    <a:lstStyle/>
-                    <a:p>
-                      <a:pPr algn="ctr"/>
-                      <a:endParaRPr lang="en-US" dirty="0">
-                        <a:solidFill>
-                          <a:schemeClr val="bg1"/>
-                        </a:solidFill>
-                      </a:endParaRPr>
-                    </a:p>
-                  </a:txBody>
-                  <a:tcPr/>
-                </a:tc>
-                <a:extLst>
-                  <a:ext uri="{0D108BD9-81ED-4DB2-BD59-A6C34878D82A}">
-                    <a16:rowId xmlns:a16="http://schemas.microsoft.com/office/drawing/2014/main" val="1002181391"/>
-                  </a:ext>
-                </a:extLst>
-              </a:tr>
-              <a:tr h="448467">
-                <a:tc>
-                  <a:txBody>
-                    <a:bodyPr/>
-                    <a:lstStyle/>
-                    <a:p>
-                      <a:pPr algn="ctr"/>
                       <a:endParaRPr lang="en-US">
                         <a:solidFill>
                           <a:schemeClr val="bg1"/>
@@ -10342,7 +10363,56 @@
                     <a:bodyPr/>
                     <a:lstStyle/>
                     <a:p>
+                      <a:endParaRPr lang="en-US">
+                        <a:solidFill>
+                          <a:schemeClr val="bg1"/>
+                        </a:solidFill>
+                      </a:endParaRPr>
+                    </a:p>
+                  </a:txBody>
+                  <a:tcPr/>
+                </a:tc>
+                <a:extLst>
+                  <a:ext uri="{0D108BD9-81ED-4DB2-BD59-A6C34878D82A}">
+                    <a16:rowId xmlns:a16="http://schemas.microsoft.com/office/drawing/2014/main" val="1855517686"/>
+                  </a:ext>
+                </a:extLst>
+              </a:tr>
+              <a:tr h="812421">
+                <a:tc>
+                  <a:txBody>
+                    <a:bodyPr/>
+                    <a:lstStyle/>
+                    <a:p>
                       <a:pPr algn="ctr"/>
+                      <a:r>
+                        <a:rPr lang="en-US" sz="2200" dirty="0">
+                          <a:solidFill>
+                            <a:schemeClr val="bg1"/>
+                          </a:solidFill>
+                        </a:rPr>
+                        <a:t>Ripple</a:t>
+                      </a:r>
+                    </a:p>
+                    <a:p>
+                      <a:pPr algn="ctr"/>
+                      <a:r>
+                        <a:rPr lang="en-US" sz="2200" dirty="0">
+                          <a:solidFill>
+                            <a:schemeClr val="bg1"/>
+                          </a:solidFill>
+                        </a:rPr>
+                        <a:t>(XRP)</a:t>
+                      </a:r>
+                    </a:p>
+                  </a:txBody>
+                  <a:tcPr/>
+                </a:tc>
+                <a:tc>
+                  <a:txBody>
+                    <a:bodyPr/>
+                    <a:lstStyle/>
+                    <a:p>
                       <a:endParaRPr lang="en-US">
                         <a:solidFill>
                           <a:schemeClr val="bg1"/>
@@ -10357,60 +10427,6 @@
                     <a:bodyPr/>
                     <a:lstStyle/>
                     <a:p>
-                      <a:pPr marL="0" marR="0" lvl="0" indent="0" algn="ctr" defTabSz="457200" rtl="0" eaLnBrk="1" fontAlgn="auto" latinLnBrk="0" hangingPunct="1">
-                        <a:lnSpc>
-                          <a:spcPct val="100000"/>
-                        </a:lnSpc>
-                        <a:spcBef>
-                          <a:spcPts val="0"/>
-                        </a:spcBef>
-                        <a:spcAft>
-                          <a:spcPts val="0"/>
-                        </a:spcAft>
-                        <a:buClrTx/>
-                        <a:buSzTx/>
-                        <a:buFontTx/>
-                        <a:buNone/>
-                        <a:tabLst/>
-                        <a:defRPr/>
-                      </a:pPr>
-                      <a:endParaRPr lang="en-US" dirty="0">
-                        <a:solidFill>
-                          <a:schemeClr val="bg1"/>
-                        </a:solidFill>
-                      </a:endParaRPr>
-                    </a:p>
-                  </a:txBody>
-                  <a:tcPr/>
-                </a:tc>
-                <a:tc>
-                  <a:txBody>
-                    <a:bodyPr/>
-                    <a:lstStyle/>
-                    <a:p>
-                      <a:pPr algn="ctr"/>
-                      <a:endParaRPr lang="en-US" dirty="0">
-                        <a:solidFill>
-                          <a:schemeClr val="bg1"/>
-                        </a:solidFill>
-                      </a:endParaRPr>
-                    </a:p>
-                  </a:txBody>
-                  <a:tcPr/>
-                </a:tc>
-                <a:extLst>
-                  <a:ext uri="{0D108BD9-81ED-4DB2-BD59-A6C34878D82A}">
-                    <a16:rowId xmlns:a16="http://schemas.microsoft.com/office/drawing/2014/main" val="1345442870"/>
-                  </a:ext>
-                </a:extLst>
-              </a:tr>
-              <a:tr h="448467">
-                <a:tc>
-                  <a:txBody>
-                    <a:bodyPr/>
-                    <a:lstStyle/>
-                    <a:p>
-                      <a:pPr algn="ctr"/>
                       <a:endParaRPr lang="en-US">
                         <a:solidFill>
                           <a:schemeClr val="bg1"/>
@@ -10425,7 +10441,6 @@
                     <a:bodyPr/>
                     <a:lstStyle/>
                     <a:p>
-                      <a:pPr algn="ctr"/>
                       <a:endParaRPr lang="en-US">
                         <a:solidFill>
                           <a:schemeClr val="bg1"/>
@@ -10440,38 +10455,6 @@
                     <a:bodyPr/>
                     <a:lstStyle/>
                     <a:p>
-                      <a:pPr marL="0" marR="0" lvl="0" indent="0" algn="ctr" defTabSz="457200" rtl="0" eaLnBrk="1" fontAlgn="auto" latinLnBrk="0" hangingPunct="1">
-                        <a:lnSpc>
-                          <a:spcPct val="100000"/>
-                        </a:lnSpc>
-                        <a:spcBef>
-                          <a:spcPts val="0"/>
-                        </a:spcBef>
-                        <a:spcAft>
-                          <a:spcPts val="0"/>
-                        </a:spcAft>
-                        <a:buClrTx/>
-                        <a:buSzTx/>
-                        <a:buFontTx/>
-                        <a:buNone/>
-                        <a:tabLst/>
-                        <a:defRPr/>
-                      </a:pPr>
-                      <a:endParaRPr lang="en-US" dirty="0">
-                        <a:solidFill>
-                          <a:schemeClr val="bg1"/>
-                        </a:solidFill>
-                      </a:endParaRPr>
-                    </a:p>
-                  </a:txBody>
-                  <a:tcPr/>
-                </a:tc>
-                <a:tc>
-                  <a:txBody>
-                    <a:bodyPr/>
-                    <a:lstStyle/>
-                    <a:p>
-                      <a:pPr algn="ctr"/>
                       <a:endParaRPr lang="en-US" dirty="0">
                         <a:solidFill>
                           <a:schemeClr val="bg1"/>
@@ -10483,256 +10466,7 @@
                 </a:tc>
                 <a:extLst>
                   <a:ext uri="{0D108BD9-81ED-4DB2-BD59-A6C34878D82A}">
-                    <a16:rowId xmlns:a16="http://schemas.microsoft.com/office/drawing/2014/main" val="3279897707"/>
-                  </a:ext>
-                </a:extLst>
-              </a:tr>
-              <a:tr h="448467">
-                <a:tc>
-                  <a:txBody>
-                    <a:bodyPr/>
-                    <a:lstStyle/>
-                    <a:p>
-                      <a:pPr algn="ctr"/>
-                      <a:endParaRPr lang="en-US">
-                        <a:solidFill>
-                          <a:schemeClr val="bg1"/>
-                        </a:solidFill>
-                      </a:endParaRPr>
-                    </a:p>
-                  </a:txBody>
-                  <a:tcPr/>
-                </a:tc>
-                <a:tc>
-                  <a:txBody>
-                    <a:bodyPr/>
-                    <a:lstStyle/>
-                    <a:p>
-                      <a:pPr algn="ctr"/>
-                      <a:endParaRPr lang="en-US">
-                        <a:solidFill>
-                          <a:schemeClr val="bg1"/>
-                        </a:solidFill>
-                      </a:endParaRPr>
-                    </a:p>
-                  </a:txBody>
-                  <a:tcPr/>
-                </a:tc>
-                <a:tc>
-                  <a:txBody>
-                    <a:bodyPr/>
-                    <a:lstStyle/>
-                    <a:p>
-                      <a:pPr marL="0" marR="0" lvl="0" indent="0" algn="ctr" defTabSz="457200" rtl="0" eaLnBrk="1" fontAlgn="auto" latinLnBrk="0" hangingPunct="1">
-                        <a:lnSpc>
-                          <a:spcPct val="100000"/>
-                        </a:lnSpc>
-                        <a:spcBef>
-                          <a:spcPts val="0"/>
-                        </a:spcBef>
-                        <a:spcAft>
-                          <a:spcPts val="0"/>
-                        </a:spcAft>
-                        <a:buClrTx/>
-                        <a:buSzTx/>
-                        <a:buFontTx/>
-                        <a:buNone/>
-                        <a:tabLst/>
-                        <a:defRPr/>
-                      </a:pPr>
-                      <a:endParaRPr lang="en-US" dirty="0">
-                        <a:solidFill>
-                          <a:schemeClr val="bg1"/>
-                        </a:solidFill>
-                      </a:endParaRPr>
-                    </a:p>
-                  </a:txBody>
-                  <a:tcPr/>
-                </a:tc>
-                <a:tc>
-                  <a:txBody>
-                    <a:bodyPr/>
-                    <a:lstStyle/>
-                    <a:p>
-                      <a:pPr algn="ctr"/>
-                      <a:endParaRPr lang="en-US" dirty="0">
-                        <a:solidFill>
-                          <a:schemeClr val="bg1"/>
-                        </a:solidFill>
-                      </a:endParaRPr>
-                    </a:p>
-                  </a:txBody>
-                  <a:tcPr/>
-                </a:tc>
-                <a:extLst>
-                  <a:ext uri="{0D108BD9-81ED-4DB2-BD59-A6C34878D82A}">
-                    <a16:rowId xmlns:a16="http://schemas.microsoft.com/office/drawing/2014/main" val="2830118390"/>
-                  </a:ext>
-                </a:extLst>
-              </a:tr>
-              <a:tr h="448467">
-                <a:tc>
-                  <a:txBody>
-                    <a:bodyPr/>
-                    <a:lstStyle/>
-                    <a:p>
-                      <a:pPr algn="ctr"/>
-                      <a:endParaRPr lang="en-US">
-                        <a:solidFill>
-                          <a:schemeClr val="bg1"/>
-                        </a:solidFill>
-                      </a:endParaRPr>
-                    </a:p>
-                  </a:txBody>
-                  <a:tcPr/>
-                </a:tc>
-                <a:tc>
-                  <a:txBody>
-                    <a:bodyPr/>
-                    <a:lstStyle/>
-                    <a:p>
-                      <a:pPr algn="ctr"/>
-                      <a:endParaRPr lang="en-US">
-                        <a:solidFill>
-                          <a:schemeClr val="bg1"/>
-                        </a:solidFill>
-                      </a:endParaRPr>
-                    </a:p>
-                  </a:txBody>
-                  <a:tcPr/>
-                </a:tc>
-                <a:tc>
-                  <a:txBody>
-                    <a:bodyPr/>
-                    <a:lstStyle/>
-                    <a:p>
-                      <a:pPr marL="0" marR="0" lvl="0" indent="0" algn="ctr" defTabSz="457200" rtl="0" eaLnBrk="1" fontAlgn="auto" latinLnBrk="0" hangingPunct="1">
-                        <a:lnSpc>
-                          <a:spcPct val="100000"/>
-                        </a:lnSpc>
-                        <a:spcBef>
-                          <a:spcPts val="0"/>
-                        </a:spcBef>
-                        <a:spcAft>
-                          <a:spcPts val="0"/>
-                        </a:spcAft>
-                        <a:buClrTx/>
-                        <a:buSzTx/>
-                        <a:buFontTx/>
-                        <a:buNone/>
-                        <a:tabLst/>
-                        <a:defRPr/>
-                      </a:pPr>
-                      <a:endParaRPr lang="en-US" dirty="0">
-                        <a:solidFill>
-                          <a:schemeClr val="bg1"/>
-                        </a:solidFill>
-                      </a:endParaRPr>
-                    </a:p>
-                  </a:txBody>
-                  <a:tcPr/>
-                </a:tc>
-                <a:tc>
-                  <a:txBody>
-                    <a:bodyPr/>
-                    <a:lstStyle/>
-                    <a:p>
-                      <a:pPr algn="ctr"/>
-                      <a:endParaRPr lang="en-US" dirty="0">
-                        <a:solidFill>
-                          <a:schemeClr val="bg1"/>
-                        </a:solidFill>
-                      </a:endParaRPr>
-                    </a:p>
-                  </a:txBody>
-                  <a:tcPr/>
-                </a:tc>
-                <a:extLst>
-                  <a:ext uri="{0D108BD9-81ED-4DB2-BD59-A6C34878D82A}">
-                    <a16:rowId xmlns:a16="http://schemas.microsoft.com/office/drawing/2014/main" val="2535821609"/>
-                  </a:ext>
-                </a:extLst>
-              </a:tr>
-              <a:tr h="448467">
-                <a:tc>
-                  <a:txBody>
-                    <a:bodyPr/>
-                    <a:lstStyle/>
-                    <a:p>
-                      <a:pPr algn="ctr"/>
-                      <a:endParaRPr lang="en-US">
-                        <a:solidFill>
-                          <a:schemeClr val="bg1"/>
-                        </a:solidFill>
-                      </a:endParaRPr>
-                    </a:p>
-                  </a:txBody>
-                  <a:tcPr/>
-                </a:tc>
-                <a:tc>
-                  <a:txBody>
-                    <a:bodyPr/>
-                    <a:lstStyle/>
-                    <a:p>
-                      <a:pPr algn="ctr"/>
-                      <a:endParaRPr lang="en-US">
-                        <a:solidFill>
-                          <a:schemeClr val="bg1"/>
-                        </a:solidFill>
-                      </a:endParaRPr>
-                    </a:p>
-                  </a:txBody>
-                  <a:tcPr/>
-                </a:tc>
-                <a:tc>
-                  <a:txBody>
-                    <a:bodyPr/>
-                    <a:lstStyle/>
-                    <a:p>
-                      <a:pPr marL="0" marR="0" lvl="0" indent="0" algn="ctr" defTabSz="457200" rtl="0" eaLnBrk="1" fontAlgn="auto" latinLnBrk="0" hangingPunct="1">
-                        <a:lnSpc>
-                          <a:spcPct val="100000"/>
-                        </a:lnSpc>
-                        <a:spcBef>
-                          <a:spcPts val="0"/>
-                        </a:spcBef>
-                        <a:spcAft>
-                          <a:spcPts val="0"/>
-                        </a:spcAft>
-                        <a:buClrTx/>
-                        <a:buSzTx/>
-                        <a:buFontTx/>
-                        <a:buNone/>
-                        <a:tabLst/>
-                        <a:defRPr/>
-                      </a:pPr>
-                      <a:endParaRPr lang="en-US" dirty="0">
-                        <a:solidFill>
-                          <a:schemeClr val="bg1"/>
-                        </a:solidFill>
-                      </a:endParaRPr>
-                    </a:p>
-                  </a:txBody>
-                  <a:tcPr/>
-                </a:tc>
-                <a:tc>
-                  <a:txBody>
-                    <a:bodyPr/>
-                    <a:lstStyle/>
-                    <a:p>
-                      <a:pPr algn="ctr"/>
-                      <a:endParaRPr lang="en-US" dirty="0">
-                        <a:solidFill>
-                          <a:schemeClr val="bg1"/>
-                        </a:solidFill>
-                      </a:endParaRPr>
-                    </a:p>
-                  </a:txBody>
-                  <a:tcPr/>
-                </a:tc>
-                <a:extLst>
-                  <a:ext uri="{0D108BD9-81ED-4DB2-BD59-A6C34878D82A}">
-                    <a16:rowId xmlns:a16="http://schemas.microsoft.com/office/drawing/2014/main" val="2233224264"/>
+                    <a16:rowId xmlns:a16="http://schemas.microsoft.com/office/drawing/2014/main" val="845978339"/>
                   </a:ext>
                 </a:extLst>
               </a:tr>
@@ -10740,48 +10474,6 @@
           </a:graphicData>
         </a:graphic>
       </p:graphicFrame>
-      <p:sp>
-        <p:nvSpPr>
-          <p:cNvPr id="11" name="Title 1">
-            <a:extLst>
-              <a:ext uri="{FF2B5EF4-FFF2-40B4-BE49-F238E27FC236}">
-                <a16:creationId xmlns:a16="http://schemas.microsoft.com/office/drawing/2014/main" id="{4AAE4539-EB48-2E6F-9A72-4FD54F0EB71F}"/>
-              </a:ext>
-            </a:extLst>
-          </p:cNvPr>
-          <p:cNvSpPr>
-            <a:spLocks noGrp="1"/>
-          </p:cNvSpPr>
-          <p:nvPr>
-            <p:ph type="title"/>
-          </p:nvPr>
-        </p:nvSpPr>
-        <p:spPr>
-          <a:xfrm>
-            <a:off x="913795" y="96520"/>
-            <a:ext cx="10353762" cy="687070"/>
-          </a:xfrm>
-        </p:spPr>
-        <p:txBody>
-          <a:bodyPr>
-            <a:normAutofit fontScale="90000"/>
-          </a:bodyPr>
-          <a:lstStyle/>
-          <a:p>
-            <a:r>
-              <a:rPr lang="en-US" dirty="0">
-                <a:solidFill>
-                  <a:schemeClr val="bg2">
-                    <a:lumMod val="10000"/>
-                    <a:lumOff val="90000"/>
-                  </a:schemeClr>
-                </a:solidFill>
-              </a:rPr>
-              <a:t>Metric Results</a:t>
-            </a:r>
-          </a:p>
-        </p:txBody>
-      </p:sp>
     </p:spTree>
     <p:extLst>
       <p:ext uri="{BB962C8B-B14F-4D97-AF65-F5344CB8AC3E}">
@@ -14443,13 +14135,13 @@
         </p:nvSpPr>
         <p:spPr>
           <a:xfrm>
-            <a:off x="1722126" y="3048000"/>
-            <a:ext cx="5943594" cy="3394363"/>
+            <a:off x="1722126" y="3429000"/>
+            <a:ext cx="5943594" cy="3013363"/>
           </a:xfrm>
         </p:spPr>
         <p:txBody>
           <a:bodyPr vert="horz" lIns="91440" tIns="45720" rIns="91440" bIns="45720" rtlCol="0" anchor="ctr">
-            <a:normAutofit/>
+            <a:normAutofit lnSpcReduction="10000"/>
           </a:bodyPr>
           <a:lstStyle/>
           <a:p>

</xml_diff>

<commit_message>
edited formatting and future enhancements on ppt
</commit_message>
<xml_diff>
--- a/The Omniscient Crypto Oracle.pptx
+++ b/The Omniscient Crypto Oracle.pptx
@@ -5,7 +5,7 @@
     <p:sldMasterId id="2147483954" r:id="rId1"/>
   </p:sldMasterIdLst>
   <p:notesMasterIdLst>
-    <p:notesMasterId r:id="rId15"/>
+    <p:notesMasterId r:id="rId16"/>
   </p:notesMasterIdLst>
   <p:sldIdLst>
     <p:sldId id="256" r:id="rId2"/>
@@ -21,6 +21,7 @@
     <p:sldId id="268" r:id="rId12"/>
     <p:sldId id="265" r:id="rId13"/>
     <p:sldId id="267" r:id="rId14"/>
+    <p:sldId id="269" r:id="rId15"/>
   </p:sldIdLst>
   <p:sldSz cx="12192000" cy="6858000"/>
   <p:notesSz cx="6858000" cy="9144000"/>
@@ -1087,6 +1088,411 @@
               <a:t>Tyler</a:t>
             </a:r>
           </a:p>
+          <a:p>
+            <a:pPr marL="342900" marR="0" lvl="0" indent="-342900" algn="l" defTabSz="914400" rtl="0" eaLnBrk="0" fontAlgn="base" latinLnBrk="0" hangingPunct="0">
+              <a:lnSpc>
+                <a:spcPct val="100000"/>
+              </a:lnSpc>
+              <a:spcBef>
+                <a:spcPct val="0"/>
+              </a:spcBef>
+              <a:spcAft>
+                <a:spcPct val="0"/>
+              </a:spcAft>
+              <a:buClrTx/>
+              <a:buSzTx/>
+              <a:buFont typeface="Arial" panose="020B0604020202020204" pitchFamily="34" charset="0"/>
+              <a:buChar char="•"/>
+              <a:tabLst/>
+            </a:pPr>
+            <a:r>
+              <a:rPr lang="en-US" altLang="en-US" sz="1200" dirty="0">
+                <a:solidFill>
+                  <a:schemeClr val="tx2">
+                    <a:lumMod val="90000"/>
+                  </a:schemeClr>
+                </a:solidFill>
+              </a:rPr>
+              <a:t>Add additional Cryptocurrencies</a:t>
+            </a:r>
+          </a:p>
+          <a:p>
+            <a:pPr marL="342900" marR="0" lvl="0" indent="-342900" algn="l" defTabSz="914400" rtl="0" eaLnBrk="0" fontAlgn="base" latinLnBrk="0" hangingPunct="0">
+              <a:lnSpc>
+                <a:spcPct val="100000"/>
+              </a:lnSpc>
+              <a:spcBef>
+                <a:spcPct val="0"/>
+              </a:spcBef>
+              <a:spcAft>
+                <a:spcPct val="0"/>
+              </a:spcAft>
+              <a:buClrTx/>
+              <a:buSzTx/>
+              <a:buFont typeface="Arial" panose="020B0604020202020204" pitchFamily="34" charset="0"/>
+              <a:buChar char="•"/>
+              <a:tabLst/>
+            </a:pPr>
+            <a:r>
+              <a:rPr kumimoji="0" lang="en-US" altLang="en-US" sz="1200" b="0" i="0" u="none" strike="noStrike" cap="none" normalizeH="0" baseline="0" dirty="0">
+                <a:ln>
+                  <a:noFill/>
+                </a:ln>
+                <a:solidFill>
+                  <a:schemeClr val="tx2">
+                    <a:lumMod val="90000"/>
+                  </a:schemeClr>
+                </a:solidFill>
+                <a:effectLst/>
+              </a:rPr>
+              <a:t>Link prediction model to AP</a:t>
+            </a:r>
+            <a:r>
+              <a:rPr lang="en-US" altLang="en-US" sz="1200" dirty="0">
+                <a:solidFill>
+                  <a:schemeClr val="tx2">
+                    <a:lumMod val="90000"/>
+                  </a:schemeClr>
+                </a:solidFill>
+              </a:rPr>
+              <a:t>I for real time info</a:t>
+            </a:r>
+          </a:p>
+          <a:p>
+            <a:pPr marL="342900" marR="0" lvl="0" indent="-342900" algn="l" defTabSz="914400" rtl="0" eaLnBrk="0" fontAlgn="base" latinLnBrk="0" hangingPunct="0">
+              <a:lnSpc>
+                <a:spcPct val="100000"/>
+              </a:lnSpc>
+              <a:spcBef>
+                <a:spcPct val="0"/>
+              </a:spcBef>
+              <a:spcAft>
+                <a:spcPct val="0"/>
+              </a:spcAft>
+              <a:buClrTx/>
+              <a:buSzTx/>
+              <a:buFont typeface="Arial" panose="020B0604020202020204" pitchFamily="34" charset="0"/>
+              <a:buChar char="•"/>
+              <a:tabLst/>
+            </a:pPr>
+            <a:r>
+              <a:rPr kumimoji="0" lang="en-US" altLang="en-US" sz="1200" b="0" i="0" u="none" strike="noStrike" cap="none" normalizeH="0" baseline="0" dirty="0">
+                <a:ln>
+                  <a:noFill/>
+                </a:ln>
+                <a:solidFill>
+                  <a:schemeClr val="tx2">
+                    <a:lumMod val="90000"/>
+                  </a:schemeClr>
+                </a:solidFill>
+                <a:effectLst/>
+              </a:rPr>
+              <a:t>Add a date input field for future predictions</a:t>
+            </a:r>
+          </a:p>
+          <a:p>
+            <a:pPr marL="342900" marR="0" lvl="0" indent="-342900" algn="l" defTabSz="914400" rtl="0" eaLnBrk="0" fontAlgn="base" latinLnBrk="0" hangingPunct="0">
+              <a:lnSpc>
+                <a:spcPct val="100000"/>
+              </a:lnSpc>
+              <a:spcBef>
+                <a:spcPct val="0"/>
+              </a:spcBef>
+              <a:spcAft>
+                <a:spcPct val="0"/>
+              </a:spcAft>
+              <a:buClrTx/>
+              <a:buSzTx/>
+              <a:buFont typeface="Arial" panose="020B0604020202020204" pitchFamily="34" charset="0"/>
+              <a:buChar char="•"/>
+              <a:tabLst/>
+            </a:pPr>
+            <a:r>
+              <a:rPr kumimoji="0" lang="en-US" altLang="en-US" sz="1200" b="0" i="0" u="none" strike="noStrike" cap="none" normalizeH="0" baseline="0" dirty="0">
+                <a:ln>
+                  <a:noFill/>
+                </a:ln>
+                <a:solidFill>
+                  <a:schemeClr val="tx2">
+                    <a:lumMod val="90000"/>
+                  </a:schemeClr>
+                </a:solidFill>
+                <a:effectLst/>
+              </a:rPr>
+              <a:t>Separate validation set</a:t>
+            </a:r>
+          </a:p>
+          <a:p>
+            <a:pPr marL="342900" marR="0" lvl="0" indent="-342900" algn="l" defTabSz="914400" rtl="0" eaLnBrk="0" fontAlgn="base" latinLnBrk="0" hangingPunct="0">
+              <a:lnSpc>
+                <a:spcPct val="100000"/>
+              </a:lnSpc>
+              <a:spcBef>
+                <a:spcPct val="0"/>
+              </a:spcBef>
+              <a:spcAft>
+                <a:spcPct val="0"/>
+              </a:spcAft>
+              <a:buClrTx/>
+              <a:buSzTx/>
+              <a:buFont typeface="Arial" panose="020B0604020202020204" pitchFamily="34" charset="0"/>
+              <a:buChar char="•"/>
+              <a:tabLst/>
+            </a:pPr>
+            <a:r>
+              <a:rPr lang="en-US" altLang="en-US" sz="1200" dirty="0">
+                <a:solidFill>
+                  <a:schemeClr val="tx2">
+                    <a:lumMod val="90000"/>
+                  </a:schemeClr>
+                </a:solidFill>
+              </a:rPr>
+              <a:t>Use Dropout to prevent overfitting</a:t>
+            </a:r>
+          </a:p>
+          <a:p>
+            <a:pPr marL="342900" marR="0" lvl="0" indent="-342900" algn="l" defTabSz="914400" rtl="0" eaLnBrk="0" fontAlgn="base" latinLnBrk="0" hangingPunct="0">
+              <a:lnSpc>
+                <a:spcPct val="100000"/>
+              </a:lnSpc>
+              <a:spcBef>
+                <a:spcPct val="0"/>
+              </a:spcBef>
+              <a:spcAft>
+                <a:spcPct val="0"/>
+              </a:spcAft>
+              <a:buClrTx/>
+              <a:buSzTx/>
+              <a:buFont typeface="Arial" panose="020B0604020202020204" pitchFamily="34" charset="0"/>
+              <a:buChar char="•"/>
+              <a:tabLst/>
+            </a:pPr>
+            <a:r>
+              <a:rPr kumimoji="0" lang="en-US" altLang="en-US" sz="1200" b="0" i="0" u="none" strike="noStrike" cap="none" normalizeH="0" baseline="0" dirty="0">
+                <a:ln>
+                  <a:noFill/>
+                </a:ln>
+                <a:solidFill>
+                  <a:schemeClr val="tx2">
+                    <a:lumMod val="90000"/>
+                  </a:schemeClr>
+                </a:solidFill>
+                <a:effectLst/>
+              </a:rPr>
+              <a:t>Use Early Stopping to prevent overfitting</a:t>
+            </a:r>
+            <a:endParaRPr lang="en-US" altLang="en-US" sz="1200" dirty="0">
+              <a:solidFill>
+                <a:schemeClr val="tx2">
+                  <a:lumMod val="90000"/>
+                </a:schemeClr>
+              </a:solidFill>
+            </a:endParaRPr>
+          </a:p>
+          <a:p>
+            <a:pPr marL="342900" marR="0" lvl="0" indent="-342900" algn="l" defTabSz="914400" rtl="0" eaLnBrk="0" fontAlgn="base" latinLnBrk="0" hangingPunct="0">
+              <a:lnSpc>
+                <a:spcPct val="100000"/>
+              </a:lnSpc>
+              <a:spcBef>
+                <a:spcPct val="0"/>
+              </a:spcBef>
+              <a:spcAft>
+                <a:spcPct val="0"/>
+              </a:spcAft>
+              <a:buClrTx/>
+              <a:buSzTx/>
+              <a:buFont typeface="Arial" panose="020B0604020202020204" pitchFamily="34" charset="0"/>
+              <a:buChar char="•"/>
+              <a:tabLst/>
+            </a:pPr>
+            <a:r>
+              <a:rPr lang="en-US" altLang="en-US" sz="1200" dirty="0">
+                <a:solidFill>
+                  <a:schemeClr val="tx2">
+                    <a:lumMod val="90000"/>
+                  </a:schemeClr>
+                </a:solidFill>
+              </a:rPr>
+              <a:t>More features – technical indicators</a:t>
+            </a:r>
+          </a:p>
+          <a:p>
+            <a:pPr marL="342900" marR="0" lvl="0" indent="-342900" algn="l" defTabSz="914400" rtl="0" eaLnBrk="0" fontAlgn="base" latinLnBrk="0" hangingPunct="0">
+              <a:lnSpc>
+                <a:spcPct val="100000"/>
+              </a:lnSpc>
+              <a:spcBef>
+                <a:spcPct val="0"/>
+              </a:spcBef>
+              <a:spcAft>
+                <a:spcPct val="0"/>
+              </a:spcAft>
+              <a:buClrTx/>
+              <a:buSzTx/>
+              <a:buFont typeface="Arial" panose="020B0604020202020204" pitchFamily="34" charset="0"/>
+              <a:buChar char="•"/>
+              <a:tabLst/>
+            </a:pPr>
+            <a:r>
+              <a:rPr kumimoji="0" lang="en-US" altLang="en-US" sz="1200" b="0" i="0" u="none" strike="noStrike" cap="none" normalizeH="0" baseline="0" dirty="0">
+                <a:ln>
+                  <a:noFill/>
+                </a:ln>
+                <a:solidFill>
+                  <a:schemeClr val="tx2">
+                    <a:lumMod val="90000"/>
+                  </a:schemeClr>
+                </a:solidFill>
+                <a:effectLst/>
+              </a:rPr>
+              <a:t>Use other RNN, CNN Models</a:t>
+            </a:r>
+          </a:p>
+          <a:p>
+            <a:pPr marL="342900" marR="0" lvl="0" indent="-342900" algn="l" defTabSz="914400" rtl="0" eaLnBrk="0" fontAlgn="base" latinLnBrk="0" hangingPunct="0">
+              <a:lnSpc>
+                <a:spcPct val="100000"/>
+              </a:lnSpc>
+              <a:spcBef>
+                <a:spcPct val="0"/>
+              </a:spcBef>
+              <a:spcAft>
+                <a:spcPct val="0"/>
+              </a:spcAft>
+              <a:buClrTx/>
+              <a:buSzTx/>
+              <a:buFont typeface="Arial" panose="020B0604020202020204" pitchFamily="34" charset="0"/>
+              <a:buChar char="•"/>
+              <a:tabLst/>
+            </a:pPr>
+            <a:r>
+              <a:rPr lang="en-US" altLang="en-US" sz="1200" dirty="0">
+                <a:solidFill>
+                  <a:schemeClr val="tx2">
+                    <a:lumMod val="90000"/>
+                  </a:schemeClr>
+                </a:solidFill>
+              </a:rPr>
+              <a:t>Try ensemble methods like Random Forest</a:t>
+            </a:r>
+          </a:p>
+          <a:p>
+            <a:pPr marL="342900" marR="0" lvl="0" indent="-342900" algn="l" defTabSz="914400" rtl="0" eaLnBrk="0" fontAlgn="base" latinLnBrk="0" hangingPunct="0">
+              <a:lnSpc>
+                <a:spcPct val="100000"/>
+              </a:lnSpc>
+              <a:spcBef>
+                <a:spcPct val="0"/>
+              </a:spcBef>
+              <a:spcAft>
+                <a:spcPct val="0"/>
+              </a:spcAft>
+              <a:buClrTx/>
+              <a:buSzTx/>
+              <a:buFont typeface="Arial" panose="020B0604020202020204" pitchFamily="34" charset="0"/>
+              <a:buChar char="•"/>
+              <a:tabLst/>
+            </a:pPr>
+            <a:r>
+              <a:rPr kumimoji="0" lang="en-US" altLang="en-US" sz="1200" b="0" i="0" u="none" strike="noStrike" cap="none" normalizeH="0" baseline="0" dirty="0">
+                <a:ln>
+                  <a:noFill/>
+                </a:ln>
+                <a:solidFill>
+                  <a:schemeClr val="tx2">
+                    <a:lumMod val="90000"/>
+                  </a:schemeClr>
+                </a:solidFill>
+                <a:effectLst/>
+              </a:rPr>
+              <a:t>Optimize hyperparameters – learning rate, batch si</a:t>
+            </a:r>
+            <a:r>
+              <a:rPr lang="en-US" altLang="en-US" sz="1200" dirty="0">
+                <a:solidFill>
+                  <a:schemeClr val="tx2">
+                    <a:lumMod val="90000"/>
+                  </a:schemeClr>
+                </a:solidFill>
+              </a:rPr>
+              <a:t>ze, # of epochs</a:t>
+            </a:r>
+          </a:p>
+          <a:p>
+            <a:pPr marL="342900" marR="0" lvl="0" indent="-342900" algn="l" defTabSz="914400" rtl="0" eaLnBrk="0" fontAlgn="base" latinLnBrk="0" hangingPunct="0">
+              <a:lnSpc>
+                <a:spcPct val="100000"/>
+              </a:lnSpc>
+              <a:spcBef>
+                <a:spcPct val="0"/>
+              </a:spcBef>
+              <a:spcAft>
+                <a:spcPct val="0"/>
+              </a:spcAft>
+              <a:buClrTx/>
+              <a:buSzTx/>
+              <a:buFont typeface="Arial" panose="020B0604020202020204" pitchFamily="34" charset="0"/>
+              <a:buChar char="•"/>
+              <a:tabLst/>
+            </a:pPr>
+            <a:r>
+              <a:rPr kumimoji="0" lang="en-US" altLang="en-US" sz="1200" b="0" i="0" u="none" strike="noStrike" cap="none" normalizeH="0" baseline="0" dirty="0">
+                <a:ln>
+                  <a:noFill/>
+                </a:ln>
+                <a:solidFill>
+                  <a:schemeClr val="tx2">
+                    <a:lumMod val="90000"/>
+                  </a:schemeClr>
+                </a:solidFill>
+                <a:effectLst/>
+              </a:rPr>
+              <a:t>Try using Loss Function Mean Absolute Percentage Error (MAPE) to evaluate model</a:t>
+            </a:r>
+          </a:p>
+          <a:p>
+            <a:pPr marL="342900" marR="0" lvl="0" indent="-342900" algn="l" defTabSz="914400" rtl="0" eaLnBrk="0" fontAlgn="base" latinLnBrk="0" hangingPunct="0">
+              <a:lnSpc>
+                <a:spcPct val="100000"/>
+              </a:lnSpc>
+              <a:spcBef>
+                <a:spcPct val="0"/>
+              </a:spcBef>
+              <a:spcAft>
+                <a:spcPct val="0"/>
+              </a:spcAft>
+              <a:buClrTx/>
+              <a:buSzTx/>
+              <a:buFont typeface="Arial" panose="020B0604020202020204" pitchFamily="34" charset="0"/>
+              <a:buChar char="•"/>
+              <a:tabLst/>
+            </a:pPr>
+            <a:r>
+              <a:rPr lang="en-US" altLang="en-US" sz="1200" dirty="0">
+                <a:solidFill>
+                  <a:schemeClr val="tx2">
+                    <a:lumMod val="90000"/>
+                  </a:schemeClr>
+                </a:solidFill>
+              </a:rPr>
+              <a:t>Try different activation functions like Sigmoid or Tanh</a:t>
+            </a:r>
+            <a:endParaRPr kumimoji="0" lang="en-US" altLang="en-US" sz="1200" b="0" i="0" u="none" strike="noStrike" cap="none" normalizeH="0" baseline="0" dirty="0">
+              <a:ln>
+                <a:noFill/>
+              </a:ln>
+              <a:solidFill>
+                <a:schemeClr val="tx2">
+                  <a:lumMod val="90000"/>
+                </a:schemeClr>
+              </a:solidFill>
+              <a:effectLst/>
+            </a:endParaRPr>
+          </a:p>
+          <a:p>
+            <a:endParaRPr lang="en-US" dirty="0"/>
+          </a:p>
         </p:txBody>
       </p:sp>
       <p:sp>
@@ -1116,6 +1522,93 @@
     <p:extLst>
       <p:ext uri="{BB962C8B-B14F-4D97-AF65-F5344CB8AC3E}">
         <p14:creationId xmlns:p14="http://schemas.microsoft.com/office/powerpoint/2010/main" val="2902554581"/>
+      </p:ext>
+    </p:extLst>
+  </p:cSld>
+  <p:clrMapOvr>
+    <a:masterClrMapping/>
+  </p:clrMapOvr>
+</p:notes>
+</file>
+
+<file path=ppt/notesSlides/notesSlide14.xml><?xml version="1.0" encoding="utf-8"?>
+<p:notes xmlns:a="http://schemas.openxmlformats.org/drawingml/2006/main" xmlns:r="http://schemas.openxmlformats.org/officeDocument/2006/relationships" xmlns:p="http://schemas.openxmlformats.org/presentationml/2006/main">
+  <p:cSld>
+    <p:spTree>
+      <p:nvGrpSpPr>
+        <p:cNvPr id="1" name=""/>
+        <p:cNvGrpSpPr/>
+        <p:nvPr/>
+      </p:nvGrpSpPr>
+      <p:grpSpPr>
+        <a:xfrm>
+          <a:off x="0" y="0"/>
+          <a:ext cx="0" cy="0"/>
+          <a:chOff x="0" y="0"/>
+          <a:chExt cx="0" cy="0"/>
+        </a:xfrm>
+      </p:grpSpPr>
+      <p:sp>
+        <p:nvSpPr>
+          <p:cNvPr id="2" name="Slide Image Placeholder 1"/>
+          <p:cNvSpPr>
+            <a:spLocks noGrp="1" noRot="1" noChangeAspect="1"/>
+          </p:cNvSpPr>
+          <p:nvPr>
+            <p:ph type="sldImg"/>
+          </p:nvPr>
+        </p:nvSpPr>
+        <p:spPr/>
+      </p:sp>
+      <p:sp>
+        <p:nvSpPr>
+          <p:cNvPr id="3" name="Notes Placeholder 2"/>
+          <p:cNvSpPr>
+            <a:spLocks noGrp="1"/>
+          </p:cNvSpPr>
+          <p:nvPr>
+            <p:ph type="body" idx="1"/>
+          </p:nvPr>
+        </p:nvSpPr>
+        <p:spPr/>
+        <p:txBody>
+          <a:bodyPr/>
+          <a:lstStyle/>
+          <a:p>
+            <a:r>
+              <a:rPr lang="en-US" dirty="0"/>
+              <a:t>Tyler</a:t>
+            </a:r>
+          </a:p>
+        </p:txBody>
+      </p:sp>
+      <p:sp>
+        <p:nvSpPr>
+          <p:cNvPr id="4" name="Slide Number Placeholder 3"/>
+          <p:cNvSpPr>
+            <a:spLocks noGrp="1"/>
+          </p:cNvSpPr>
+          <p:nvPr>
+            <p:ph type="sldNum" sz="quarter" idx="5"/>
+          </p:nvPr>
+        </p:nvSpPr>
+        <p:spPr/>
+        <p:txBody>
+          <a:bodyPr/>
+          <a:lstStyle/>
+          <a:p>
+            <a:fld id="{2952150E-5FD0-4979-B16F-63AB93BFA1A6}" type="slidenum">
+              <a:rPr lang="en-US" smtClean="0"/>
+              <a:t>14</a:t>
+            </a:fld>
+            <a:endParaRPr lang="en-US"/>
+          </a:p>
+        </p:txBody>
+      </p:sp>
+    </p:spTree>
+    <p:extLst>
+      <p:ext uri="{BB962C8B-B14F-4D97-AF65-F5344CB8AC3E}">
+        <p14:creationId xmlns:p14="http://schemas.microsoft.com/office/powerpoint/2010/main" val="1626511650"/>
       </p:ext>
     </p:extLst>
   </p:cSld>
@@ -9159,8 +9652,8 @@
         </p:nvSpPr>
         <p:spPr>
           <a:xfrm>
-            <a:off x="6025020" y="212353"/>
-            <a:ext cx="5882640" cy="6080370"/>
+            <a:off x="5292300" y="212353"/>
+            <a:ext cx="6615360" cy="6080370"/>
           </a:xfrm>
         </p:spPr>
         <p:txBody>
@@ -9181,6 +9674,20 @@
               </a:spcAft>
             </a:pPr>
             <a:r>
+              <a:rPr lang="en-US" sz="3600" dirty="0">
+                <a:solidFill>
+                  <a:schemeClr val="tx2">
+                    <a:lumMod val="90000"/>
+                  </a:schemeClr>
+                </a:solidFill>
+                <a:effectLst/>
+                <a:latin typeface="+mj-lt"/>
+                <a:ea typeface="Calibri" panose="020F0502020204030204" pitchFamily="34" charset="0"/>
+                <a:cs typeface="Times New Roman" panose="02020603050405020304" pitchFamily="18" charset="0"/>
+              </a:rPr>
+              <a:t>Machine Learning</a:t>
+            </a:r>
+            <a:r>
               <a:rPr lang="en-US" sz="3000" dirty="0">
                 <a:solidFill>
                   <a:schemeClr val="tx2">
@@ -9192,7 +9699,7 @@
                 <a:ea typeface="Calibri" panose="020F0502020204030204" pitchFamily="34" charset="0"/>
                 <a:cs typeface="Times New Roman" panose="02020603050405020304" pitchFamily="18" charset="0"/>
               </a:rPr>
-              <a:t>Machine Learning:</a:t>
+              <a:t>:</a:t>
             </a:r>
           </a:p>
           <a:p>
@@ -9230,14 +9737,13 @@
               </a:spcAft>
             </a:pPr>
             <a:r>
-              <a:rPr lang="en-US" sz="2400" b="0" i="0" dirty="0">
+              <a:rPr lang="en-US" sz="2800" b="0" i="0" dirty="0">
                 <a:solidFill>
                   <a:srgbClr val="0070C0"/>
                 </a:solidFill>
                 <a:effectLst/>
-                <a:latin typeface="-apple-system"/>
-              </a:rPr>
-              <a:t>Long Short-Term Memory (LSTM) model</a:t>
+              </a:rPr>
+              <a:t>Long Short-Term Memory(LSTM) </a:t>
             </a:r>
           </a:p>
           <a:p>
@@ -9252,12 +9758,11 @@
                 <a:spcPts val="0"/>
               </a:spcAft>
             </a:pPr>
-            <a:endParaRPr lang="en-US" sz="2400" b="0" i="0" dirty="0">
+            <a:endParaRPr lang="en-US" sz="2800" b="0" i="0" dirty="0">
               <a:solidFill>
                 <a:srgbClr val="0070C0"/>
               </a:solidFill>
               <a:effectLst/>
-              <a:latin typeface="-apple-system"/>
             </a:endParaRPr>
           </a:p>
           <a:p>
@@ -9273,12 +9778,11 @@
               </a:spcAft>
             </a:pPr>
             <a:r>
-              <a:rPr lang="en-US" sz="2400" b="0" i="0" dirty="0">
+              <a:rPr lang="en-US" sz="2800" b="0" i="0" dirty="0">
                 <a:solidFill>
                   <a:srgbClr val="0070C0"/>
                 </a:solidFill>
                 <a:effectLst/>
-                <a:latin typeface="-apple-system"/>
               </a:rPr>
               <a:t>Metrics:</a:t>
             </a:r>
@@ -9296,12 +9800,11 @@
               </a:spcAft>
             </a:pPr>
             <a:r>
-              <a:rPr lang="en-US" sz="2400" b="0" i="0" dirty="0">
+              <a:rPr lang="en-US" sz="2800" b="0" i="0" dirty="0">
                 <a:solidFill>
                   <a:srgbClr val="0070C0"/>
                 </a:solidFill>
                 <a:effectLst/>
-                <a:latin typeface="-apple-system"/>
               </a:rPr>
               <a:t> </a:t>
             </a:r>
@@ -9319,22 +9822,20 @@
               </a:spcAft>
             </a:pPr>
             <a:r>
-              <a:rPr lang="en-US" sz="2400" dirty="0">
+              <a:rPr lang="en-US" sz="2800" dirty="0">
                 <a:solidFill>
                   <a:srgbClr val="0070C0"/>
                 </a:solidFill>
                 <a:effectLst/>
-                <a:latin typeface="-apple-system"/>
               </a:rPr>
               <a:t>	</a:t>
             </a:r>
             <a:r>
-              <a:rPr lang="en-US" sz="2400" b="0" i="0" dirty="0">
+              <a:rPr lang="en-US" sz="2800" b="0" i="0" dirty="0">
                 <a:solidFill>
                   <a:srgbClr val="0070C0"/>
                 </a:solidFill>
                 <a:effectLst/>
-                <a:latin typeface="-apple-system"/>
               </a:rPr>
               <a:t>Mean Squared Error (MSE)</a:t>
             </a:r>
@@ -9351,12 +9852,11 @@
                 <a:spcPts val="0"/>
               </a:spcAft>
             </a:pPr>
-            <a:endParaRPr lang="en-US" sz="2400" b="0" i="0" dirty="0">
+            <a:endParaRPr lang="en-US" sz="2800" b="0" i="0" dirty="0">
               <a:solidFill>
                 <a:srgbClr val="0070C0"/>
               </a:solidFill>
               <a:effectLst/>
-              <a:latin typeface="-apple-system"/>
             </a:endParaRPr>
           </a:p>
           <a:p>
@@ -9372,12 +9872,11 @@
               </a:spcAft>
             </a:pPr>
             <a:r>
-              <a:rPr lang="en-US" sz="2400" b="0" i="0" dirty="0">
+              <a:rPr lang="en-US" sz="2800" b="0" i="0" dirty="0">
                 <a:solidFill>
                   <a:srgbClr val="0070C0"/>
                 </a:solidFill>
                 <a:effectLst/>
-                <a:latin typeface="-apple-system"/>
               </a:rPr>
               <a:t>	Root Mean Squared Error (RMSE)</a:t>
             </a:r>
@@ -9394,12 +9893,11 @@
                 <a:spcPts val="0"/>
               </a:spcAft>
             </a:pPr>
-            <a:endParaRPr lang="en-US" sz="2400" dirty="0">
+            <a:endParaRPr lang="en-US" sz="2800" dirty="0">
               <a:solidFill>
                 <a:srgbClr val="0070C0"/>
               </a:solidFill>
               <a:effectLst/>
-              <a:latin typeface="-apple-system"/>
             </a:endParaRPr>
           </a:p>
           <a:p>
@@ -9415,42 +9913,38 @@
               </a:spcAft>
             </a:pPr>
             <a:r>
-              <a:rPr lang="en-US" sz="2400" b="0" i="0" dirty="0">
+              <a:rPr lang="en-US" sz="2800" b="0" i="0" dirty="0">
                 <a:solidFill>
                   <a:srgbClr val="0070C0"/>
                 </a:solidFill>
                 <a:effectLst/>
-                <a:latin typeface="-apple-system"/>
               </a:rPr>
               <a:t>	 </a:t>
             </a:r>
             <a:r>
-              <a:rPr lang="en-US" sz="2400" dirty="0">
+              <a:rPr lang="en-US" sz="2800" dirty="0">
                 <a:solidFill>
                   <a:srgbClr val="0070C0"/>
                 </a:solidFill>
                 <a:effectLst/>
-                <a:latin typeface="-apple-system"/>
               </a:rPr>
               <a:t>C</a:t>
             </a:r>
             <a:r>
-              <a:rPr lang="en-US" sz="2400" b="0" i="0" dirty="0">
+              <a:rPr lang="en-US" sz="2800" b="0" i="0" dirty="0">
                 <a:solidFill>
                   <a:srgbClr val="0070C0"/>
                 </a:solidFill>
                 <a:effectLst/>
-                <a:latin typeface="-apple-system"/>
               </a:rPr>
               <a:t>oefficient of determination (R^2)</a:t>
             </a:r>
             <a:r>
-              <a:rPr lang="en-US" sz="2400" dirty="0">
+              <a:rPr lang="en-US" sz="2800" dirty="0">
                 <a:solidFill>
                   <a:srgbClr val="0070C0"/>
                 </a:solidFill>
                 <a:effectLst/>
-                <a:latin typeface="Arial" panose="020B0604020202020204" pitchFamily="34" charset="0"/>
                 <a:ea typeface="Calibri" panose="020F0502020204030204" pitchFamily="34" charset="0"/>
                 <a:cs typeface="Times New Roman" panose="02020603050405020304" pitchFamily="18" charset="0"/>
               </a:rPr>
@@ -9469,12 +9963,11 @@
                 <a:spcPts val="0"/>
               </a:spcAft>
             </a:pPr>
-            <a:endParaRPr lang="en-US" sz="2400" dirty="0">
+            <a:endParaRPr lang="en-US" sz="2800" dirty="0">
               <a:solidFill>
                 <a:srgbClr val="0070C0"/>
               </a:solidFill>
               <a:effectLst/>
-              <a:latin typeface="Arial" panose="020B0604020202020204" pitchFamily="34" charset="0"/>
               <a:ea typeface="Calibri" panose="020F0502020204030204" pitchFamily="34" charset="0"/>
               <a:cs typeface="Times New Roman" panose="02020603050405020304" pitchFamily="18" charset="0"/>
             </a:endParaRPr>
@@ -9492,12 +9985,11 @@
               </a:spcAft>
             </a:pPr>
             <a:r>
-              <a:rPr lang="en-US" sz="2400" dirty="0">
+              <a:rPr lang="en-US" sz="2800" dirty="0">
                 <a:solidFill>
                   <a:srgbClr val="0070C0"/>
                 </a:solidFill>
                 <a:effectLst/>
-                <a:latin typeface="Arial" panose="020B0604020202020204" pitchFamily="34" charset="0"/>
                 <a:ea typeface="Calibri" panose="020F0502020204030204" pitchFamily="34" charset="0"/>
                 <a:cs typeface="Times New Roman" panose="02020603050405020304" pitchFamily="18" charset="0"/>
               </a:rPr>
@@ -9537,7 +10029,7 @@
         </p:blipFill>
         <p:spPr>
           <a:xfrm>
-            <a:off x="759600" y="731518"/>
+            <a:off x="341699" y="777237"/>
             <a:ext cx="4950601" cy="4950601"/>
           </a:xfrm>
           <a:prstGeom prst="rect">
@@ -10539,7 +11031,6 @@
                   </a:schemeClr>
                 </a:solidFill>
                 <a:effectLst/>
-                <a:latin typeface="Arial" panose="020B0604020202020204" pitchFamily="34" charset="0"/>
                 <a:ea typeface="Calibri" panose="020F0502020204030204" pitchFamily="34" charset="0"/>
               </a:rPr>
               <a:t>Pricing Trends by Weekday</a:t>
@@ -11366,7 +11857,7 @@
         </p:nvSpPr>
         <p:spPr>
           <a:xfrm>
-            <a:off x="913795" y="609600"/>
+            <a:off x="831162" y="46892"/>
             <a:ext cx="10353762" cy="970450"/>
           </a:xfrm>
           <a:prstGeom prst="rect">
@@ -11476,6 +11967,821 @@
                 <a:latin typeface="Arial" panose="020B0604020202020204" pitchFamily="34" charset="0"/>
                 <a:ea typeface="Calibri" panose="020F0502020204030204" pitchFamily="34" charset="0"/>
               </a:rPr>
+              <a:t>Future Enhancements</a:t>
+            </a:r>
+            <a:endParaRPr lang="en-US" dirty="0">
+              <a:solidFill>
+                <a:schemeClr val="bg2">
+                  <a:lumMod val="10000"/>
+                  <a:lumOff val="90000"/>
+                </a:schemeClr>
+              </a:solidFill>
+            </a:endParaRPr>
+          </a:p>
+        </p:txBody>
+      </p:sp>
+      <p:sp>
+        <p:nvSpPr>
+          <p:cNvPr id="6" name="Rectangle 2">
+            <a:extLst>
+              <a:ext uri="{FF2B5EF4-FFF2-40B4-BE49-F238E27FC236}">
+                <a16:creationId xmlns:a16="http://schemas.microsoft.com/office/drawing/2014/main" id="{3C0C2272-B21F-5B2A-EC75-56D812155395}"/>
+              </a:ext>
+            </a:extLst>
+          </p:cNvPr>
+          <p:cNvSpPr>
+            <a:spLocks noChangeArrowheads="1"/>
+          </p:cNvSpPr>
+          <p:nvPr/>
+        </p:nvSpPr>
+        <p:spPr bwMode="auto">
+          <a:xfrm>
+            <a:off x="913795" y="5758208"/>
+            <a:ext cx="65" cy="276999"/>
+          </a:xfrm>
+          <a:prstGeom prst="rect">
+            <a:avLst/>
+          </a:prstGeom>
+          <a:solidFill>
+            <a:srgbClr val="FFFFFF"/>
+          </a:solidFill>
+          <a:ln>
+            <a:noFill/>
+          </a:ln>
+          <a:effectLst/>
+          <a:extLst>
+            <a:ext uri="{91240B29-F687-4F45-9708-019B960494DF}">
+              <a14:hiddenLine xmlns:a14="http://schemas.microsoft.com/office/drawing/2010/main" w="9525">
+                <a:solidFill>
+                  <a:schemeClr val="tx1"/>
+                </a:solidFill>
+                <a:miter lim="800000"/>
+                <a:headEnd/>
+                <a:tailEnd/>
+              </a14:hiddenLine>
+            </a:ext>
+            <a:ext uri="{AF507438-7753-43E0-B8FC-AC1667EBCBE1}">
+              <a14:hiddenEffects xmlns:a14="http://schemas.microsoft.com/office/drawing/2010/main">
+                <a:effectLst>
+                  <a:outerShdw dist="35921" dir="2700000" algn="ctr" rotWithShape="0">
+                    <a:schemeClr val="bg2"/>
+                  </a:outerShdw>
+                </a:effectLst>
+              </a14:hiddenEffects>
+            </a:ext>
+          </a:extLst>
+        </p:spPr>
+        <p:txBody>
+          <a:bodyPr vert="horz" wrap="none" lIns="0" tIns="0" rIns="0" bIns="0" numCol="1" anchor="ctr" anchorCtr="0" compatLnSpc="1">
+            <a:prstTxWarp prst="textNoShape">
+              <a:avLst/>
+            </a:prstTxWarp>
+            <a:spAutoFit/>
+          </a:bodyPr>
+          <a:lstStyle/>
+          <a:p>
+            <a:pPr marL="0" marR="0" lvl="0" indent="0" algn="l" defTabSz="914400" rtl="0" eaLnBrk="0" fontAlgn="base" latinLnBrk="0" hangingPunct="0">
+              <a:lnSpc>
+                <a:spcPct val="100000"/>
+              </a:lnSpc>
+              <a:spcBef>
+                <a:spcPct val="0"/>
+              </a:spcBef>
+              <a:spcAft>
+                <a:spcPct val="0"/>
+              </a:spcAft>
+              <a:buClrTx/>
+              <a:buSzTx/>
+              <a:buFontTx/>
+              <a:buNone/>
+              <a:tabLst/>
+            </a:pPr>
+            <a:endParaRPr kumimoji="0" lang="en-US" altLang="en-US" sz="1800" b="0" i="0" u="none" strike="noStrike" cap="none" normalizeH="0" baseline="0" dirty="0">
+              <a:ln>
+                <a:noFill/>
+              </a:ln>
+              <a:solidFill>
+                <a:schemeClr val="tx1"/>
+              </a:solidFill>
+              <a:effectLst/>
+              <a:latin typeface="Arial" panose="020B0604020202020204" pitchFamily="34" charset="0"/>
+            </a:endParaRPr>
+          </a:p>
+        </p:txBody>
+      </p:sp>
+      <p:sp>
+        <p:nvSpPr>
+          <p:cNvPr id="7" name="Rectangle 3">
+            <a:extLst>
+              <a:ext uri="{FF2B5EF4-FFF2-40B4-BE49-F238E27FC236}">
+                <a16:creationId xmlns:a16="http://schemas.microsoft.com/office/drawing/2014/main" id="{E96210A1-7454-778D-6E16-DE1ECAA0AA15}"/>
+              </a:ext>
+            </a:extLst>
+          </p:cNvPr>
+          <p:cNvSpPr>
+            <a:spLocks noChangeArrowheads="1"/>
+          </p:cNvSpPr>
+          <p:nvPr/>
+        </p:nvSpPr>
+        <p:spPr bwMode="auto">
+          <a:xfrm>
+            <a:off x="222738" y="929918"/>
+            <a:ext cx="11570611" cy="5478423"/>
+          </a:xfrm>
+          <a:prstGeom prst="rect">
+            <a:avLst/>
+          </a:prstGeom>
+          <a:solidFill>
+            <a:schemeClr val="bg1"/>
+          </a:solidFill>
+          <a:ln>
+            <a:noFill/>
+          </a:ln>
+          <a:effectLst/>
+        </p:spPr>
+        <p:txBody>
+          <a:bodyPr vert="horz" wrap="square" lIns="0" tIns="0" rIns="0" bIns="0" numCol="1" anchor="ctr" anchorCtr="0" compatLnSpc="1">
+            <a:prstTxWarp prst="textNoShape">
+              <a:avLst/>
+            </a:prstTxWarp>
+            <a:spAutoFit/>
+          </a:bodyPr>
+          <a:lstStyle/>
+          <a:p>
+            <a:pPr marL="342900" marR="0" lvl="0" indent="-342900" algn="l" defTabSz="914400" rtl="0" eaLnBrk="0" fontAlgn="base" latinLnBrk="0" hangingPunct="0">
+              <a:lnSpc>
+                <a:spcPct val="100000"/>
+              </a:lnSpc>
+              <a:spcBef>
+                <a:spcPct val="0"/>
+              </a:spcBef>
+              <a:spcAft>
+                <a:spcPct val="0"/>
+              </a:spcAft>
+              <a:buClrTx/>
+              <a:buSzTx/>
+              <a:buFont typeface="Arial" panose="020B0604020202020204" pitchFamily="34" charset="0"/>
+              <a:buChar char="•"/>
+              <a:tabLst/>
+            </a:pPr>
+            <a:r>
+              <a:rPr lang="en-US" altLang="en-US" sz="2600" dirty="0">
+                <a:solidFill>
+                  <a:schemeClr val="tx2">
+                    <a:lumMod val="90000"/>
+                  </a:schemeClr>
+                </a:solidFill>
+              </a:rPr>
+              <a:t>Add additional Cryptocurrencies</a:t>
+            </a:r>
+          </a:p>
+          <a:p>
+            <a:pPr marL="342900" marR="0" lvl="0" indent="-342900" algn="l" defTabSz="914400" rtl="0" eaLnBrk="0" fontAlgn="base" latinLnBrk="0" hangingPunct="0">
+              <a:lnSpc>
+                <a:spcPct val="100000"/>
+              </a:lnSpc>
+              <a:spcBef>
+                <a:spcPct val="0"/>
+              </a:spcBef>
+              <a:spcAft>
+                <a:spcPct val="0"/>
+              </a:spcAft>
+              <a:buClrTx/>
+              <a:buSzTx/>
+              <a:buFont typeface="Arial" panose="020B0604020202020204" pitchFamily="34" charset="0"/>
+              <a:buChar char="•"/>
+              <a:tabLst/>
+            </a:pPr>
+            <a:r>
+              <a:rPr kumimoji="0" lang="en-US" altLang="en-US" sz="2600" b="0" i="0" u="none" strike="noStrike" cap="none" normalizeH="0" baseline="0" dirty="0">
+                <a:ln>
+                  <a:noFill/>
+                </a:ln>
+                <a:solidFill>
+                  <a:schemeClr val="tx2">
+                    <a:lumMod val="90000"/>
+                  </a:schemeClr>
+                </a:solidFill>
+                <a:effectLst/>
+              </a:rPr>
+              <a:t>Link prediction model to AP</a:t>
+            </a:r>
+            <a:r>
+              <a:rPr lang="en-US" altLang="en-US" sz="2600" dirty="0">
+                <a:solidFill>
+                  <a:schemeClr val="tx2">
+                    <a:lumMod val="90000"/>
+                  </a:schemeClr>
+                </a:solidFill>
+              </a:rPr>
+              <a:t>I for real time info</a:t>
+            </a:r>
+          </a:p>
+          <a:p>
+            <a:pPr marL="342900" marR="0" lvl="0" indent="-342900" algn="l" defTabSz="914400" rtl="0" eaLnBrk="0" fontAlgn="base" latinLnBrk="0" hangingPunct="0">
+              <a:lnSpc>
+                <a:spcPct val="100000"/>
+              </a:lnSpc>
+              <a:spcBef>
+                <a:spcPct val="0"/>
+              </a:spcBef>
+              <a:spcAft>
+                <a:spcPct val="0"/>
+              </a:spcAft>
+              <a:buClrTx/>
+              <a:buSzTx/>
+              <a:buFont typeface="Arial" panose="020B0604020202020204" pitchFamily="34" charset="0"/>
+              <a:buChar char="•"/>
+              <a:tabLst/>
+            </a:pPr>
+            <a:r>
+              <a:rPr kumimoji="0" lang="en-US" altLang="en-US" sz="2600" b="0" i="0" u="none" strike="noStrike" cap="none" normalizeH="0" baseline="0" dirty="0">
+                <a:ln>
+                  <a:noFill/>
+                </a:ln>
+                <a:solidFill>
+                  <a:schemeClr val="tx2">
+                    <a:lumMod val="90000"/>
+                  </a:schemeClr>
+                </a:solidFill>
+                <a:effectLst/>
+              </a:rPr>
+              <a:t>Add a date input field for future predictions</a:t>
+            </a:r>
+          </a:p>
+          <a:p>
+            <a:pPr marL="342900" marR="0" lvl="0" indent="-342900" algn="l" defTabSz="914400" rtl="0" eaLnBrk="0" fontAlgn="base" latinLnBrk="0" hangingPunct="0">
+              <a:lnSpc>
+                <a:spcPct val="100000"/>
+              </a:lnSpc>
+              <a:spcBef>
+                <a:spcPct val="0"/>
+              </a:spcBef>
+              <a:spcAft>
+                <a:spcPct val="0"/>
+              </a:spcAft>
+              <a:buClrTx/>
+              <a:buSzTx/>
+              <a:buFont typeface="Arial" panose="020B0604020202020204" pitchFamily="34" charset="0"/>
+              <a:buChar char="•"/>
+              <a:tabLst/>
+            </a:pPr>
+            <a:r>
+              <a:rPr kumimoji="0" lang="en-US" altLang="en-US" sz="2600" b="0" i="0" u="none" strike="noStrike" cap="none" normalizeH="0" baseline="0" dirty="0">
+                <a:ln>
+                  <a:noFill/>
+                </a:ln>
+                <a:solidFill>
+                  <a:schemeClr val="tx2">
+                    <a:lumMod val="90000"/>
+                  </a:schemeClr>
+                </a:solidFill>
+                <a:effectLst/>
+              </a:rPr>
+              <a:t>Separate validation set</a:t>
+            </a:r>
+          </a:p>
+          <a:p>
+            <a:pPr marL="342900" marR="0" lvl="0" indent="-342900" algn="l" defTabSz="914400" rtl="0" eaLnBrk="0" fontAlgn="base" latinLnBrk="0" hangingPunct="0">
+              <a:lnSpc>
+                <a:spcPct val="100000"/>
+              </a:lnSpc>
+              <a:spcBef>
+                <a:spcPct val="0"/>
+              </a:spcBef>
+              <a:spcAft>
+                <a:spcPct val="0"/>
+              </a:spcAft>
+              <a:buClrTx/>
+              <a:buSzTx/>
+              <a:buFont typeface="Arial" panose="020B0604020202020204" pitchFamily="34" charset="0"/>
+              <a:buChar char="•"/>
+              <a:tabLst/>
+            </a:pPr>
+            <a:r>
+              <a:rPr lang="en-US" altLang="en-US" sz="2600" dirty="0">
+                <a:solidFill>
+                  <a:schemeClr val="tx2">
+                    <a:lumMod val="90000"/>
+                  </a:schemeClr>
+                </a:solidFill>
+              </a:rPr>
+              <a:t>Use Dropout to prevent overfitting</a:t>
+            </a:r>
+          </a:p>
+          <a:p>
+            <a:pPr marL="342900" marR="0" lvl="0" indent="-342900" algn="l" defTabSz="914400" rtl="0" eaLnBrk="0" fontAlgn="base" latinLnBrk="0" hangingPunct="0">
+              <a:lnSpc>
+                <a:spcPct val="100000"/>
+              </a:lnSpc>
+              <a:spcBef>
+                <a:spcPct val="0"/>
+              </a:spcBef>
+              <a:spcAft>
+                <a:spcPct val="0"/>
+              </a:spcAft>
+              <a:buClrTx/>
+              <a:buSzTx/>
+              <a:buFont typeface="Arial" panose="020B0604020202020204" pitchFamily="34" charset="0"/>
+              <a:buChar char="•"/>
+              <a:tabLst/>
+            </a:pPr>
+            <a:r>
+              <a:rPr kumimoji="0" lang="en-US" altLang="en-US" sz="2600" b="0" i="0" u="none" strike="noStrike" cap="none" normalizeH="0" baseline="0" dirty="0">
+                <a:ln>
+                  <a:noFill/>
+                </a:ln>
+                <a:solidFill>
+                  <a:schemeClr val="tx2">
+                    <a:lumMod val="90000"/>
+                  </a:schemeClr>
+                </a:solidFill>
+                <a:effectLst/>
+              </a:rPr>
+              <a:t>Use Early Stopping to prevent overfitting</a:t>
+            </a:r>
+            <a:endParaRPr lang="en-US" altLang="en-US" sz="2600" dirty="0">
+              <a:solidFill>
+                <a:schemeClr val="tx2">
+                  <a:lumMod val="90000"/>
+                </a:schemeClr>
+              </a:solidFill>
+            </a:endParaRPr>
+          </a:p>
+          <a:p>
+            <a:pPr marL="342900" marR="0" lvl="0" indent="-342900" algn="l" defTabSz="914400" rtl="0" eaLnBrk="0" fontAlgn="base" latinLnBrk="0" hangingPunct="0">
+              <a:lnSpc>
+                <a:spcPct val="100000"/>
+              </a:lnSpc>
+              <a:spcBef>
+                <a:spcPct val="0"/>
+              </a:spcBef>
+              <a:spcAft>
+                <a:spcPct val="0"/>
+              </a:spcAft>
+              <a:buClrTx/>
+              <a:buSzTx/>
+              <a:buFont typeface="Arial" panose="020B0604020202020204" pitchFamily="34" charset="0"/>
+              <a:buChar char="•"/>
+              <a:tabLst/>
+            </a:pPr>
+            <a:r>
+              <a:rPr lang="en-US" altLang="en-US" sz="2600" dirty="0">
+                <a:solidFill>
+                  <a:schemeClr val="tx2">
+                    <a:lumMod val="90000"/>
+                  </a:schemeClr>
+                </a:solidFill>
+              </a:rPr>
+              <a:t>More features – technical indicators</a:t>
+            </a:r>
+          </a:p>
+          <a:p>
+            <a:pPr marL="342900" marR="0" lvl="0" indent="-342900" algn="l" defTabSz="914400" rtl="0" eaLnBrk="0" fontAlgn="base" latinLnBrk="0" hangingPunct="0">
+              <a:lnSpc>
+                <a:spcPct val="100000"/>
+              </a:lnSpc>
+              <a:spcBef>
+                <a:spcPct val="0"/>
+              </a:spcBef>
+              <a:spcAft>
+                <a:spcPct val="0"/>
+              </a:spcAft>
+              <a:buClrTx/>
+              <a:buSzTx/>
+              <a:buFont typeface="Arial" panose="020B0604020202020204" pitchFamily="34" charset="0"/>
+              <a:buChar char="•"/>
+              <a:tabLst/>
+            </a:pPr>
+            <a:r>
+              <a:rPr kumimoji="0" lang="en-US" altLang="en-US" sz="2600" b="0" i="0" u="none" strike="noStrike" cap="none" normalizeH="0" baseline="0" dirty="0">
+                <a:ln>
+                  <a:noFill/>
+                </a:ln>
+                <a:solidFill>
+                  <a:schemeClr val="tx2">
+                    <a:lumMod val="90000"/>
+                  </a:schemeClr>
+                </a:solidFill>
+                <a:effectLst/>
+              </a:rPr>
+              <a:t>Use other RNN, CNN Models</a:t>
+            </a:r>
+          </a:p>
+          <a:p>
+            <a:pPr marL="342900" marR="0" lvl="0" indent="-342900" algn="l" defTabSz="914400" rtl="0" eaLnBrk="0" fontAlgn="base" latinLnBrk="0" hangingPunct="0">
+              <a:lnSpc>
+                <a:spcPct val="100000"/>
+              </a:lnSpc>
+              <a:spcBef>
+                <a:spcPct val="0"/>
+              </a:spcBef>
+              <a:spcAft>
+                <a:spcPct val="0"/>
+              </a:spcAft>
+              <a:buClrTx/>
+              <a:buSzTx/>
+              <a:buFont typeface="Arial" panose="020B0604020202020204" pitchFamily="34" charset="0"/>
+              <a:buChar char="•"/>
+              <a:tabLst/>
+            </a:pPr>
+            <a:r>
+              <a:rPr lang="en-US" altLang="en-US" sz="2600" dirty="0">
+                <a:solidFill>
+                  <a:schemeClr val="tx2">
+                    <a:lumMod val="90000"/>
+                  </a:schemeClr>
+                </a:solidFill>
+              </a:rPr>
+              <a:t>Try ensemble methods like Random Forest</a:t>
+            </a:r>
+          </a:p>
+          <a:p>
+            <a:pPr marL="342900" marR="0" lvl="0" indent="-342900" algn="l" defTabSz="914400" rtl="0" eaLnBrk="0" fontAlgn="base" latinLnBrk="0" hangingPunct="0">
+              <a:lnSpc>
+                <a:spcPct val="100000"/>
+              </a:lnSpc>
+              <a:spcBef>
+                <a:spcPct val="0"/>
+              </a:spcBef>
+              <a:spcAft>
+                <a:spcPct val="0"/>
+              </a:spcAft>
+              <a:buClrTx/>
+              <a:buSzTx/>
+              <a:buFont typeface="Arial" panose="020B0604020202020204" pitchFamily="34" charset="0"/>
+              <a:buChar char="•"/>
+              <a:tabLst/>
+            </a:pPr>
+            <a:r>
+              <a:rPr kumimoji="0" lang="en-US" altLang="en-US" sz="2600" b="0" i="0" u="none" strike="noStrike" cap="none" normalizeH="0" baseline="0" dirty="0">
+                <a:ln>
+                  <a:noFill/>
+                </a:ln>
+                <a:solidFill>
+                  <a:schemeClr val="tx2">
+                    <a:lumMod val="90000"/>
+                  </a:schemeClr>
+                </a:solidFill>
+                <a:effectLst/>
+              </a:rPr>
+              <a:t>Optimize hyperparameters – learning rate, batch si</a:t>
+            </a:r>
+            <a:r>
+              <a:rPr lang="en-US" altLang="en-US" sz="2600" dirty="0">
+                <a:solidFill>
+                  <a:schemeClr val="tx2">
+                    <a:lumMod val="90000"/>
+                  </a:schemeClr>
+                </a:solidFill>
+              </a:rPr>
+              <a:t>ze, # of epochs</a:t>
+            </a:r>
+          </a:p>
+          <a:p>
+            <a:pPr marL="342900" marR="0" lvl="0" indent="-342900" algn="l" defTabSz="914400" rtl="0" eaLnBrk="0" fontAlgn="base" latinLnBrk="0" hangingPunct="0">
+              <a:lnSpc>
+                <a:spcPct val="100000"/>
+              </a:lnSpc>
+              <a:spcBef>
+                <a:spcPct val="0"/>
+              </a:spcBef>
+              <a:spcAft>
+                <a:spcPct val="0"/>
+              </a:spcAft>
+              <a:buClrTx/>
+              <a:buSzTx/>
+              <a:buFont typeface="Arial" panose="020B0604020202020204" pitchFamily="34" charset="0"/>
+              <a:buChar char="•"/>
+              <a:tabLst/>
+            </a:pPr>
+            <a:r>
+              <a:rPr kumimoji="0" lang="en-US" altLang="en-US" sz="2600" b="0" i="0" u="none" strike="noStrike" cap="none" normalizeH="0" baseline="0" dirty="0">
+                <a:ln>
+                  <a:noFill/>
+                </a:ln>
+                <a:solidFill>
+                  <a:schemeClr val="tx2">
+                    <a:lumMod val="90000"/>
+                  </a:schemeClr>
+                </a:solidFill>
+                <a:effectLst/>
+              </a:rPr>
+              <a:t>Try using Loss Function Mean Absolute Percentage Error (MAPE) to evaluate model</a:t>
+            </a:r>
+          </a:p>
+          <a:p>
+            <a:pPr marL="342900" marR="0" lvl="0" indent="-342900" algn="l" defTabSz="914400" rtl="0" eaLnBrk="0" fontAlgn="base" latinLnBrk="0" hangingPunct="0">
+              <a:lnSpc>
+                <a:spcPct val="100000"/>
+              </a:lnSpc>
+              <a:spcBef>
+                <a:spcPct val="0"/>
+              </a:spcBef>
+              <a:spcAft>
+                <a:spcPct val="0"/>
+              </a:spcAft>
+              <a:buClrTx/>
+              <a:buSzTx/>
+              <a:buFont typeface="Arial" panose="020B0604020202020204" pitchFamily="34" charset="0"/>
+              <a:buChar char="•"/>
+              <a:tabLst/>
+            </a:pPr>
+            <a:r>
+              <a:rPr lang="en-US" altLang="en-US" sz="2600" dirty="0">
+                <a:solidFill>
+                  <a:schemeClr val="tx2">
+                    <a:lumMod val="90000"/>
+                  </a:schemeClr>
+                </a:solidFill>
+              </a:rPr>
+              <a:t>Try different activation functions like Sigmoid or Tanh</a:t>
+            </a:r>
+            <a:endParaRPr kumimoji="0" lang="en-US" altLang="en-US" sz="2600" b="0" i="0" u="none" strike="noStrike" cap="none" normalizeH="0" baseline="0" dirty="0">
+              <a:ln>
+                <a:noFill/>
+              </a:ln>
+              <a:solidFill>
+                <a:schemeClr val="tx2">
+                  <a:lumMod val="90000"/>
+                </a:schemeClr>
+              </a:solidFill>
+              <a:effectLst/>
+            </a:endParaRPr>
+          </a:p>
+          <a:p>
+            <a:pPr marL="0" marR="0" lvl="0" indent="0" algn="l" defTabSz="914400" rtl="0" eaLnBrk="0" fontAlgn="base" latinLnBrk="0" hangingPunct="0">
+              <a:lnSpc>
+                <a:spcPct val="100000"/>
+              </a:lnSpc>
+              <a:spcBef>
+                <a:spcPct val="0"/>
+              </a:spcBef>
+              <a:spcAft>
+                <a:spcPct val="0"/>
+              </a:spcAft>
+              <a:buClrTx/>
+              <a:buSzTx/>
+              <a:buFontTx/>
+              <a:buNone/>
+              <a:tabLst/>
+            </a:pPr>
+            <a:endParaRPr kumimoji="0" lang="en-US" altLang="en-US" sz="1800" b="0" i="0" u="none" strike="noStrike" cap="none" normalizeH="0" baseline="0" dirty="0">
+              <a:ln>
+                <a:noFill/>
+              </a:ln>
+              <a:solidFill>
+                <a:schemeClr val="tx1"/>
+              </a:solidFill>
+              <a:effectLst/>
+              <a:latin typeface="Arial" panose="020B0604020202020204" pitchFamily="34" charset="0"/>
+            </a:endParaRPr>
+          </a:p>
+        </p:txBody>
+      </p:sp>
+      <p:pic>
+        <p:nvPicPr>
+          <p:cNvPr id="9" name="Picture 8" descr="Background pattern&#10;&#10;Description automatically generated">
+            <a:extLst>
+              <a:ext uri="{FF2B5EF4-FFF2-40B4-BE49-F238E27FC236}">
+                <a16:creationId xmlns:a16="http://schemas.microsoft.com/office/drawing/2014/main" id="{AFFEDF0A-EED9-F68D-EB16-87497A30F5EF}"/>
+              </a:ext>
+            </a:extLst>
+          </p:cNvPr>
+          <p:cNvPicPr>
+            <a:picLocks noChangeAspect="1"/>
+          </p:cNvPicPr>
+          <p:nvPr/>
+        </p:nvPicPr>
+        <p:blipFill>
+          <a:blip r:embed="rId3">
+            <a:extLst>
+              <a:ext uri="{28A0092B-C50C-407E-A947-70E740481C1C}">
+                <a14:useLocalDpi xmlns:a14="http://schemas.microsoft.com/office/drawing/2010/main" val="0"/>
+              </a:ext>
+              <a:ext uri="{837473B0-CC2E-450A-ABE3-18F120FF3D39}">
+                <a1611:picAttrSrcUrl xmlns:a1611="http://schemas.microsoft.com/office/drawing/2016/11/main" r:id="rId4"/>
+              </a:ext>
+            </a:extLst>
+          </a:blip>
+          <a:stretch>
+            <a:fillRect/>
+          </a:stretch>
+        </p:blipFill>
+        <p:spPr>
+          <a:xfrm>
+            <a:off x="8063772" y="1121325"/>
+            <a:ext cx="3121152" cy="2081784"/>
+          </a:xfrm>
+          <a:prstGeom prst="rect">
+            <a:avLst/>
+          </a:prstGeom>
+        </p:spPr>
+      </p:pic>
+      <p:sp>
+        <p:nvSpPr>
+          <p:cNvPr id="10" name="TextBox 9">
+            <a:extLst>
+              <a:ext uri="{FF2B5EF4-FFF2-40B4-BE49-F238E27FC236}">
+                <a16:creationId xmlns:a16="http://schemas.microsoft.com/office/drawing/2014/main" id="{44C281EF-5C34-BE1E-DF86-B505DEA5A92F}"/>
+              </a:ext>
+            </a:extLst>
+          </p:cNvPr>
+          <p:cNvSpPr txBox="1"/>
+          <p:nvPr/>
+        </p:nvSpPr>
+        <p:spPr>
+          <a:xfrm>
+            <a:off x="8063772" y="3203109"/>
+            <a:ext cx="3121152" cy="369332"/>
+          </a:xfrm>
+          <a:prstGeom prst="rect">
+            <a:avLst/>
+          </a:prstGeom>
+          <a:noFill/>
+        </p:spPr>
+        <p:txBody>
+          <a:bodyPr wrap="square" rtlCol="0">
+            <a:spAutoFit/>
+          </a:bodyPr>
+          <a:lstStyle/>
+          <a:p>
+            <a:r>
+              <a:rPr lang="en-US" sz="900">
+                <a:hlinkClick r:id="rId4" tooltip="https://technofaq.org/posts/2020/09/the-fashion-of-the-future-what-will-tech-bring-next/"/>
+              </a:rPr>
+              <a:t>This Photo</a:t>
+            </a:r>
+            <a:r>
+              <a:rPr lang="en-US" sz="900"/>
+              <a:t> by Unknown Author is licensed under </a:t>
+            </a:r>
+            <a:r>
+              <a:rPr lang="en-US" sz="900">
+                <a:hlinkClick r:id="rId5" tooltip="https://creativecommons.org/licenses/by-nc-sa/3.0/"/>
+              </a:rPr>
+              <a:t>CC BY-SA-NC</a:t>
+            </a:r>
+            <a:endParaRPr lang="en-US" sz="900"/>
+          </a:p>
+        </p:txBody>
+      </p:sp>
+    </p:spTree>
+    <p:extLst>
+      <p:ext uri="{BB962C8B-B14F-4D97-AF65-F5344CB8AC3E}">
+        <p14:creationId xmlns:p14="http://schemas.microsoft.com/office/powerpoint/2010/main" val="3026855493"/>
+      </p:ext>
+    </p:extLst>
+  </p:cSld>
+  <p:clrMapOvr>
+    <a:masterClrMapping/>
+  </p:clrMapOvr>
+</p:sld>
+</file>
+
+<file path=ppt/slides/slide14.xml><?xml version="1.0" encoding="utf-8"?>
+<p:sld xmlns:a="http://schemas.openxmlformats.org/drawingml/2006/main" xmlns:r="http://schemas.openxmlformats.org/officeDocument/2006/relationships" xmlns:p="http://schemas.openxmlformats.org/presentationml/2006/main">
+  <p:cSld>
+    <p:spTree>
+      <p:nvGrpSpPr>
+        <p:cNvPr id="1" name=""/>
+        <p:cNvGrpSpPr/>
+        <p:nvPr/>
+      </p:nvGrpSpPr>
+      <p:grpSpPr>
+        <a:xfrm>
+          <a:off x="0" y="0"/>
+          <a:ext cx="0" cy="0"/>
+          <a:chOff x="0" y="0"/>
+          <a:chExt cx="0" cy="0"/>
+        </a:xfrm>
+      </p:grpSpPr>
+      <p:sp>
+        <p:nvSpPr>
+          <p:cNvPr id="2" name="Title 1">
+            <a:extLst>
+              <a:ext uri="{FF2B5EF4-FFF2-40B4-BE49-F238E27FC236}">
+                <a16:creationId xmlns:a16="http://schemas.microsoft.com/office/drawing/2014/main" id="{F6FD8A51-5624-DE7A-1CF6-EEE978C474D5}"/>
+              </a:ext>
+            </a:extLst>
+          </p:cNvPr>
+          <p:cNvSpPr txBox="1">
+            <a:spLocks/>
+          </p:cNvSpPr>
+          <p:nvPr/>
+        </p:nvSpPr>
+        <p:spPr>
+          <a:xfrm>
+            <a:off x="913795" y="609600"/>
+            <a:ext cx="10353762" cy="970450"/>
+          </a:xfrm>
+          <a:prstGeom prst="rect">
+            <a:avLst/>
+          </a:prstGeom>
+        </p:spPr>
+        <p:txBody>
+          <a:bodyPr/>
+          <a:lstStyle>
+            <a:lvl1pPr algn="ctr" defTabSz="457200" rtl="0" eaLnBrk="1" latinLnBrk="0" hangingPunct="1">
+              <a:spcBef>
+                <a:spcPct val="0"/>
+              </a:spcBef>
+              <a:buNone/>
+              <a:defRPr sz="4000" kern="1200">
+                <a:ln>
+                  <a:solidFill>
+                    <a:schemeClr val="bg1">
+                      <a:lumMod val="75000"/>
+                      <a:lumOff val="25000"/>
+                      <a:alpha val="10000"/>
+                    </a:schemeClr>
+                  </a:solidFill>
+                </a:ln>
+                <a:solidFill>
+                  <a:schemeClr val="tx2"/>
+                </a:solidFill>
+                <a:effectLst>
+                  <a:outerShdw blurRad="9525" dist="25400" dir="14640000" algn="tl" rotWithShape="0">
+                    <a:schemeClr val="bg1">
+                      <a:alpha val="30000"/>
+                    </a:schemeClr>
+                  </a:outerShdw>
+                </a:effectLst>
+                <a:latin typeface="+mj-lt"/>
+                <a:ea typeface="+mj-ea"/>
+                <a:cs typeface="Trebuchet MS"/>
+              </a:defRPr>
+            </a:lvl1pPr>
+            <a:lvl2pPr eaLnBrk="1" hangingPunct="1">
+              <a:defRPr>
+                <a:solidFill>
+                  <a:schemeClr val="tx2"/>
+                </a:solidFill>
+              </a:defRPr>
+            </a:lvl2pPr>
+            <a:lvl3pPr eaLnBrk="1" hangingPunct="1">
+              <a:defRPr>
+                <a:solidFill>
+                  <a:schemeClr val="tx2"/>
+                </a:solidFill>
+              </a:defRPr>
+            </a:lvl3pPr>
+            <a:lvl4pPr eaLnBrk="1" hangingPunct="1">
+              <a:defRPr>
+                <a:solidFill>
+                  <a:schemeClr val="tx2"/>
+                </a:solidFill>
+              </a:defRPr>
+            </a:lvl4pPr>
+            <a:lvl5pPr eaLnBrk="1" hangingPunct="1">
+              <a:defRPr>
+                <a:solidFill>
+                  <a:schemeClr val="tx2"/>
+                </a:solidFill>
+              </a:defRPr>
+            </a:lvl5pPr>
+            <a:lvl6pPr eaLnBrk="1" hangingPunct="1">
+              <a:defRPr>
+                <a:solidFill>
+                  <a:schemeClr val="tx2"/>
+                </a:solidFill>
+              </a:defRPr>
+            </a:lvl6pPr>
+            <a:lvl7pPr eaLnBrk="1" hangingPunct="1">
+              <a:defRPr>
+                <a:solidFill>
+                  <a:schemeClr val="tx2"/>
+                </a:solidFill>
+              </a:defRPr>
+            </a:lvl7pPr>
+            <a:lvl8pPr eaLnBrk="1" hangingPunct="1">
+              <a:defRPr>
+                <a:solidFill>
+                  <a:schemeClr val="tx2"/>
+                </a:solidFill>
+              </a:defRPr>
+            </a:lvl8pPr>
+            <a:lvl9pPr eaLnBrk="1" hangingPunct="1">
+              <a:defRPr>
+                <a:solidFill>
+                  <a:schemeClr val="tx2"/>
+                </a:solidFill>
+              </a:defRPr>
+            </a:lvl9pPr>
+          </a:lstStyle>
+          <a:p>
+            <a:r>
+              <a:rPr lang="en-US" dirty="0">
+                <a:solidFill>
+                  <a:schemeClr val="bg2">
+                    <a:lumMod val="10000"/>
+                    <a:lumOff val="90000"/>
+                  </a:schemeClr>
+                </a:solidFill>
+                <a:effectLst/>
+                <a:latin typeface="Arial" panose="020B0604020202020204" pitchFamily="34" charset="0"/>
+                <a:ea typeface="Calibri" panose="020F0502020204030204" pitchFamily="34" charset="0"/>
+              </a:rPr>
               <a:t>Demonstration</a:t>
             </a:r>
             <a:endParaRPr lang="en-US" dirty="0">
@@ -11531,7 +12837,7 @@
     </p:spTree>
     <p:extLst>
       <p:ext uri="{BB962C8B-B14F-4D97-AF65-F5344CB8AC3E}">
-        <p14:creationId xmlns:p14="http://schemas.microsoft.com/office/powerpoint/2010/main" val="3026855493"/>
+        <p14:creationId xmlns:p14="http://schemas.microsoft.com/office/powerpoint/2010/main" val="2079342973"/>
       </p:ext>
     </p:extLst>
   </p:cSld>
@@ -11803,8 +13109,8 @@
         </p:nvSpPr>
         <p:spPr>
           <a:xfrm>
-            <a:off x="7857028" y="2885436"/>
-            <a:ext cx="4030172" cy="2633146"/>
+            <a:off x="7857028" y="1078523"/>
+            <a:ext cx="4030172" cy="4440059"/>
           </a:xfrm>
         </p:spPr>
         <p:txBody>
@@ -11819,9 +13125,12 @@
               </a:lnSpc>
             </a:pPr>
             <a:r>
+              <a:rPr lang="en-US" sz="4000" b="1" dirty="0"/>
+              <a:t>5 cryptocurrencies:</a:t>
+            </a:r>
+            <a:br>
               <a:rPr lang="en-US" sz="4000" dirty="0"/>
-              <a:t>5 cryptocurrencies:</a:t>
-            </a:r>
+            </a:br>
             <a:br>
               <a:rPr lang="en-US" sz="4000" dirty="0"/>
             </a:br>
@@ -12050,8 +13359,8 @@
         </p:nvSpPr>
         <p:spPr>
           <a:xfrm>
-            <a:off x="913795" y="1097280"/>
-            <a:ext cx="3256177" cy="4626863"/>
+            <a:off x="328246" y="1097280"/>
+            <a:ext cx="4360985" cy="4626863"/>
           </a:xfrm>
         </p:spPr>
         <p:txBody>
@@ -12094,7 +13403,7 @@
               </a:spcAft>
             </a:pPr>
             <a:r>
-              <a:rPr lang="en-US" sz="2400" dirty="0">
+              <a:rPr lang="en-US" sz="3600" dirty="0">
                 <a:solidFill>
                   <a:schemeClr val="tx2"/>
                 </a:solidFill>
@@ -12105,6 +13414,28 @@
               </a:rPr>
               <a:t>Purpose: </a:t>
             </a:r>
+          </a:p>
+          <a:p>
+            <a:pPr marL="457200" marR="0">
+              <a:lnSpc>
+                <a:spcPts val="1800"/>
+              </a:lnSpc>
+              <a:spcBef>
+                <a:spcPts val="0"/>
+              </a:spcBef>
+              <a:spcAft>
+                <a:spcPts val="0"/>
+              </a:spcAft>
+            </a:pPr>
+            <a:endParaRPr lang="en-US" sz="3600" dirty="0">
+              <a:solidFill>
+                <a:schemeClr val="tx2"/>
+              </a:solidFill>
+              <a:effectLst/>
+              <a:latin typeface="+mj-lt"/>
+              <a:ea typeface="Calibri" panose="020F0502020204030204" pitchFamily="34" charset="0"/>
+              <a:cs typeface="Times New Roman" panose="02020603050405020304" pitchFamily="18" charset="0"/>
+            </a:endParaRPr>
           </a:p>
           <a:p>
             <a:pPr marL="457200" marR="0" algn="l">
@@ -12140,7 +13471,7 @@
               </a:spcAft>
             </a:pPr>
             <a:r>
-              <a:rPr lang="en-US" sz="2400" dirty="0">
+              <a:rPr lang="en-US" sz="2800" dirty="0">
                 <a:solidFill>
                   <a:srgbClr val="0070C0"/>
                 </a:solidFill>
@@ -12163,7 +13494,7 @@
                 <a:spcPts val="0"/>
               </a:spcAft>
             </a:pPr>
-            <a:endParaRPr lang="en-US" sz="2400" dirty="0">
+            <a:endParaRPr lang="en-US" sz="2800" dirty="0">
               <a:effectLst/>
               <a:ea typeface="Calibri" panose="020F0502020204030204" pitchFamily="34" charset="0"/>
               <a:cs typeface="Times New Roman" panose="02020603050405020304" pitchFamily="18" charset="0"/>
@@ -12182,7 +13513,7 @@
               </a:spcAft>
             </a:pPr>
             <a:r>
-              <a:rPr lang="en-US" sz="2400" dirty="0">
+              <a:rPr lang="en-US" sz="2800" dirty="0">
                 <a:solidFill>
                   <a:srgbClr val="0070C0"/>
                 </a:solidFill>
@@ -12205,7 +13536,7 @@
                 <a:spcPts val="0"/>
               </a:spcAft>
             </a:pPr>
-            <a:endParaRPr lang="en-US" sz="2400" dirty="0">
+            <a:endParaRPr lang="en-US" sz="2800" dirty="0">
               <a:effectLst/>
               <a:ea typeface="Calibri" panose="020F0502020204030204" pitchFamily="34" charset="0"/>
               <a:cs typeface="Times New Roman" panose="02020603050405020304" pitchFamily="18" charset="0"/>
@@ -12224,7 +13555,7 @@
               </a:spcAft>
             </a:pPr>
             <a:r>
-              <a:rPr lang="en-US" sz="2400" dirty="0">
+              <a:rPr lang="en-US" sz="2800" dirty="0">
                 <a:solidFill>
                   <a:srgbClr val="0070C0"/>
                 </a:solidFill>
@@ -12247,7 +13578,7 @@
                 <a:spcPts val="0"/>
               </a:spcAft>
             </a:pPr>
-            <a:endParaRPr lang="en-US" sz="2400" dirty="0">
+            <a:endParaRPr lang="en-US" sz="2800" dirty="0">
               <a:effectLst/>
               <a:ea typeface="Calibri" panose="020F0502020204030204" pitchFamily="34" charset="0"/>
               <a:cs typeface="Times New Roman" panose="02020603050405020304" pitchFamily="18" charset="0"/>
@@ -12266,7 +13597,7 @@
               </a:spcAft>
             </a:pPr>
             <a:r>
-              <a:rPr lang="en-US" sz="2400" dirty="0">
+              <a:rPr lang="en-US" sz="2800" dirty="0">
                 <a:solidFill>
                   <a:srgbClr val="0070C0"/>
                 </a:solidFill>
@@ -12276,7 +13607,7 @@
               </a:rPr>
               <a:t>Are there any trends that may be relevant?</a:t>
             </a:r>
-            <a:endParaRPr lang="en-US" sz="2400" dirty="0">
+            <a:endParaRPr lang="en-US" sz="2800" dirty="0">
               <a:effectLst/>
               <a:ea typeface="Calibri" panose="020F0502020204030204" pitchFamily="34" charset="0"/>
               <a:cs typeface="Times New Roman" panose="02020603050405020304" pitchFamily="18" charset="0"/>
@@ -12438,8 +13769,8 @@
         </p:nvSpPr>
         <p:spPr>
           <a:xfrm>
-            <a:off x="7890668" y="366150"/>
-            <a:ext cx="3905092" cy="6080370"/>
+            <a:off x="7433320" y="366150"/>
+            <a:ext cx="4362440" cy="6080370"/>
           </a:xfrm>
         </p:spPr>
         <p:txBody>
@@ -12460,7 +13791,7 @@
               </a:spcAft>
             </a:pPr>
             <a:r>
-              <a:rPr lang="en-US" sz="3000" dirty="0">
+              <a:rPr lang="en-US" sz="3600" b="1" dirty="0">
                 <a:solidFill>
                   <a:schemeClr val="tx2"/>
                 </a:solidFill>
@@ -12498,7 +13829,7 @@
               <a:buChar char="•"/>
             </a:pPr>
             <a:r>
-              <a:rPr lang="en-US" sz="2400" b="0" i="0" dirty="0">
+              <a:rPr lang="en-US" sz="2800" b="0" i="0" dirty="0">
                 <a:solidFill>
                   <a:srgbClr val="0070C0"/>
                 </a:solidFill>
@@ -12513,7 +13844,7 @@
               <a:buChar char="•"/>
             </a:pPr>
             <a:r>
-              <a:rPr lang="en-US" sz="2400" b="0" i="0" dirty="0">
+              <a:rPr lang="en-US" sz="2800" b="0" i="0" dirty="0">
                 <a:solidFill>
                   <a:srgbClr val="0070C0"/>
                 </a:solidFill>
@@ -12528,7 +13859,7 @@
               <a:buChar char="•"/>
             </a:pPr>
             <a:r>
-              <a:rPr lang="en-US" sz="2400" b="0" i="0" dirty="0">
+              <a:rPr lang="en-US" sz="2800" b="0" i="0" dirty="0">
                 <a:solidFill>
                   <a:srgbClr val="0070C0"/>
                 </a:solidFill>
@@ -12570,7 +13901,7 @@
         </p:blipFill>
         <p:spPr>
           <a:xfrm>
-            <a:off x="941080" y="1447248"/>
+            <a:off x="633529" y="1528033"/>
             <a:ext cx="6492240" cy="3651885"/>
           </a:xfrm>
           <a:prstGeom prst="rect">
@@ -12824,14 +14155,14 @@
           <p:nvPr>
             <p:extLst>
               <p:ext uri="{D42A27DB-BD31-4B8C-83A1-F6EECF244321}">
-                <p14:modId xmlns:p14="http://schemas.microsoft.com/office/powerpoint/2010/main" val="265871333"/>
+                <p14:modId xmlns:p14="http://schemas.microsoft.com/office/powerpoint/2010/main" val="1305520546"/>
               </p:ext>
             </p:extLst>
           </p:nvPr>
         </p:nvGraphicFramePr>
         <p:xfrm>
-          <a:off x="1454641" y="783590"/>
-          <a:ext cx="9362660" cy="5298897"/>
+          <a:off x="1454641" y="1151740"/>
+          <a:ext cx="9362660" cy="5338110"/>
         </p:xfrm>
         <a:graphic>
           <a:graphicData uri="http://schemas.openxmlformats.org/drawingml/2006/table">
@@ -12877,7 +14208,7 @@
                     <a:p>
                       <a:pPr algn="ctr"/>
                       <a:r>
-                        <a:rPr lang="en-US" dirty="0">
+                        <a:rPr lang="en-US" sz="2400" dirty="0">
                           <a:solidFill>
                             <a:schemeClr val="bg1"/>
                           </a:solidFill>
@@ -12895,7 +14226,7 @@
                     <a:p>
                       <a:pPr algn="ctr"/>
                       <a:r>
-                        <a:rPr lang="en-US" dirty="0">
+                        <a:rPr lang="en-US" sz="2400" dirty="0">
                           <a:solidFill>
                             <a:schemeClr val="bg1"/>
                           </a:solidFill>
@@ -12913,7 +14244,7 @@
                     <a:p>
                       <a:pPr algn="ctr"/>
                       <a:r>
-                        <a:rPr lang="en-US" dirty="0">
+                        <a:rPr lang="en-US" sz="2400" dirty="0">
                           <a:solidFill>
                             <a:schemeClr val="bg1"/>
                           </a:solidFill>
@@ -12931,7 +14262,7 @@
                     <a:p>
                       <a:pPr algn="ctr"/>
                       <a:r>
-                        <a:rPr lang="en-US" dirty="0">
+                        <a:rPr lang="en-US" sz="2400" dirty="0">
                           <a:solidFill>
                             <a:schemeClr val="bg1"/>
                           </a:solidFill>
@@ -12956,7 +14287,7 @@
                     <a:p>
                       <a:pPr algn="ctr"/>
                       <a:r>
-                        <a:rPr lang="en-US" dirty="0">
+                        <a:rPr lang="en-US" sz="2000" dirty="0">
                           <a:solidFill>
                             <a:schemeClr val="bg1"/>
                           </a:solidFill>
@@ -12974,7 +14305,7 @@
                     <a:p>
                       <a:pPr algn="ctr"/>
                       <a:r>
-                        <a:rPr lang="en-US" dirty="0">
+                        <a:rPr lang="en-US" sz="2000" dirty="0">
                           <a:solidFill>
                             <a:schemeClr val="bg1"/>
                           </a:solidFill>
@@ -12992,7 +14323,7 @@
                     <a:p>
                       <a:pPr algn="ctr"/>
                       <a:r>
-                        <a:rPr lang="en-US" sz="1800" b="0" i="0" kern="1200" dirty="0">
+                        <a:rPr lang="en-US" sz="2000" b="0" i="0" kern="1200" dirty="0">
                           <a:solidFill>
                             <a:schemeClr val="dk1"/>
                           </a:solidFill>
@@ -13003,7 +14334,7 @@
                         </a:rPr>
                         <a:t>TensorFlow</a:t>
                       </a:r>
-                      <a:endParaRPr lang="en-US" dirty="0">
+                      <a:endParaRPr lang="en-US" sz="2000" dirty="0">
                         <a:solidFill>
                           <a:schemeClr val="bg1"/>
                         </a:solidFill>
@@ -13019,7 +14350,7 @@
                     <a:p>
                       <a:pPr algn="ctr"/>
                       <a:r>
-                        <a:rPr lang="en-US" sz="1800" b="0" i="0" kern="1200" dirty="0">
+                        <a:rPr lang="en-US" sz="2000" b="0" i="0" kern="1200" dirty="0">
                           <a:solidFill>
                             <a:schemeClr val="dk1"/>
                           </a:solidFill>
@@ -13031,7 +14362,7 @@
                         <a:t> </a:t>
                       </a:r>
                       <a:r>
-                        <a:rPr lang="en-US" sz="1800" b="0" i="0" kern="1200" dirty="0" err="1">
+                        <a:rPr lang="en-US" sz="2000" b="0" i="0" kern="1200" dirty="0" err="1">
                           <a:solidFill>
                             <a:schemeClr val="dk1"/>
                           </a:solidFill>
@@ -13042,7 +14373,7 @@
                         </a:rPr>
                         <a:t>Coinmetrics</a:t>
                       </a:r>
-                      <a:endParaRPr lang="en-US" dirty="0">
+                      <a:endParaRPr lang="en-US" sz="2000" dirty="0">
                         <a:solidFill>
                           <a:schemeClr val="bg1"/>
                         </a:solidFill>
@@ -13065,7 +14396,7 @@
                     <a:p>
                       <a:pPr algn="ctr"/>
                       <a:r>
-                        <a:rPr lang="en-US" dirty="0">
+                        <a:rPr lang="en-US" sz="2000" dirty="0">
                           <a:solidFill>
                             <a:schemeClr val="bg1"/>
                           </a:solidFill>
@@ -13073,14 +14404,14 @@
                         <a:t>Google </a:t>
                       </a:r>
                       <a:r>
-                        <a:rPr lang="en-US" dirty="0" err="1">
+                        <a:rPr lang="en-US" sz="2000" dirty="0" err="1">
                           <a:solidFill>
                             <a:schemeClr val="bg1"/>
                           </a:solidFill>
                         </a:rPr>
                         <a:t>Colab</a:t>
                       </a:r>
-                      <a:endParaRPr lang="en-US" dirty="0">
+                      <a:endParaRPr lang="en-US" sz="2000" dirty="0">
                         <a:solidFill>
                           <a:schemeClr val="bg1"/>
                         </a:solidFill>
@@ -13112,14 +14443,14 @@
                         <a:defRPr/>
                       </a:pPr>
                       <a:r>
-                        <a:rPr lang="en-US" dirty="0" err="1">
+                        <a:rPr lang="en-US" sz="2000" dirty="0" err="1">
                           <a:solidFill>
                             <a:schemeClr val="bg1"/>
                           </a:solidFill>
                         </a:rPr>
                         <a:t>Javascript</a:t>
                       </a:r>
-                      <a:endParaRPr lang="en-US" dirty="0">
+                      <a:endParaRPr lang="en-US" sz="2000" dirty="0">
                         <a:solidFill>
                           <a:schemeClr val="bg1"/>
                         </a:solidFill>
@@ -13135,7 +14466,7 @@
                     <a:p>
                       <a:pPr algn="ctr"/>
                       <a:r>
-                        <a:rPr lang="en-US" sz="1800" b="0" i="0" kern="1200" dirty="0">
+                        <a:rPr lang="en-US" sz="2000" b="0" i="0" kern="1200" dirty="0">
                           <a:solidFill>
                             <a:schemeClr val="dk1"/>
                           </a:solidFill>
@@ -13146,7 +14477,7 @@
                         </a:rPr>
                         <a:t>Matplotlib</a:t>
                       </a:r>
-                      <a:endParaRPr lang="en-US" dirty="0">
+                      <a:endParaRPr lang="en-US" sz="2000" dirty="0">
                         <a:solidFill>
                           <a:schemeClr val="bg1"/>
                         </a:solidFill>
@@ -13162,7 +14493,7 @@
                     <a:p>
                       <a:pPr algn="ctr"/>
                       <a:r>
-                        <a:rPr lang="en-US" dirty="0">
+                        <a:rPr lang="en-US" sz="2000" dirty="0">
                           <a:solidFill>
                             <a:schemeClr val="bg1"/>
                           </a:solidFill>
@@ -13187,7 +14518,7 @@
                     <a:p>
                       <a:pPr algn="ctr"/>
                       <a:r>
-                        <a:rPr lang="en-US" dirty="0" err="1">
+                        <a:rPr lang="en-US" sz="2000" dirty="0" err="1">
                           <a:solidFill>
                             <a:schemeClr val="bg1"/>
                           </a:solidFill>
@@ -13195,7 +14526,7 @@
                         <a:t>Jupyter</a:t>
                       </a:r>
                       <a:r>
-                        <a:rPr lang="en-US" dirty="0">
+                        <a:rPr lang="en-US" sz="2000" dirty="0">
                           <a:solidFill>
                             <a:schemeClr val="bg1"/>
                           </a:solidFill>
@@ -13213,7 +14544,7 @@
                     <a:p>
                       <a:pPr algn="ctr"/>
                       <a:r>
-                        <a:rPr lang="en-US" dirty="0">
+                        <a:rPr lang="en-US" sz="2000" dirty="0">
                           <a:solidFill>
                             <a:schemeClr val="bg1"/>
                           </a:solidFill>
@@ -13231,7 +14562,7 @@
                     <a:p>
                       <a:pPr algn="ctr"/>
                       <a:r>
-                        <a:rPr lang="en-US" sz="1800" b="0" i="0" kern="1200" dirty="0">
+                        <a:rPr lang="en-US" sz="2000" b="0" i="0" kern="1200" dirty="0">
                           <a:solidFill>
                             <a:schemeClr val="dk1"/>
                           </a:solidFill>
@@ -13242,7 +14573,7 @@
                         </a:rPr>
                         <a:t>glob</a:t>
                       </a:r>
-                      <a:endParaRPr lang="en-US" dirty="0">
+                      <a:endParaRPr lang="en-US" sz="2000" dirty="0">
                         <a:solidFill>
                           <a:schemeClr val="bg1"/>
                         </a:solidFill>
@@ -13258,7 +14589,7 @@
                     <a:p>
                       <a:pPr algn="ctr"/>
                       <a:r>
-                        <a:rPr lang="en-US" dirty="0">
+                        <a:rPr lang="en-US" sz="2000" dirty="0">
                           <a:solidFill>
                             <a:schemeClr val="bg1"/>
                           </a:solidFill>
@@ -13283,7 +14614,7 @@
                     <a:p>
                       <a:pPr algn="ctr"/>
                       <a:r>
-                        <a:rPr lang="en-US" dirty="0">
+                        <a:rPr lang="en-US" sz="2000" dirty="0">
                           <a:solidFill>
                             <a:schemeClr val="bg1"/>
                           </a:solidFill>
@@ -13301,7 +14632,7 @@
                     <a:p>
                       <a:pPr algn="ctr"/>
                       <a:r>
-                        <a:rPr lang="en-US" dirty="0">
+                        <a:rPr lang="en-US" sz="2000" dirty="0">
                           <a:solidFill>
                             <a:schemeClr val="bg1"/>
                           </a:solidFill>
@@ -13319,7 +14650,7 @@
                     <a:p>
                       <a:pPr algn="ctr"/>
                       <a:r>
-                        <a:rPr lang="en-US" sz="1800" b="0" i="0" kern="1200" dirty="0" err="1">
+                        <a:rPr lang="en-US" sz="2000" b="0" i="0" kern="1200" dirty="0" err="1">
                           <a:solidFill>
                             <a:schemeClr val="dk1"/>
                           </a:solidFill>
@@ -13330,7 +14661,7 @@
                         </a:rPr>
                         <a:t>Numpy</a:t>
                       </a:r>
-                      <a:endParaRPr lang="en-US" dirty="0">
+                      <a:endParaRPr lang="en-US" sz="2000" dirty="0">
                         <a:solidFill>
                           <a:schemeClr val="bg1"/>
                         </a:solidFill>
@@ -13346,7 +14677,7 @@
                     <a:p>
                       <a:pPr algn="ctr"/>
                       <a:r>
-                        <a:rPr lang="en-US" dirty="0">
+                        <a:rPr lang="en-US" sz="2000" dirty="0">
                           <a:solidFill>
                             <a:schemeClr val="bg1"/>
                           </a:solidFill>
@@ -13371,14 +14702,14 @@
                     <a:p>
                       <a:pPr algn="ctr"/>
                       <a:r>
-                        <a:rPr lang="en-US" dirty="0" err="1">
+                        <a:rPr lang="en-US" sz="2000" dirty="0" err="1">
                           <a:solidFill>
                             <a:schemeClr val="bg1"/>
                           </a:solidFill>
                         </a:rPr>
                         <a:t>QuickDBD</a:t>
                       </a:r>
-                      <a:endParaRPr lang="en-US" dirty="0">
+                      <a:endParaRPr lang="en-US" sz="2000" dirty="0">
                         <a:solidFill>
                           <a:schemeClr val="bg1"/>
                         </a:solidFill>
@@ -13393,7 +14724,7 @@
                     <a:lstStyle/>
                     <a:p>
                       <a:pPr algn="ctr"/>
-                      <a:endParaRPr lang="en-US" dirty="0">
+                      <a:endParaRPr lang="en-US" sz="2000" dirty="0">
                         <a:solidFill>
                           <a:schemeClr val="bg1"/>
                         </a:solidFill>
@@ -13409,7 +14740,7 @@
                     <a:p>
                       <a:pPr algn="ctr"/>
                       <a:r>
-                        <a:rPr lang="en-US" sz="1800" b="0" i="0" kern="1200" dirty="0">
+                        <a:rPr lang="en-US" sz="2000" b="0" i="0" kern="1200" dirty="0">
                           <a:solidFill>
                             <a:schemeClr val="dk1"/>
                           </a:solidFill>
@@ -13420,7 +14751,7 @@
                         </a:rPr>
                         <a:t>Scikit-learn</a:t>
                       </a:r>
-                      <a:endParaRPr lang="en-US" dirty="0">
+                      <a:endParaRPr lang="en-US" sz="2000" dirty="0">
                         <a:solidFill>
                           <a:schemeClr val="bg1"/>
                         </a:solidFill>
@@ -13436,7 +14767,7 @@
                     <a:p>
                       <a:pPr algn="ctr"/>
                       <a:r>
-                        <a:rPr lang="en-US" dirty="0">
+                        <a:rPr lang="en-US" sz="2000" dirty="0">
                           <a:solidFill>
                             <a:schemeClr val="bg1"/>
                           </a:solidFill>
@@ -13460,7 +14791,7 @@
                     <a:lstStyle/>
                     <a:p>
                       <a:pPr algn="ctr"/>
-                      <a:endParaRPr lang="en-US" dirty="0">
+                      <a:endParaRPr lang="en-US" sz="2000" dirty="0">
                         <a:solidFill>
                           <a:schemeClr val="bg1"/>
                         </a:solidFill>
@@ -13475,7 +14806,7 @@
                     <a:lstStyle/>
                     <a:p>
                       <a:pPr algn="ctr"/>
-                      <a:endParaRPr lang="en-US" dirty="0">
+                      <a:endParaRPr lang="en-US" sz="2000" dirty="0">
                         <a:solidFill>
                           <a:schemeClr val="bg1"/>
                         </a:solidFill>
@@ -13491,7 +14822,7 @@
                     <a:p>
                       <a:pPr algn="ctr"/>
                       <a:r>
-                        <a:rPr lang="en-US" dirty="0">
+                        <a:rPr lang="en-US" sz="2000" dirty="0">
                           <a:solidFill>
                             <a:schemeClr val="bg1"/>
                           </a:solidFill>
@@ -13509,7 +14840,7 @@
                     <a:p>
                       <a:pPr algn="ctr"/>
                       <a:r>
-                        <a:rPr lang="en-US" dirty="0" err="1">
+                        <a:rPr lang="en-US" sz="2000" dirty="0" err="1">
                           <a:solidFill>
                             <a:schemeClr val="bg1"/>
                           </a:solidFill>
@@ -13517,7 +14848,7 @@
                         <a:t>Coindesk</a:t>
                       </a:r>
                       <a:r>
-                        <a:rPr lang="en-US" dirty="0">
+                        <a:rPr lang="en-US" sz="2000" dirty="0">
                           <a:solidFill>
                             <a:schemeClr val="bg1"/>
                           </a:solidFill>
@@ -13541,7 +14872,7 @@
                     <a:lstStyle/>
                     <a:p>
                       <a:pPr algn="ctr"/>
-                      <a:endParaRPr lang="en-US">
+                      <a:endParaRPr lang="en-US" sz="2000">
                         <a:solidFill>
                           <a:schemeClr val="bg1"/>
                         </a:solidFill>
@@ -13556,7 +14887,7 @@
                     <a:lstStyle/>
                     <a:p>
                       <a:pPr algn="ctr"/>
-                      <a:endParaRPr lang="en-US">
+                      <a:endParaRPr lang="en-US" sz="2000">
                         <a:solidFill>
                           <a:schemeClr val="bg1"/>
                         </a:solidFill>
@@ -13588,7 +14919,7 @@
                         <a:defRPr/>
                       </a:pPr>
                       <a:r>
-                        <a:rPr lang="en-US" sz="1800" b="0" i="0" kern="1200" dirty="0">
+                        <a:rPr lang="en-US" sz="2000" b="0" i="0" kern="1200" dirty="0">
                           <a:solidFill>
                             <a:schemeClr val="dk1"/>
                           </a:solidFill>
@@ -13599,7 +14930,7 @@
                         </a:rPr>
                         <a:t> Requests</a:t>
                       </a:r>
-                      <a:endParaRPr lang="en-US" dirty="0">
+                      <a:endParaRPr lang="en-US" sz="2000" dirty="0">
                         <a:solidFill>
                           <a:schemeClr val="bg1"/>
                         </a:solidFill>
@@ -13614,7 +14945,7 @@
                     <a:lstStyle/>
                     <a:p>
                       <a:pPr algn="ctr"/>
-                      <a:endParaRPr lang="en-US" dirty="0">
+                      <a:endParaRPr lang="en-US" sz="2000" dirty="0">
                         <a:solidFill>
                           <a:schemeClr val="bg1"/>
                         </a:solidFill>
@@ -13636,7 +14967,7 @@
                     <a:lstStyle/>
                     <a:p>
                       <a:pPr algn="ctr"/>
-                      <a:endParaRPr lang="en-US">
+                      <a:endParaRPr lang="en-US" sz="2000">
                         <a:solidFill>
                           <a:schemeClr val="bg1"/>
                         </a:solidFill>
@@ -13651,7 +14982,7 @@
                     <a:lstStyle/>
                     <a:p>
                       <a:pPr algn="ctr"/>
-                      <a:endParaRPr lang="en-US">
+                      <a:endParaRPr lang="en-US" sz="2000">
                         <a:solidFill>
                           <a:schemeClr val="bg1"/>
                         </a:solidFill>
@@ -13683,7 +15014,7 @@
                         <a:defRPr/>
                       </a:pPr>
                       <a:r>
-                        <a:rPr lang="en-US" dirty="0">
+                        <a:rPr lang="en-US" sz="2000" dirty="0">
                           <a:solidFill>
                             <a:schemeClr val="bg1"/>
                           </a:solidFill>
@@ -13700,7 +15031,7 @@
                     <a:lstStyle/>
                     <a:p>
                       <a:pPr algn="ctr"/>
-                      <a:endParaRPr lang="en-US" dirty="0">
+                      <a:endParaRPr lang="en-US" sz="2000" dirty="0">
                         <a:solidFill>
                           <a:schemeClr val="bg1"/>
                         </a:solidFill>
@@ -13722,7 +15053,7 @@
                     <a:lstStyle/>
                     <a:p>
                       <a:pPr algn="ctr"/>
-                      <a:endParaRPr lang="en-US">
+                      <a:endParaRPr lang="en-US" sz="2000" dirty="0">
                         <a:solidFill>
                           <a:schemeClr val="bg1"/>
                         </a:solidFill>
@@ -13737,7 +15068,7 @@
                     <a:lstStyle/>
                     <a:p>
                       <a:pPr algn="ctr"/>
-                      <a:endParaRPr lang="en-US">
+                      <a:endParaRPr lang="en-US" sz="2000">
                         <a:solidFill>
                           <a:schemeClr val="bg1"/>
                         </a:solidFill>
@@ -13769,7 +15100,7 @@
                         <a:defRPr/>
                       </a:pPr>
                       <a:r>
-                        <a:rPr lang="en-US" dirty="0">
+                        <a:rPr lang="en-US" sz="2000" dirty="0">
                           <a:solidFill>
                             <a:schemeClr val="bg1"/>
                           </a:solidFill>
@@ -13786,7 +15117,7 @@
                     <a:lstStyle/>
                     <a:p>
                       <a:pPr algn="ctr"/>
-                      <a:endParaRPr lang="en-US" dirty="0">
+                      <a:endParaRPr lang="en-US" sz="2000" dirty="0">
                         <a:solidFill>
                           <a:schemeClr val="bg1"/>
                         </a:solidFill>
@@ -13808,7 +15139,7 @@
                     <a:lstStyle/>
                     <a:p>
                       <a:pPr algn="ctr"/>
-                      <a:endParaRPr lang="en-US">
+                      <a:endParaRPr lang="en-US" sz="2000">
                         <a:solidFill>
                           <a:schemeClr val="bg1"/>
                         </a:solidFill>
@@ -13823,7 +15154,7 @@
                     <a:lstStyle/>
                     <a:p>
                       <a:pPr algn="ctr"/>
-                      <a:endParaRPr lang="en-US">
+                      <a:endParaRPr lang="en-US" sz="2000">
                         <a:solidFill>
                           <a:schemeClr val="bg1"/>
                         </a:solidFill>
@@ -13855,14 +15186,14 @@
                         <a:defRPr/>
                       </a:pPr>
                       <a:r>
-                        <a:rPr lang="en-US" dirty="0" err="1">
+                        <a:rPr lang="en-US" sz="2000" dirty="0" err="1">
                           <a:solidFill>
                             <a:schemeClr val="bg1"/>
                           </a:solidFill>
                         </a:rPr>
                         <a:t>Keras</a:t>
                       </a:r>
-                      <a:endParaRPr lang="en-US" dirty="0">
+                      <a:endParaRPr lang="en-US" sz="2000" dirty="0">
                         <a:solidFill>
                           <a:schemeClr val="bg1"/>
                         </a:solidFill>
@@ -13877,7 +15208,7 @@
                     <a:lstStyle/>
                     <a:p>
                       <a:pPr algn="ctr"/>
-                      <a:endParaRPr lang="en-US" dirty="0">
+                      <a:endParaRPr lang="en-US" sz="2000" dirty="0">
                         <a:solidFill>
                           <a:schemeClr val="bg1"/>
                         </a:solidFill>
@@ -13899,7 +15230,7 @@
                     <a:lstStyle/>
                     <a:p>
                       <a:pPr algn="ctr"/>
-                      <a:endParaRPr lang="en-US">
+                      <a:endParaRPr lang="en-US" sz="2000">
                         <a:solidFill>
                           <a:schemeClr val="bg1"/>
                         </a:solidFill>
@@ -13914,7 +15245,7 @@
                     <a:lstStyle/>
                     <a:p>
                       <a:pPr algn="ctr"/>
-                      <a:endParaRPr lang="en-US">
+                      <a:endParaRPr lang="en-US" sz="2000">
                         <a:solidFill>
                           <a:schemeClr val="bg1"/>
                         </a:solidFill>
@@ -13946,14 +15277,14 @@
                         <a:defRPr/>
                       </a:pPr>
                       <a:r>
-                        <a:rPr lang="en-US" dirty="0" err="1">
+                        <a:rPr lang="en-US" sz="2000" dirty="0" err="1">
                           <a:solidFill>
                             <a:schemeClr val="bg1"/>
                           </a:solidFill>
                         </a:rPr>
                         <a:t>DateTime</a:t>
                       </a:r>
-                      <a:endParaRPr lang="en-US" dirty="0">
+                      <a:endParaRPr lang="en-US" sz="2000" dirty="0">
                         <a:solidFill>
                           <a:schemeClr val="bg1"/>
                         </a:solidFill>
@@ -13968,7 +15299,7 @@
                     <a:lstStyle/>
                     <a:p>
                       <a:pPr algn="ctr"/>
-                      <a:endParaRPr lang="en-US" dirty="0">
+                      <a:endParaRPr lang="en-US" sz="2000" dirty="0">
                         <a:solidFill>
                           <a:schemeClr val="bg1"/>
                         </a:solidFill>
@@ -14141,7 +15472,7 @@
         </p:spPr>
         <p:txBody>
           <a:bodyPr vert="horz" lIns="91440" tIns="45720" rIns="91440" bIns="45720" rtlCol="0" anchor="ctr">
-            <a:normAutofit lnSpcReduction="10000"/>
+            <a:normAutofit fontScale="92500" lnSpcReduction="20000"/>
           </a:bodyPr>
           <a:lstStyle/>
           <a:p>
@@ -14150,34 +15481,31 @@
               <a:buChar char="•"/>
             </a:pPr>
             <a:r>
-              <a:rPr lang="en-US" sz="2000" b="0" i="0" dirty="0">
+              <a:rPr lang="en-US" sz="2400" b="0" i="0" dirty="0">
                 <a:solidFill>
                   <a:srgbClr val="0070C0"/>
                 </a:solidFill>
                 <a:effectLst/>
-                <a:latin typeface="-apple-system"/>
               </a:rPr>
               <a:t>Convert  csv to </a:t>
             </a:r>
             <a:r>
-              <a:rPr lang="en-US" sz="2000" b="0" i="0" dirty="0" err="1">
+              <a:rPr lang="en-US" sz="2400" b="0" i="0" dirty="0" err="1">
                 <a:solidFill>
                   <a:srgbClr val="0070C0"/>
                 </a:solidFill>
                 <a:effectLst/>
-                <a:latin typeface="-apple-system"/>
               </a:rPr>
               <a:t>DataFrame</a:t>
             </a:r>
             <a:r>
-              <a:rPr lang="en-US" sz="2000" b="0" i="0" dirty="0">
+              <a:rPr lang="en-US" sz="2400" b="0" i="0" dirty="0">
                 <a:solidFill>
                   <a:srgbClr val="0070C0"/>
                 </a:solidFill>
                 <a:effectLst/>
-                <a:latin typeface="-apple-system"/>
-              </a:rPr>
-              <a:t> using Glob</a:t>
+              </a:rPr>
+              <a:t> using glob</a:t>
             </a:r>
           </a:p>
           <a:p>
@@ -14186,31 +15514,28 @@
               <a:buChar char="•"/>
             </a:pPr>
             <a:r>
-              <a:rPr lang="en-US" dirty="0">
+              <a:rPr lang="en-US" sz="2400" dirty="0">
                 <a:solidFill>
                   <a:srgbClr val="0070C0"/>
                 </a:solidFill>
                 <a:effectLst/>
-                <a:latin typeface="-apple-system"/>
               </a:rPr>
               <a:t>Combine into single </a:t>
             </a:r>
             <a:r>
-              <a:rPr lang="en-US" dirty="0" err="1">
+              <a:rPr lang="en-US" sz="2400" dirty="0" err="1">
                 <a:solidFill>
                   <a:srgbClr val="0070C0"/>
                 </a:solidFill>
                 <a:effectLst/>
-                <a:latin typeface="-apple-system"/>
               </a:rPr>
               <a:t>DataFrame</a:t>
             </a:r>
-            <a:endParaRPr lang="en-US" dirty="0">
+            <a:endParaRPr lang="en-US" sz="2400" dirty="0">
               <a:solidFill>
                 <a:srgbClr val="0070C0"/>
               </a:solidFill>
               <a:effectLst/>
-              <a:latin typeface="-apple-system"/>
             </a:endParaRPr>
           </a:p>
           <a:p>
@@ -14219,31 +15544,28 @@
               <a:buChar char="•"/>
             </a:pPr>
             <a:r>
-              <a:rPr lang="en-US" dirty="0">
+              <a:rPr lang="en-US" sz="2400" dirty="0">
                 <a:solidFill>
                   <a:srgbClr val="0070C0"/>
                 </a:solidFill>
                 <a:effectLst/>
-                <a:latin typeface="-apple-system"/>
               </a:rPr>
               <a:t>Convert </a:t>
             </a:r>
             <a:r>
-              <a:rPr lang="en-US" dirty="0" err="1">
+              <a:rPr lang="en-US" sz="2400" dirty="0" err="1">
                 <a:solidFill>
                   <a:srgbClr val="0070C0"/>
                 </a:solidFill>
                 <a:effectLst/>
-                <a:latin typeface="-apple-system"/>
               </a:rPr>
               <a:t>DataTypes</a:t>
             </a:r>
-            <a:endParaRPr lang="en-US" dirty="0">
+            <a:endParaRPr lang="en-US" sz="2400" dirty="0">
               <a:solidFill>
                 <a:srgbClr val="0070C0"/>
               </a:solidFill>
               <a:effectLst/>
-              <a:latin typeface="-apple-system"/>
             </a:endParaRPr>
           </a:p>
           <a:p>
@@ -14252,12 +15574,11 @@
               <a:buChar char="•"/>
             </a:pPr>
             <a:r>
-              <a:rPr lang="en-US" dirty="0">
+              <a:rPr lang="en-US" sz="2400" dirty="0">
                 <a:solidFill>
                   <a:srgbClr val="0070C0"/>
                 </a:solidFill>
                 <a:effectLst/>
-                <a:latin typeface="-apple-system"/>
               </a:rPr>
               <a:t>Drop Nan &amp; Duplicates</a:t>
             </a:r>
@@ -14268,12 +15589,11 @@
               <a:buChar char="•"/>
             </a:pPr>
             <a:r>
-              <a:rPr lang="en-US" dirty="0">
+              <a:rPr lang="en-US" sz="2400" dirty="0">
                 <a:solidFill>
                   <a:srgbClr val="0070C0"/>
                 </a:solidFill>
                 <a:effectLst/>
-                <a:latin typeface="-apple-system"/>
               </a:rPr>
               <a:t>Export to CSV</a:t>
             </a:r>
@@ -14284,32 +15604,29 @@
               <a:buChar char="•"/>
             </a:pPr>
             <a:r>
-              <a:rPr lang="en-US" dirty="0">
+              <a:rPr lang="en-US" sz="2400" dirty="0">
                 <a:solidFill>
                   <a:srgbClr val="0070C0"/>
                 </a:solidFill>
                 <a:effectLst/>
-                <a:latin typeface="-apple-system"/>
               </a:rPr>
               <a:t>Create new </a:t>
             </a:r>
             <a:r>
-              <a:rPr lang="en-US" dirty="0" err="1">
+              <a:rPr lang="en-US" sz="2400" dirty="0" err="1">
                 <a:solidFill>
                   <a:srgbClr val="0070C0"/>
                 </a:solidFill>
                 <a:effectLst/>
-                <a:latin typeface="-apple-system"/>
               </a:rPr>
               <a:t>DataFrame</a:t>
             </a:r>
             <a:r>
-              <a:rPr lang="en-US" dirty="0">
+              <a:rPr lang="en-US" sz="2400" dirty="0">
                 <a:solidFill>
                   <a:srgbClr val="0070C0"/>
                 </a:solidFill>
                 <a:effectLst/>
-                <a:latin typeface="-apple-system"/>
               </a:rPr>
               <a:t> w/ selected columns</a:t>
             </a:r>
@@ -14320,21 +15637,19 @@
               <a:buChar char="•"/>
             </a:pPr>
             <a:r>
-              <a:rPr lang="en-US" dirty="0">
+              <a:rPr lang="en-US" sz="2400" dirty="0">
                 <a:solidFill>
                   <a:srgbClr val="0070C0"/>
                 </a:solidFill>
                 <a:effectLst/>
-                <a:latin typeface="-apple-system"/>
               </a:rPr>
               <a:t>Calculate % change</a:t>
             </a:r>
-            <a:endParaRPr lang="en-US" sz="2000" b="0" i="0" dirty="0">
+            <a:endParaRPr lang="en-US" sz="2400" b="0" i="0" dirty="0">
               <a:solidFill>
                 <a:srgbClr val="0070C0"/>
               </a:solidFill>
               <a:effectLst/>
-              <a:latin typeface="-apple-system"/>
             </a:endParaRPr>
           </a:p>
           <a:p>
@@ -14452,8 +15767,8 @@
         </p:nvSpPr>
         <p:spPr>
           <a:xfrm>
-            <a:off x="913795" y="1097280"/>
-            <a:ext cx="3256177" cy="4626863"/>
+            <a:off x="539263" y="1097280"/>
+            <a:ext cx="3172903" cy="4626863"/>
           </a:xfrm>
         </p:spPr>
         <p:txBody>
@@ -14462,20 +15777,20 @@
           </a:bodyPr>
           <a:lstStyle/>
           <a:p>
-            <a:r>
-              <a:rPr lang="en-US" sz="2600" dirty="0"/>
+            <a:pPr algn="l"/>
+            <a:r>
+              <a:rPr lang="en-US" sz="3600" dirty="0"/>
               <a:t>Market Type:</a:t>
             </a:r>
           </a:p>
           <a:p>
             <a:pPr algn="l"/>
             <a:r>
-              <a:rPr lang="en-US" dirty="0">
+              <a:rPr lang="en-US" sz="2800" dirty="0">
                 <a:solidFill>
                   <a:srgbClr val="0070C0"/>
                 </a:solidFill>
                 <a:effectLst/>
-                <a:latin typeface="Arial" panose="020B0604020202020204" pitchFamily="34" charset="0"/>
                 <a:ea typeface="Calibri" panose="020F0502020204030204" pitchFamily="34" charset="0"/>
               </a:rPr>
               <a:t>Bull</a:t>
@@ -14484,12 +15799,11 @@
           <a:p>
             <a:pPr algn="l"/>
             <a:r>
-              <a:rPr lang="en-US" dirty="0">
+              <a:rPr lang="en-US" sz="2800" dirty="0">
                 <a:solidFill>
                   <a:srgbClr val="0070C0"/>
                 </a:solidFill>
                 <a:effectLst/>
-                <a:latin typeface="Arial" panose="020B0604020202020204" pitchFamily="34" charset="0"/>
                 <a:ea typeface="Calibri" panose="020F0502020204030204" pitchFamily="34" charset="0"/>
               </a:rPr>
               <a:t>Bear</a:t>
@@ -14498,17 +15812,16 @@
           <a:p>
             <a:pPr algn="l"/>
             <a:r>
-              <a:rPr lang="en-US" dirty="0">
+              <a:rPr lang="en-US" sz="2800" dirty="0">
                 <a:solidFill>
                   <a:srgbClr val="0070C0"/>
                 </a:solidFill>
                 <a:effectLst/>
-                <a:latin typeface="Arial" panose="020B0604020202020204" pitchFamily="34" charset="0"/>
                 <a:ea typeface="Calibri" panose="020F0502020204030204" pitchFamily="34" charset="0"/>
               </a:rPr>
               <a:t>Neutral</a:t>
             </a:r>
-            <a:endParaRPr lang="en-US" dirty="0"/>
+            <a:endParaRPr lang="en-US" sz="2800" dirty="0"/>
           </a:p>
         </p:txBody>
       </p:sp>
@@ -14659,7 +15972,6 @@
                   </a:schemeClr>
                 </a:solidFill>
                 <a:effectLst/>
-                <a:latin typeface="Arial" panose="020B0604020202020204" pitchFamily="34" charset="0"/>
                 <a:ea typeface="Calibri" panose="020F0502020204030204" pitchFamily="34" charset="0"/>
               </a:rPr>
               <a:t>Defining Code for Market Type</a:t>
@@ -14697,7 +16009,7 @@
           <a:lstStyle/>
           <a:p>
             <a:r>
-              <a:rPr lang="en-US" dirty="0"/>
+              <a:rPr lang="en-US" sz="3400" dirty="0"/>
               <a:t>Bear</a:t>
             </a:r>
           </a:p>
@@ -14728,21 +16040,21 @@
           <a:p>
             <a:pPr algn="l"/>
             <a:r>
-              <a:rPr lang="en-US" sz="2000" dirty="0"/>
-              <a:t>Bitcoin     by over:</a:t>
+              <a:rPr lang="en-US" sz="2800" dirty="0"/>
+              <a:t>Bitcoin      by over:</a:t>
             </a:r>
           </a:p>
           <a:p>
             <a:pPr algn="l"/>
             <a:r>
-              <a:rPr lang="en-US" sz="2000" dirty="0"/>
+              <a:rPr lang="en-US" sz="2800" dirty="0"/>
               <a:t>	40% - 3 months</a:t>
             </a:r>
           </a:p>
           <a:p>
             <a:pPr algn="l"/>
             <a:r>
-              <a:rPr lang="en-US" sz="2000" dirty="0"/>
+              <a:rPr lang="en-US" sz="2800" dirty="0"/>
               <a:t>	60% - 6 months</a:t>
             </a:r>
           </a:p>
@@ -14774,7 +16086,7 @@
           <a:lstStyle/>
           <a:p>
             <a:r>
-              <a:rPr lang="en-US" dirty="0"/>
+              <a:rPr lang="en-US" sz="3400" dirty="0"/>
               <a:t>Bull</a:t>
             </a:r>
           </a:p>
@@ -14803,21 +16115,21 @@
           <a:p>
             <a:pPr algn="l"/>
             <a:r>
-              <a:rPr lang="en-US" sz="2000" dirty="0"/>
+              <a:rPr lang="en-US" sz="2800" dirty="0"/>
               <a:t>Bitcoin     by over:</a:t>
             </a:r>
           </a:p>
           <a:p>
             <a:pPr algn="l"/>
             <a:r>
-              <a:rPr lang="en-US" sz="2000" dirty="0"/>
+              <a:rPr lang="en-US" sz="2800" dirty="0"/>
               <a:t>	70% - 3 months</a:t>
             </a:r>
           </a:p>
           <a:p>
             <a:pPr algn="l"/>
             <a:r>
-              <a:rPr lang="en-US" sz="2000" dirty="0"/>
+              <a:rPr lang="en-US" sz="2800" dirty="0"/>
               <a:t>	150% - 6 months</a:t>
             </a:r>
           </a:p>
@@ -14848,7 +16160,7 @@
           <a:lstStyle/>
           <a:p>
             <a:r>
-              <a:rPr lang="en-US" dirty="0"/>
+              <a:rPr lang="en-US" sz="3400" dirty="0"/>
               <a:t>Neutral</a:t>
             </a:r>
           </a:p>
@@ -14877,37 +16189,39 @@
           </a:xfrm>
         </p:spPr>
         <p:txBody>
-          <a:bodyPr/>
+          <a:bodyPr>
+            <a:normAutofit fontScale="92500" lnSpcReduction="20000"/>
+          </a:bodyPr>
           <a:lstStyle/>
           <a:p>
             <a:pPr algn="l"/>
             <a:r>
-              <a:rPr lang="en-US" sz="2000" dirty="0"/>
+              <a:rPr lang="en-US" sz="2800" dirty="0"/>
               <a:t>Bitcoin stayed within</a:t>
             </a:r>
           </a:p>
           <a:p>
             <a:pPr algn="l"/>
             <a:r>
-              <a:rPr lang="en-US" sz="2000" dirty="0"/>
+              <a:rPr lang="en-US" sz="2800" dirty="0"/>
               <a:t>	70% range - 3 months</a:t>
             </a:r>
           </a:p>
           <a:p>
             <a:pPr algn="l"/>
-            <a:endParaRPr lang="en-US" sz="2000" dirty="0"/>
+            <a:endParaRPr lang="en-US" sz="2800" dirty="0"/>
           </a:p>
           <a:p>
             <a:pPr algn="l"/>
             <a:r>
-              <a:rPr lang="en-US" sz="2000" dirty="0"/>
+              <a:rPr lang="en-US" sz="2800" dirty="0"/>
               <a:t>Bitcoin neither increased/decreased more than:</a:t>
             </a:r>
           </a:p>
           <a:p>
             <a:pPr algn="l"/>
             <a:r>
-              <a:rPr lang="en-US" sz="2000" dirty="0"/>
+              <a:rPr lang="en-US" sz="2800" dirty="0"/>
               <a:t>	150% - 6 months</a:t>
             </a:r>
           </a:p>
@@ -14930,8 +16244,8 @@
         </p:nvSpPr>
         <p:spPr>
           <a:xfrm>
-            <a:off x="1828800" y="2571750"/>
-            <a:ext cx="228600" cy="323850"/>
+            <a:off x="2131471" y="2733675"/>
+            <a:ext cx="432816" cy="323850"/>
           </a:xfrm>
           <a:prstGeom prst="downArrow">
             <a:avLst/>
@@ -14976,7 +16290,7 @@
         </p:nvSpPr>
         <p:spPr>
           <a:xfrm>
-            <a:off x="5364480" y="2571750"/>
+            <a:off x="5716172" y="2606187"/>
             <a:ext cx="198120" cy="323850"/>
           </a:xfrm>
           <a:prstGeom prst="upArrow">
@@ -15023,7 +16337,7 @@
         <p:spPr>
           <a:xfrm>
             <a:off x="792480" y="4937760"/>
-            <a:ext cx="6766560" cy="923330"/>
+            <a:ext cx="6766560" cy="1200329"/>
           </a:xfrm>
           <a:prstGeom prst="rect">
             <a:avLst/>
@@ -15037,7 +16351,7 @@
           <a:lstStyle/>
           <a:p>
             <a:r>
-              <a:rPr lang="en-US" b="0" i="0" dirty="0">
+              <a:rPr lang="en-US" sz="2400" b="0" i="0" dirty="0">
                 <a:solidFill>
                   <a:schemeClr val="tx2"/>
                 </a:solidFill>
@@ -15046,7 +16360,7 @@
               </a:rPr>
               <a:t>If selected crypto only shows trend, but Bitcoin does not, then it may indicate project growth or failure but not a true bull market / bear market.</a:t>
             </a:r>
-            <a:endParaRPr lang="en-US" dirty="0">
+            <a:endParaRPr lang="en-US" sz="2400" dirty="0">
               <a:solidFill>
                 <a:schemeClr val="tx2"/>
               </a:solidFill>

</xml_diff>

<commit_message>
Edited Formatting of ppt
</commit_message>
<xml_diff>
--- a/The Omniscient Crypto Oracle.pptx
+++ b/The Omniscient Crypto Oracle.pptx
@@ -20,8 +20,8 @@
     <p:sldId id="264" r:id="rId11"/>
     <p:sldId id="268" r:id="rId12"/>
     <p:sldId id="265" r:id="rId13"/>
-    <p:sldId id="267" r:id="rId14"/>
-    <p:sldId id="269" r:id="rId15"/>
+    <p:sldId id="269" r:id="rId14"/>
+    <p:sldId id="267" r:id="rId15"/>
   </p:sldIdLst>
   <p:sldSz cx="12192000" cy="6858000"/>
   <p:notesSz cx="6858000" cy="9144000"/>
@@ -646,27 +646,7 @@
                 <a:effectLst/>
                 <a:latin typeface="-apple-system"/>
               </a:rPr>
-              <a:t>: The LSTM model is built using the </a:t>
-            </a:r>
-            <a:r>
-              <a:rPr lang="en-US" b="0" i="0" dirty="0" err="1">
-                <a:solidFill>
-                  <a:srgbClr val="24292F"/>
-                </a:solidFill>
-                <a:effectLst/>
-                <a:latin typeface="-apple-system"/>
-              </a:rPr>
-              <a:t>Keras</a:t>
-            </a:r>
-            <a:r>
-              <a:rPr lang="en-US" b="0" i="0" dirty="0">
-                <a:solidFill>
-                  <a:srgbClr val="24292F"/>
-                </a:solidFill>
-                <a:effectLst/>
-                <a:latin typeface="-apple-system"/>
-              </a:rPr>
-              <a:t> library in Python. The model architecture includes several LSTM layers followed by a Dense layer. The model is trained on the training data.</a:t>
+              <a:t>: The LSTM model is built using the Keras library in Python. The model architecture includes several LSTM layers followed by a Dense layer. The model is trained on the training data.</a:t>
             </a:r>
           </a:p>
           <a:p>
@@ -1521,7 +1501,7 @@
     </p:spTree>
     <p:extLst>
       <p:ext uri="{BB962C8B-B14F-4D97-AF65-F5344CB8AC3E}">
-        <p14:creationId xmlns:p14="http://schemas.microsoft.com/office/powerpoint/2010/main" val="2902554581"/>
+        <p14:creationId xmlns:p14="http://schemas.microsoft.com/office/powerpoint/2010/main" val="3925664732"/>
       </p:ext>
     </p:extLst>
   </p:cSld>
@@ -1608,7 +1588,7 @@
     </p:spTree>
     <p:extLst>
       <p:ext uri="{BB962C8B-B14F-4D97-AF65-F5344CB8AC3E}">
-        <p14:creationId xmlns:p14="http://schemas.microsoft.com/office/powerpoint/2010/main" val="1626511650"/>
+        <p14:creationId xmlns:p14="http://schemas.microsoft.com/office/powerpoint/2010/main" val="2902554581"/>
       </p:ext>
     </p:extLst>
   </p:cSld>
@@ -2276,7 +2256,7 @@
           <a:p>
             <a:r>
               <a:rPr lang="en-US" dirty="0"/>
-              <a:t>David</a:t>
+              <a:t>Aaron</a:t>
             </a:r>
           </a:p>
           <a:p>
@@ -9020,13 +9000,14 @@
         </p:nvSpPr>
         <p:spPr>
           <a:xfrm>
-            <a:off x="5369441" y="1233378"/>
+            <a:off x="5741616" y="2048347"/>
             <a:ext cx="5441285" cy="1675335"/>
           </a:xfrm>
+          <a:noFill/>
         </p:spPr>
         <p:txBody>
           <a:bodyPr>
-            <a:normAutofit/>
+            <a:normAutofit fontScale="90000"/>
           </a:bodyPr>
           <a:lstStyle/>
           <a:p>
@@ -9036,12 +9017,44 @@
               </a:lnSpc>
             </a:pPr>
             <a:r>
-              <a:rPr lang="en-US" b="1" i="0" dirty="0">
-                <a:effectLst/>
+              <a:rPr lang="en-US" sz="6000" b="1" i="0" dirty="0">
+                <a:ln w="22225">
+                  <a:solidFill>
+                    <a:srgbClr val="00B050"/>
+                  </a:solidFill>
+                  <a:prstDash val="solid"/>
+                </a:ln>
+                <a:solidFill>
+                  <a:srgbClr val="92D050"/>
+                </a:solidFill>
+                <a:effectLst>
+                  <a:outerShdw blurRad="50800" dist="38100" dir="16200000" rotWithShape="0">
+                    <a:prstClr val="black">
+                      <a:alpha val="40000"/>
+                    </a:prstClr>
+                  </a:outerShdw>
+                </a:effectLst>
               </a:rPr>
               <a:t>The Omniscient Crypto Oracle</a:t>
             </a:r>
-            <a:endParaRPr lang="en-US" dirty="0"/>
+            <a:endParaRPr lang="en-US" sz="6000" b="1" dirty="0">
+              <a:ln w="22225">
+                <a:solidFill>
+                  <a:srgbClr val="00B050"/>
+                </a:solidFill>
+                <a:prstDash val="solid"/>
+              </a:ln>
+              <a:solidFill>
+                <a:srgbClr val="92D050"/>
+              </a:solidFill>
+              <a:effectLst>
+                <a:outerShdw blurRad="50800" dist="38100" dir="16200000" rotWithShape="0">
+                  <a:prstClr val="black">
+                    <a:alpha val="40000"/>
+                  </a:prstClr>
+                </a:outerShdw>
+              </a:effectLst>
+            </a:endParaRPr>
           </a:p>
         </p:txBody>
       </p:sp>
@@ -9063,7 +9076,7 @@
         </p:nvSpPr>
         <p:spPr>
           <a:xfrm>
-            <a:off x="5369440" y="3079698"/>
+            <a:off x="5741615" y="3968689"/>
             <a:ext cx="5441286" cy="592661"/>
           </a:xfrm>
         </p:spPr>
@@ -9080,7 +9093,7 @@
                 </a:solidFill>
                 <a:latin typeface="+mj-lt"/>
               </a:rPr>
-              <a:t>Crypto Data and Predictor</a:t>
+              <a:t>Crypto Price Predictor</a:t>
             </a:r>
           </a:p>
         </p:txBody>
@@ -9112,7 +9125,7 @@
         </p:blipFill>
         <p:spPr>
           <a:xfrm>
-            <a:off x="1009099" y="938965"/>
+            <a:off x="1359619" y="897665"/>
             <a:ext cx="3551912" cy="2733394"/>
           </a:xfrm>
           <a:prstGeom prst="rect">
@@ -9136,7 +9149,7 @@
         </p:nvSpPr>
         <p:spPr>
           <a:xfrm>
-            <a:off x="-71846" y="3997136"/>
+            <a:off x="300329" y="3968689"/>
             <a:ext cx="5441286" cy="1675335"/>
           </a:xfrm>
           <a:prstGeom prst="rect">
@@ -9516,15 +9529,34 @@
           </a:lstStyle>
           <a:p>
             <a:r>
-              <a:rPr lang="en-US" dirty="0">
+              <a:rPr lang="en-US" sz="2800" b="0" i="0" dirty="0">
+                <a:solidFill>
+                  <a:srgbClr val="00B050"/>
+                </a:solidFill>
+                <a:effectLst/>
+              </a:rPr>
+              <a:t>T</a:t>
+            </a:r>
+            <a:r>
+              <a:rPr lang="en-US" b="0" i="0" dirty="0">
                 <a:solidFill>
                   <a:schemeClr val="tx2"/>
                 </a:solidFill>
-              </a:rPr>
-              <a:t>Team:</a:t>
-            </a:r>
-          </a:p>
-          <a:p>
+                <a:effectLst/>
+              </a:rPr>
+              <a:t>yler Fallon</a:t>
+            </a:r>
+          </a:p>
+          <a:p>
+            <a:r>
+              <a:rPr lang="en-US" sz="2800" b="0" i="0" dirty="0">
+                <a:solidFill>
+                  <a:srgbClr val="00B050"/>
+                </a:solidFill>
+                <a:effectLst/>
+              </a:rPr>
+              <a:t>A</a:t>
+            </a:r>
             <a:r>
               <a:rPr lang="en-US" b="0" i="0" dirty="0">
                 <a:solidFill>
@@ -9532,10 +9564,19 @@
                 </a:solidFill>
                 <a:effectLst/>
               </a:rPr>
-              <a:t>Tyler Fallon</a:t>
-            </a:r>
-          </a:p>
-          <a:p>
+              <a:t>aron Horneman</a:t>
+            </a:r>
+          </a:p>
+          <a:p>
+            <a:r>
+              <a:rPr lang="en-US" sz="2800" b="0" i="0" dirty="0">
+                <a:solidFill>
+                  <a:srgbClr val="00B050"/>
+                </a:solidFill>
+                <a:effectLst/>
+              </a:rPr>
+              <a:t>B</a:t>
+            </a:r>
             <a:r>
               <a:rPr lang="en-US" b="0" i="0" dirty="0">
                 <a:solidFill>
@@ -9543,44 +9584,27 @@
                 </a:solidFill>
                 <a:effectLst/>
               </a:rPr>
-              <a:t>Aaron </a:t>
-            </a:r>
-            <a:r>
-              <a:rPr lang="en-US" b="0" i="0" dirty="0" err="1">
+              <a:t>obbi Colhour</a:t>
+            </a:r>
+          </a:p>
+          <a:p>
+            <a:r>
+              <a:rPr lang="en-US" sz="2800" b="0" i="0" dirty="0">
+                <a:solidFill>
+                  <a:srgbClr val="00B050"/>
+                </a:solidFill>
+                <a:effectLst/>
+              </a:rPr>
+              <a:t>D</a:t>
+            </a:r>
+            <a:r>
+              <a:rPr lang="en-US" b="0" i="0" dirty="0">
                 <a:solidFill>
                   <a:schemeClr val="tx2"/>
                 </a:solidFill>
                 <a:effectLst/>
               </a:rPr>
-              <a:t>Horneman</a:t>
-            </a:r>
-            <a:endParaRPr lang="en-US" b="0" i="0" dirty="0">
-              <a:solidFill>
-                <a:schemeClr val="tx2"/>
-              </a:solidFill>
-              <a:effectLst/>
-            </a:endParaRPr>
-          </a:p>
-          <a:p>
-            <a:r>
-              <a:rPr lang="en-US" b="0" i="0" dirty="0">
-                <a:solidFill>
-                  <a:schemeClr val="tx2"/>
-                </a:solidFill>
-                <a:effectLst/>
-              </a:rPr>
-              <a:t>Bobbi Colhour</a:t>
-            </a:r>
-          </a:p>
-          <a:p>
-            <a:r>
-              <a:rPr lang="en-US" b="0" i="0" dirty="0">
-                <a:solidFill>
-                  <a:schemeClr val="tx2"/>
-                </a:solidFill>
-                <a:effectLst/>
-              </a:rPr>
-              <a:t>David Oliver</a:t>
+              <a:t>avid Oliver</a:t>
             </a:r>
           </a:p>
         </p:txBody>
@@ -9652,8 +9676,8 @@
         </p:nvSpPr>
         <p:spPr>
           <a:xfrm>
-            <a:off x="5292300" y="212353"/>
-            <a:ext cx="6615360" cy="6080370"/>
+            <a:off x="5627914" y="212353"/>
+            <a:ext cx="6279746" cy="6080370"/>
           </a:xfrm>
         </p:spPr>
         <p:txBody>
@@ -9661,6 +9685,57 @@
             <a:normAutofit/>
           </a:bodyPr>
           <a:lstStyle/>
+          <a:p>
+            <a:pPr marL="457200" marR="0">
+              <a:lnSpc>
+                <a:spcPts val="1800"/>
+              </a:lnSpc>
+              <a:spcBef>
+                <a:spcPts val="0"/>
+              </a:spcBef>
+              <a:spcAft>
+                <a:spcPts val="0"/>
+              </a:spcAft>
+            </a:pPr>
+            <a:r>
+              <a:rPr lang="en-US" sz="3000" b="1" dirty="0">
+                <a:solidFill>
+                  <a:schemeClr val="tx2">
+                    <a:lumMod val="90000"/>
+                  </a:schemeClr>
+                </a:solidFill>
+                <a:effectLst/>
+                <a:latin typeface="+mj-lt"/>
+                <a:ea typeface="Calibri" panose="020F0502020204030204" pitchFamily="34" charset="0"/>
+                <a:cs typeface="Times New Roman" panose="02020603050405020304" pitchFamily="18" charset="0"/>
+              </a:rPr>
+              <a:t>Deep Machine Learning</a:t>
+            </a:r>
+          </a:p>
+          <a:p>
+            <a:pPr marL="457200" marR="0">
+              <a:lnSpc>
+                <a:spcPts val="1800"/>
+              </a:lnSpc>
+              <a:spcBef>
+                <a:spcPts val="0"/>
+              </a:spcBef>
+              <a:spcAft>
+                <a:spcPts val="0"/>
+              </a:spcAft>
+            </a:pPr>
+            <a:endParaRPr lang="en-US" sz="3000" b="1" dirty="0">
+              <a:solidFill>
+                <a:schemeClr val="tx2">
+                  <a:lumMod val="90000"/>
+                </a:schemeClr>
+              </a:solidFill>
+              <a:effectLst/>
+              <a:latin typeface="+mj-lt"/>
+              <a:ea typeface="Calibri" panose="020F0502020204030204" pitchFamily="34" charset="0"/>
+              <a:cs typeface="Times New Roman" panose="02020603050405020304" pitchFamily="18" charset="0"/>
+            </a:endParaRPr>
+          </a:p>
           <a:p>
             <a:pPr marL="457200" marR="0" algn="l">
               <a:lnSpc>
@@ -9673,33 +9748,35 @@
                 <a:spcPts val="0"/>
               </a:spcAft>
             </a:pPr>
-            <a:r>
-              <a:rPr lang="en-US" sz="3600" dirty="0">
-                <a:solidFill>
-                  <a:schemeClr val="tx2">
-                    <a:lumMod val="90000"/>
-                  </a:schemeClr>
-                </a:solidFill>
+            <a:endParaRPr lang="en-US" sz="2400" b="1" dirty="0">
+              <a:effectLst/>
+              <a:latin typeface="+mj-lt"/>
+              <a:ea typeface="Calibri" panose="020F0502020204030204" pitchFamily="34" charset="0"/>
+              <a:cs typeface="Times New Roman" panose="02020603050405020304" pitchFamily="18" charset="0"/>
+            </a:endParaRPr>
+          </a:p>
+          <a:p>
+            <a:pPr marL="800100" marR="0" indent="-342900" algn="l">
+              <a:lnSpc>
+                <a:spcPts val="1800"/>
+              </a:lnSpc>
+              <a:spcBef>
+                <a:spcPts val="0"/>
+              </a:spcBef>
+              <a:spcAft>
+                <a:spcPts val="0"/>
+              </a:spcAft>
+              <a:buFont typeface="Arial" panose="020B0604020202020204" pitchFamily="34" charset="0"/>
+              <a:buChar char="•"/>
+            </a:pPr>
+            <a:r>
+              <a:rPr lang="en-US" sz="2400" dirty="0">
                 <a:effectLst/>
-                <a:latin typeface="+mj-lt"/>
+                <a:latin typeface="Calisto MT" panose="02040603050505030304" pitchFamily="18" charset="0"/>
                 <a:ea typeface="Calibri" panose="020F0502020204030204" pitchFamily="34" charset="0"/>
                 <a:cs typeface="Times New Roman" panose="02020603050405020304" pitchFamily="18" charset="0"/>
               </a:rPr>
-              <a:t>Machine Learning</a:t>
-            </a:r>
-            <a:r>
-              <a:rPr lang="en-US" sz="3000" dirty="0">
-                <a:solidFill>
-                  <a:schemeClr val="tx2">
-                    <a:lumMod val="90000"/>
-                  </a:schemeClr>
-                </a:solidFill>
-                <a:effectLst/>
-                <a:latin typeface="Arial" panose="020B0604020202020204" pitchFamily="34" charset="0"/>
-                <a:ea typeface="Calibri" panose="020F0502020204030204" pitchFamily="34" charset="0"/>
-                <a:cs typeface="Times New Roman" panose="02020603050405020304" pitchFamily="18" charset="0"/>
-              </a:rPr>
-              <a:t>:</a:t>
+              <a:t>Time Series</a:t>
             </a:r>
           </a:p>
           <a:p>
@@ -9714,15 +9791,139 @@
                 <a:spcPts val="0"/>
               </a:spcAft>
             </a:pPr>
-            <a:endParaRPr lang="en-US" sz="3000" dirty="0">
-              <a:solidFill>
-                <a:srgbClr val="0070C0"/>
-              </a:solidFill>
+            <a:endParaRPr lang="en-US" sz="2400" dirty="0">
               <a:effectLst/>
-              <a:latin typeface="Arial" panose="020B0604020202020204" pitchFamily="34" charset="0"/>
+              <a:latin typeface="Calisto MT" panose="02040603050505030304" pitchFamily="18" charset="0"/>
               <a:ea typeface="Calibri" panose="020F0502020204030204" pitchFamily="34" charset="0"/>
               <a:cs typeface="Times New Roman" panose="02020603050405020304" pitchFamily="18" charset="0"/>
             </a:endParaRPr>
+          </a:p>
+          <a:p>
+            <a:pPr marL="800100" marR="0" indent="-342900" algn="l">
+              <a:lnSpc>
+                <a:spcPts val="1800"/>
+              </a:lnSpc>
+              <a:spcBef>
+                <a:spcPts val="0"/>
+              </a:spcBef>
+              <a:spcAft>
+                <a:spcPts val="0"/>
+              </a:spcAft>
+              <a:buFont typeface="Arial" panose="020B0604020202020204" pitchFamily="34" charset="0"/>
+              <a:buChar char="•"/>
+            </a:pPr>
+            <a:endParaRPr lang="en-US" sz="2400" dirty="0">
+              <a:effectLst/>
+              <a:latin typeface="Calisto MT" panose="02040603050505030304" pitchFamily="18" charset="0"/>
+              <a:ea typeface="Calibri" panose="020F0502020204030204" pitchFamily="34" charset="0"/>
+              <a:cs typeface="Times New Roman" panose="02020603050405020304" pitchFamily="18" charset="0"/>
+            </a:endParaRPr>
+          </a:p>
+          <a:p>
+            <a:pPr marL="800100" marR="0" indent="-342900" algn="l">
+              <a:lnSpc>
+                <a:spcPts val="1800"/>
+              </a:lnSpc>
+              <a:spcBef>
+                <a:spcPts val="0"/>
+              </a:spcBef>
+              <a:spcAft>
+                <a:spcPts val="0"/>
+              </a:spcAft>
+              <a:buFont typeface="Arial" panose="020B0604020202020204" pitchFamily="34" charset="0"/>
+              <a:buChar char="•"/>
+            </a:pPr>
+            <a:r>
+              <a:rPr lang="en-US" sz="2400" dirty="0">
+                <a:effectLst/>
+                <a:latin typeface="Calisto MT" panose="02040603050505030304" pitchFamily="18" charset="0"/>
+                <a:ea typeface="Calibri" panose="020F0502020204030204" pitchFamily="34" charset="0"/>
+                <a:cs typeface="Times New Roman" panose="02020603050405020304" pitchFamily="18" charset="0"/>
+              </a:rPr>
+              <a:t>Library: </a:t>
+            </a:r>
+            <a:r>
+              <a:rPr lang="en-US" sz="2400" b="0" i="1" dirty="0">
+                <a:solidFill>
+                  <a:srgbClr val="0070C0"/>
+                </a:solidFill>
+                <a:effectLst/>
+                <a:latin typeface="Calisto MT" panose="02040603050505030304" pitchFamily="18" charset="0"/>
+              </a:rPr>
+              <a:t>TensorFlow / Keras</a:t>
+            </a:r>
+          </a:p>
+          <a:p>
+            <a:pPr marL="800100" marR="0" indent="-342900" algn="l">
+              <a:lnSpc>
+                <a:spcPts val="1800"/>
+              </a:lnSpc>
+              <a:spcBef>
+                <a:spcPts val="0"/>
+              </a:spcBef>
+              <a:spcAft>
+                <a:spcPts val="0"/>
+              </a:spcAft>
+              <a:buFont typeface="Arial" panose="020B0604020202020204" pitchFamily="34" charset="0"/>
+              <a:buChar char="•"/>
+            </a:pPr>
+            <a:endParaRPr lang="en-US" sz="2400" dirty="0">
+              <a:effectLst/>
+              <a:latin typeface="Calisto MT" panose="02040603050505030304" pitchFamily="18" charset="0"/>
+              <a:ea typeface="Calibri" panose="020F0502020204030204" pitchFamily="34" charset="0"/>
+              <a:cs typeface="Times New Roman" panose="02020603050405020304" pitchFamily="18" charset="0"/>
+            </a:endParaRPr>
+          </a:p>
+          <a:p>
+            <a:pPr marL="800100" marR="0" indent="-342900" algn="l">
+              <a:lnSpc>
+                <a:spcPts val="1800"/>
+              </a:lnSpc>
+              <a:spcBef>
+                <a:spcPts val="0"/>
+              </a:spcBef>
+              <a:spcAft>
+                <a:spcPts val="0"/>
+              </a:spcAft>
+              <a:buFont typeface="Arial" panose="020B0604020202020204" pitchFamily="34" charset="0"/>
+              <a:buChar char="•"/>
+            </a:pPr>
+            <a:endParaRPr lang="en-US" sz="2400" b="0" i="0" dirty="0">
+              <a:effectLst/>
+              <a:latin typeface="Calisto MT" panose="02040603050505030304" pitchFamily="18" charset="0"/>
+            </a:endParaRPr>
+          </a:p>
+          <a:p>
+            <a:pPr marL="800100" marR="0" indent="-342900" algn="l">
+              <a:lnSpc>
+                <a:spcPts val="1800"/>
+              </a:lnSpc>
+              <a:spcBef>
+                <a:spcPts val="0"/>
+              </a:spcBef>
+              <a:spcAft>
+                <a:spcPts val="0"/>
+              </a:spcAft>
+              <a:buFont typeface="Arial" panose="020B0604020202020204" pitchFamily="34" charset="0"/>
+              <a:buChar char="•"/>
+            </a:pPr>
+            <a:r>
+              <a:rPr lang="en-US" sz="2400" b="0" i="0" dirty="0">
+                <a:effectLst/>
+                <a:latin typeface="Calisto MT" panose="02040603050505030304" pitchFamily="18" charset="0"/>
+              </a:rPr>
+              <a:t>Model: </a:t>
+            </a:r>
+            <a:r>
+              <a:rPr lang="en-US" sz="2400" b="0" i="1" dirty="0">
+                <a:solidFill>
+                  <a:srgbClr val="0070C0"/>
+                </a:solidFill>
+                <a:effectLst/>
+                <a:latin typeface="Calisto MT" panose="02040603050505030304" pitchFamily="18" charset="0"/>
+              </a:rPr>
+              <a:t>Long Short-Term Memory (LSTM)</a:t>
+            </a:r>
           </a:p>
           <a:p>
             <a:pPr marL="457200" marR="0" algn="l">
@@ -9736,15 +9937,13 @@
                 <a:spcPts val="0"/>
               </a:spcAft>
             </a:pPr>
-            <a:r>
-              <a:rPr lang="en-US" sz="2800" b="0" i="0" dirty="0">
-                <a:solidFill>
-                  <a:srgbClr val="0070C0"/>
-                </a:solidFill>
-                <a:effectLst/>
-              </a:rPr>
-              <a:t>Long Short-Term Memory(LSTM) </a:t>
-            </a:r>
+            <a:endParaRPr lang="en-US" sz="2400" b="0" i="1" dirty="0">
+              <a:solidFill>
+                <a:srgbClr val="0070C0"/>
+              </a:solidFill>
+              <a:effectLst/>
+              <a:latin typeface="Calisto MT" panose="02040603050505030304" pitchFamily="18" charset="0"/>
+            </a:endParaRPr>
           </a:p>
           <a:p>
             <a:pPr marL="457200" marR="0" algn="l">
@@ -9758,12 +9957,35 @@
                 <a:spcPts val="0"/>
               </a:spcAft>
             </a:pPr>
-            <a:endParaRPr lang="en-US" sz="2800" b="0" i="0" dirty="0">
+            <a:endParaRPr lang="en-US" sz="2400" b="0" i="0" dirty="0">
               <a:solidFill>
                 <a:srgbClr val="0070C0"/>
               </a:solidFill>
               <a:effectLst/>
+              <a:latin typeface="Calisto MT" panose="02040603050505030304" pitchFamily="18" charset="0"/>
             </a:endParaRPr>
+          </a:p>
+          <a:p>
+            <a:pPr marL="800100" marR="0" indent="-342900" algn="l">
+              <a:lnSpc>
+                <a:spcPts val="1800"/>
+              </a:lnSpc>
+              <a:spcBef>
+                <a:spcPts val="0"/>
+              </a:spcBef>
+              <a:spcAft>
+                <a:spcPts val="0"/>
+              </a:spcAft>
+              <a:buFont typeface="Arial" panose="020B0604020202020204" pitchFamily="34" charset="0"/>
+              <a:buChar char="•"/>
+            </a:pPr>
+            <a:r>
+              <a:rPr lang="en-US" sz="2400" b="0" i="0" dirty="0">
+                <a:effectLst/>
+                <a:latin typeface="Calisto MT" panose="02040603050505030304" pitchFamily="18" charset="0"/>
+              </a:rPr>
+              <a:t>Loss Metrics:</a:t>
+            </a:r>
           </a:p>
           <a:p>
             <a:pPr marL="457200" marR="0" algn="l">
@@ -9778,13 +10000,39 @@
               </a:spcAft>
             </a:pPr>
             <a:r>
-              <a:rPr lang="en-US" sz="2800" b="0" i="0" dirty="0">
+              <a:rPr lang="en-US" sz="2400" b="0" i="0" dirty="0">
                 <a:solidFill>
                   <a:srgbClr val="0070C0"/>
                 </a:solidFill>
                 <a:effectLst/>
-              </a:rPr>
-              <a:t>Metrics:</a:t>
+                <a:latin typeface="Calisto MT" panose="02040603050505030304" pitchFamily="18" charset="0"/>
+              </a:rPr>
+              <a:t> </a:t>
+            </a:r>
+          </a:p>
+          <a:p>
+            <a:pPr marL="1257300" lvl="1" indent="-342900">
+              <a:lnSpc>
+                <a:spcPts val="1800"/>
+              </a:lnSpc>
+              <a:spcBef>
+                <a:spcPts val="0"/>
+              </a:spcBef>
+              <a:spcAft>
+                <a:spcPts val="0"/>
+              </a:spcAft>
+              <a:buFont typeface="Arial" panose="020B0604020202020204" pitchFamily="34" charset="0"/>
+              <a:buChar char="•"/>
+            </a:pPr>
+            <a:r>
+              <a:rPr lang="en-US" sz="2200" b="0" i="1" dirty="0">
+                <a:solidFill>
+                  <a:srgbClr val="0070C0"/>
+                </a:solidFill>
+                <a:effectLst/>
+                <a:latin typeface="Calisto MT" panose="02040603050505030304" pitchFamily="18" charset="0"/>
+              </a:rPr>
+              <a:t>Mean Squared Error (MSE)</a:t>
             </a:r>
           </a:p>
           <a:p>
@@ -9799,14 +10047,37 @@
                 <a:spcPts val="0"/>
               </a:spcAft>
             </a:pPr>
-            <a:r>
-              <a:rPr lang="en-US" sz="2800" b="0" i="0" dirty="0">
+            <a:endParaRPr lang="en-US" sz="2400" b="0" i="1" dirty="0">
+              <a:solidFill>
+                <a:srgbClr val="0070C0"/>
+              </a:solidFill>
+              <a:effectLst/>
+              <a:latin typeface="Calisto MT" panose="02040603050505030304" pitchFamily="18" charset="0"/>
+            </a:endParaRPr>
+          </a:p>
+          <a:p>
+            <a:pPr marL="1257300" lvl="1" indent="-342900">
+              <a:lnSpc>
+                <a:spcPts val="1800"/>
+              </a:lnSpc>
+              <a:spcBef>
+                <a:spcPts val="0"/>
+              </a:spcBef>
+              <a:spcAft>
+                <a:spcPts val="0"/>
+              </a:spcAft>
+              <a:buFont typeface="Arial" panose="020B0604020202020204" pitchFamily="34" charset="0"/>
+              <a:buChar char="•"/>
+            </a:pPr>
+            <a:r>
+              <a:rPr lang="en-US" sz="2200" b="0" i="1" dirty="0">
                 <a:solidFill>
                   <a:srgbClr val="0070C0"/>
                 </a:solidFill>
                 <a:effectLst/>
-              </a:rPr>
-              <a:t> </a:t>
+                <a:latin typeface="Calisto MT" panose="02040603050505030304" pitchFamily="18" charset="0"/>
+              </a:rPr>
+              <a:t>Root Mean Squared Error (RMSE)</a:t>
             </a:r>
           </a:p>
           <a:p>
@@ -9821,23 +10092,79 @@
                 <a:spcPts val="0"/>
               </a:spcAft>
             </a:pPr>
-            <a:r>
-              <a:rPr lang="en-US" sz="2800" dirty="0">
+            <a:endParaRPr lang="en-US" sz="2400" i="1" dirty="0">
+              <a:solidFill>
+                <a:srgbClr val="0070C0"/>
+              </a:solidFill>
+              <a:effectLst/>
+              <a:latin typeface="Calisto MT" panose="02040603050505030304" pitchFamily="18" charset="0"/>
+            </a:endParaRPr>
+          </a:p>
+          <a:p>
+            <a:pPr marL="1257300" lvl="1" indent="-342900">
+              <a:lnSpc>
+                <a:spcPts val="1800"/>
+              </a:lnSpc>
+              <a:spcBef>
+                <a:spcPts val="0"/>
+              </a:spcBef>
+              <a:spcAft>
+                <a:spcPts val="0"/>
+              </a:spcAft>
+              <a:buFont typeface="Arial" panose="020B0604020202020204" pitchFamily="34" charset="0"/>
+              <a:buChar char="•"/>
+            </a:pPr>
+            <a:r>
+              <a:rPr lang="en-US" sz="2200" i="1" dirty="0">
                 <a:solidFill>
                   <a:srgbClr val="0070C0"/>
                 </a:solidFill>
                 <a:effectLst/>
-              </a:rPr>
-              <a:t>	</a:t>
-            </a:r>
-            <a:r>
-              <a:rPr lang="en-US" sz="2800" b="0" i="0" dirty="0">
+                <a:latin typeface="Calisto MT" panose="02040603050505030304" pitchFamily="18" charset="0"/>
+              </a:rPr>
+              <a:t>C</a:t>
+            </a:r>
+            <a:r>
+              <a:rPr lang="en-US" sz="2200" b="0" i="1" dirty="0">
                 <a:solidFill>
                   <a:srgbClr val="0070C0"/>
                 </a:solidFill>
                 <a:effectLst/>
-              </a:rPr>
-              <a:t>Mean Squared Error (MSE)</a:t>
+                <a:latin typeface="Calisto MT" panose="02040603050505030304" pitchFamily="18" charset="0"/>
+              </a:rPr>
+              <a:t>oefficient of Determination (R</a:t>
+            </a:r>
+            <a:r>
+              <a:rPr lang="en-US" sz="2200" b="0" i="1" baseline="30000" dirty="0">
+                <a:solidFill>
+                  <a:srgbClr val="0070C0"/>
+                </a:solidFill>
+                <a:effectLst/>
+                <a:latin typeface="Calisto MT" panose="02040603050505030304" pitchFamily="18" charset="0"/>
+              </a:rPr>
+              <a:t>2</a:t>
+            </a:r>
+            <a:r>
+              <a:rPr lang="en-US" sz="2200" b="0" i="1" dirty="0">
+                <a:solidFill>
+                  <a:srgbClr val="0070C0"/>
+                </a:solidFill>
+                <a:effectLst/>
+                <a:latin typeface="Calisto MT" panose="02040603050505030304" pitchFamily="18" charset="0"/>
+              </a:rPr>
+              <a:t>)</a:t>
+            </a:r>
+            <a:r>
+              <a:rPr lang="en-US" sz="2200" i="1" dirty="0">
+                <a:solidFill>
+                  <a:srgbClr val="0070C0"/>
+                </a:solidFill>
+                <a:effectLst/>
+                <a:latin typeface="Calisto MT" panose="02040603050505030304" pitchFamily="18" charset="0"/>
+                <a:ea typeface="Calibri" panose="020F0502020204030204" pitchFamily="34" charset="0"/>
+                <a:cs typeface="Times New Roman" panose="02020603050405020304" pitchFamily="18" charset="0"/>
+              </a:rPr>
+              <a:t> </a:t>
             </a:r>
           </a:p>
           <a:p>
@@ -9852,149 +10179,15 @@
                 <a:spcPts val="0"/>
               </a:spcAft>
             </a:pPr>
-            <a:endParaRPr lang="en-US" sz="2800" b="0" i="0" dirty="0">
+            <a:endParaRPr lang="en-US" sz="2400" dirty="0">
               <a:solidFill>
                 <a:srgbClr val="0070C0"/>
               </a:solidFill>
               <a:effectLst/>
-            </a:endParaRPr>
-          </a:p>
-          <a:p>
-            <a:pPr marL="457200" marR="0" algn="l">
-              <a:lnSpc>
-                <a:spcPts val="1800"/>
-              </a:lnSpc>
-              <a:spcBef>
-                <a:spcPts val="0"/>
-              </a:spcBef>
-              <a:spcAft>
-                <a:spcPts val="0"/>
-              </a:spcAft>
-            </a:pPr>
-            <a:r>
-              <a:rPr lang="en-US" sz="2800" b="0" i="0" dirty="0">
-                <a:solidFill>
-                  <a:srgbClr val="0070C0"/>
-                </a:solidFill>
-                <a:effectLst/>
-              </a:rPr>
-              <a:t>	Root Mean Squared Error (RMSE)</a:t>
-            </a:r>
-          </a:p>
-          <a:p>
-            <a:pPr marL="457200" marR="0" algn="l">
-              <a:lnSpc>
-                <a:spcPts val="1800"/>
-              </a:lnSpc>
-              <a:spcBef>
-                <a:spcPts val="0"/>
-              </a:spcBef>
-              <a:spcAft>
-                <a:spcPts val="0"/>
-              </a:spcAft>
-            </a:pPr>
-            <a:endParaRPr lang="en-US" sz="2800" dirty="0">
-              <a:solidFill>
-                <a:srgbClr val="0070C0"/>
-              </a:solidFill>
-              <a:effectLst/>
-            </a:endParaRPr>
-          </a:p>
-          <a:p>
-            <a:pPr marL="457200" marR="0" algn="l">
-              <a:lnSpc>
-                <a:spcPts val="1800"/>
-              </a:lnSpc>
-              <a:spcBef>
-                <a:spcPts val="0"/>
-              </a:spcBef>
-              <a:spcAft>
-                <a:spcPts val="0"/>
-              </a:spcAft>
-            </a:pPr>
-            <a:r>
-              <a:rPr lang="en-US" sz="2800" b="0" i="0" dirty="0">
-                <a:solidFill>
-                  <a:srgbClr val="0070C0"/>
-                </a:solidFill>
-                <a:effectLst/>
-              </a:rPr>
-              <a:t>	 </a:t>
-            </a:r>
-            <a:r>
-              <a:rPr lang="en-US" sz="2800" dirty="0">
-                <a:solidFill>
-                  <a:srgbClr val="0070C0"/>
-                </a:solidFill>
-                <a:effectLst/>
-              </a:rPr>
-              <a:t>C</a:t>
-            </a:r>
-            <a:r>
-              <a:rPr lang="en-US" sz="2800" b="0" i="0" dirty="0">
-                <a:solidFill>
-                  <a:srgbClr val="0070C0"/>
-                </a:solidFill>
-                <a:effectLst/>
-              </a:rPr>
-              <a:t>oefficient of determination (R^2)</a:t>
-            </a:r>
-            <a:r>
-              <a:rPr lang="en-US" sz="2800" dirty="0">
-                <a:solidFill>
-                  <a:srgbClr val="0070C0"/>
-                </a:solidFill>
-                <a:effectLst/>
-                <a:ea typeface="Calibri" panose="020F0502020204030204" pitchFamily="34" charset="0"/>
-                <a:cs typeface="Times New Roman" panose="02020603050405020304" pitchFamily="18" charset="0"/>
-              </a:rPr>
-              <a:t> </a:t>
-            </a:r>
-          </a:p>
-          <a:p>
-            <a:pPr marL="457200" marR="0" algn="l">
-              <a:lnSpc>
-                <a:spcPts val="1800"/>
-              </a:lnSpc>
-              <a:spcBef>
-                <a:spcPts val="0"/>
-              </a:spcBef>
-              <a:spcAft>
-                <a:spcPts val="0"/>
-              </a:spcAft>
-            </a:pPr>
-            <a:endParaRPr lang="en-US" sz="2800" dirty="0">
-              <a:solidFill>
-                <a:srgbClr val="0070C0"/>
-              </a:solidFill>
-              <a:effectLst/>
+              <a:latin typeface="Calisto MT" panose="02040603050505030304" pitchFamily="18" charset="0"/>
               <a:ea typeface="Calibri" panose="020F0502020204030204" pitchFamily="34" charset="0"/>
               <a:cs typeface="Times New Roman" panose="02020603050405020304" pitchFamily="18" charset="0"/>
             </a:endParaRPr>
-          </a:p>
-          <a:p>
-            <a:pPr marL="457200" marR="0" algn="l">
-              <a:lnSpc>
-                <a:spcPts val="1800"/>
-              </a:lnSpc>
-              <a:spcBef>
-                <a:spcPts val="0"/>
-              </a:spcBef>
-              <a:spcAft>
-                <a:spcPts val="0"/>
-              </a:spcAft>
-            </a:pPr>
-            <a:r>
-              <a:rPr lang="en-US" sz="2800" dirty="0">
-                <a:solidFill>
-                  <a:srgbClr val="0070C0"/>
-                </a:solidFill>
-                <a:effectLst/>
-                <a:ea typeface="Calibri" panose="020F0502020204030204" pitchFamily="34" charset="0"/>
-                <a:cs typeface="Times New Roman" panose="02020603050405020304" pitchFamily="18" charset="0"/>
-              </a:rPr>
-              <a:t>Model Prediction - Training</a:t>
-            </a:r>
           </a:p>
         </p:txBody>
       </p:sp>
@@ -10029,7 +10222,7 @@
         </p:blipFill>
         <p:spPr>
           <a:xfrm>
-            <a:off x="341699" y="777237"/>
+            <a:off x="759600" y="731518"/>
             <a:ext cx="4950601" cy="4950601"/>
           </a:xfrm>
           <a:prstGeom prst="rect">
@@ -10286,7 +10479,7 @@
         </p:nvSpPr>
         <p:spPr>
           <a:xfrm>
-            <a:off x="913795" y="96520"/>
+            <a:off x="913795" y="224107"/>
             <a:ext cx="10353762" cy="687070"/>
           </a:xfrm>
         </p:spPr>
@@ -10297,7 +10490,7 @@
           <a:lstStyle/>
           <a:p>
             <a:r>
-              <a:rPr lang="en-US" dirty="0">
+              <a:rPr lang="en-US" b="1" dirty="0">
                 <a:solidFill>
                   <a:schemeClr val="bg2">
                     <a:lumMod val="10000"/>
@@ -10305,7 +10498,7 @@
                   </a:schemeClr>
                 </a:solidFill>
               </a:rPr>
-              <a:t>Metric Results</a:t>
+              <a:t>Model Metric Evaluations</a:t>
             </a:r>
           </a:p>
         </p:txBody>
@@ -10325,14 +10518,14 @@
           <p:nvPr>
             <p:extLst>
               <p:ext uri="{D42A27DB-BD31-4B8C-83A1-F6EECF244321}">
-                <p14:modId xmlns:p14="http://schemas.microsoft.com/office/powerpoint/2010/main" val="2201376156"/>
+                <p14:modId xmlns:p14="http://schemas.microsoft.com/office/powerpoint/2010/main" val="320203431"/>
               </p:ext>
             </p:extLst>
           </p:nvPr>
         </p:nvGraphicFramePr>
         <p:xfrm>
           <a:off x="264306" y="1135283"/>
-          <a:ext cx="11652740" cy="4966638"/>
+          <a:ext cx="11652740" cy="5003123"/>
         </p:xfrm>
         <a:graphic>
           <a:graphicData uri="http://schemas.openxmlformats.org/drawingml/2006/table">
@@ -10384,25 +10577,6 @@
                     <a:lstStyle/>
                     <a:p>
                       <a:pPr algn="ctr"/>
-                      <a:r>
-                        <a:rPr lang="en-US" sz="2200" dirty="0">
-                          <a:solidFill>
-                            <a:schemeClr val="bg1"/>
-                          </a:solidFill>
-                        </a:rPr>
-                        <a:t>Metric/</a:t>
-                      </a:r>
-                    </a:p>
-                    <a:p>
-                      <a:pPr algn="ctr"/>
-                      <a:r>
-                        <a:rPr lang="en-US" sz="2200" dirty="0" err="1">
-                          <a:solidFill>
-                            <a:schemeClr val="bg1"/>
-                          </a:solidFill>
-                        </a:rPr>
-                        <a:t>Cryptocoin</a:t>
-                      </a:r>
                       <a:endParaRPr lang="en-US" sz="2200" dirty="0">
                         <a:solidFill>
                           <a:schemeClr val="bg1"/>
@@ -10417,14 +10591,28 @@
                     <a:bodyPr/>
                     <a:lstStyle/>
                     <a:p>
+                      <a:pPr algn="ctr"/>
                       <a:r>
                         <a:rPr lang="en-US" sz="2400" dirty="0">
                           <a:solidFill>
-                            <a:schemeClr val="bg1"/>
+                            <a:srgbClr val="800000"/>
                           </a:solidFill>
                         </a:rPr>
-                        <a:t>MSE – Mean Squared Error</a:t>
+                        <a:t>MSE – </a:t>
                       </a:r>
+                      <a:r>
+                        <a:rPr lang="en-US" sz="2000" dirty="0">
+                          <a:solidFill>
+                            <a:srgbClr val="800000"/>
+                          </a:solidFill>
+                        </a:rPr>
+                        <a:t>Mean Squared Error</a:t>
+                      </a:r>
+                      <a:endParaRPr lang="en-US" sz="2400" dirty="0">
+                        <a:solidFill>
+                          <a:srgbClr val="800000"/>
+                        </a:solidFill>
+                      </a:endParaRPr>
                     </a:p>
                   </a:txBody>
                   <a:tcPr/>
@@ -10434,14 +10622,28 @@
                     <a:bodyPr/>
                     <a:lstStyle/>
                     <a:p>
+                      <a:pPr algn="ctr"/>
                       <a:r>
                         <a:rPr lang="en-US" sz="2400" dirty="0">
                           <a:solidFill>
-                            <a:schemeClr val="bg1"/>
+                            <a:srgbClr val="800000"/>
                           </a:solidFill>
                         </a:rPr>
-                        <a:t>MAE – Mean Absolute Error</a:t>
+                        <a:t>MAE – </a:t>
                       </a:r>
+                      <a:r>
+                        <a:rPr lang="en-US" sz="2000" dirty="0">
+                          <a:solidFill>
+                            <a:srgbClr val="800000"/>
+                          </a:solidFill>
+                        </a:rPr>
+                        <a:t>Mean Absolute Error</a:t>
+                      </a:r>
+                      <a:endParaRPr lang="en-US" sz="2400" dirty="0">
+                        <a:solidFill>
+                          <a:srgbClr val="800000"/>
+                        </a:solidFill>
+                      </a:endParaRPr>
                     </a:p>
                   </a:txBody>
                   <a:tcPr/>
@@ -10451,14 +10653,52 @@
                     <a:bodyPr/>
                     <a:lstStyle/>
                     <a:p>
+                      <a:pPr algn="ctr"/>
                       <a:r>
                         <a:rPr lang="en-US" sz="2400" dirty="0">
                           <a:solidFill>
-                            <a:schemeClr val="bg1"/>
+                            <a:srgbClr val="800000"/>
+                          </a:solidFill>
+                        </a:rPr>
+                        <a:t>R</a:t>
+                      </a:r>
+                      <a:r>
+                        <a:rPr lang="en-US" sz="2400" baseline="30000" dirty="0">
+                          <a:solidFill>
+                            <a:srgbClr val="800000"/>
+                          </a:solidFill>
+                        </a:rPr>
+                        <a:t>2 </a:t>
+                      </a:r>
+                      <a:r>
+                        <a:rPr lang="en-US" sz="2400" dirty="0">
+                          <a:solidFill>
+                            <a:srgbClr val="800000"/>
+                          </a:solidFill>
+                        </a:rPr>
+                        <a:t>– </a:t>
+                      </a:r>
+                      <a:r>
+                        <a:rPr lang="en-US" sz="2400" baseline="30000" dirty="0">
+                          <a:solidFill>
+                            <a:srgbClr val="800000"/>
+                          </a:solidFill>
+                        </a:rPr>
+                        <a:t> </a:t>
+                      </a:r>
+                      <a:r>
+                        <a:rPr lang="en-US" sz="2000" dirty="0">
+                          <a:solidFill>
+                            <a:srgbClr val="800000"/>
                           </a:solidFill>
                         </a:rPr>
                         <a:t>Coefficient of Determination</a:t>
                       </a:r>
+                      <a:endParaRPr lang="en-US" sz="2400" dirty="0">
+                        <a:solidFill>
+                          <a:srgbClr val="800000"/>
+                        </a:solidFill>
+                      </a:endParaRPr>
                     </a:p>
                   </a:txBody>
                   <a:tcPr/>
@@ -10468,14 +10708,28 @@
                     <a:bodyPr/>
                     <a:lstStyle/>
                     <a:p>
+                      <a:pPr algn="ctr"/>
                       <a:r>
                         <a:rPr lang="en-US" sz="2400" dirty="0">
                           <a:solidFill>
-                            <a:schemeClr val="bg1"/>
+                            <a:srgbClr val="800000"/>
                           </a:solidFill>
                         </a:rPr>
-                        <a:t>RMSE from MSE</a:t>
+                        <a:t>RMSE – </a:t>
                       </a:r>
+                      <a:r>
+                        <a:rPr lang="en-US" sz="2000" dirty="0">
+                          <a:solidFill>
+                            <a:srgbClr val="800000"/>
+                          </a:solidFill>
+                        </a:rPr>
+                        <a:t>Root Mean Squared Error</a:t>
+                      </a:r>
+                      <a:endParaRPr lang="en-US" sz="2400" dirty="0">
+                        <a:solidFill>
+                          <a:srgbClr val="800000"/>
+                        </a:solidFill>
+                      </a:endParaRPr>
                     </a:p>
                   </a:txBody>
                   <a:tcPr/>
@@ -10496,7 +10750,7 @@
                       <a:r>
                         <a:rPr lang="en-US" sz="2200" dirty="0">
                           <a:solidFill>
-                            <a:schemeClr val="bg1"/>
+                            <a:srgbClr val="00642D"/>
                           </a:solidFill>
                         </a:rPr>
                         <a:t>Bitcoin</a:t>
@@ -10507,7 +10761,7 @@
                       <a:r>
                         <a:rPr lang="en-US" sz="2200" dirty="0">
                           <a:solidFill>
-                            <a:schemeClr val="bg1"/>
+                            <a:srgbClr val="00642D"/>
                           </a:solidFill>
                         </a:rPr>
                         <a:t>(BTC)</a:t>
@@ -10521,11 +10775,12 @@
                     <a:bodyPr/>
                     <a:lstStyle/>
                     <a:p>
+                      <a:pPr algn="ctr"/>
                       <a:r>
-                        <a:rPr lang="en-US" dirty="0"/>
-                        <a:t>0.0033186599612236023</a:t>
+                        <a:rPr lang="en-US" sz="2800" b="0" dirty="0"/>
+                        <a:t>0.0033</a:t>
                       </a:r>
-                      <a:endParaRPr lang="en-US" dirty="0">
+                      <a:endParaRPr lang="en-US" sz="2800" b="0" dirty="0">
                         <a:solidFill>
                           <a:schemeClr val="bg1"/>
                         </a:solidFill>
@@ -10539,11 +10794,12 @@
                     <a:bodyPr/>
                     <a:lstStyle/>
                     <a:p>
+                      <a:pPr algn="ctr"/>
                       <a:r>
-                        <a:rPr lang="en-US" dirty="0"/>
-                        <a:t>0.04206134844135157</a:t>
+                        <a:rPr lang="en-US" sz="2800" b="0" dirty="0"/>
+                        <a:t>0.0421</a:t>
                       </a:r>
-                      <a:endParaRPr lang="en-US" dirty="0">
+                      <a:endParaRPr lang="en-US" sz="2800" b="0" dirty="0">
                         <a:solidFill>
                           <a:schemeClr val="bg1"/>
                         </a:solidFill>
@@ -10557,11 +10813,12 @@
                     <a:bodyPr/>
                     <a:lstStyle/>
                     <a:p>
+                      <a:pPr algn="ctr"/>
                       <a:r>
-                        <a:rPr lang="en-US" dirty="0"/>
-                        <a:t>0.9307371227625145</a:t>
+                        <a:rPr lang="en-US" sz="2800" b="0" dirty="0"/>
+                        <a:t>0.9307</a:t>
                       </a:r>
-                      <a:endParaRPr lang="en-US" dirty="0">
+                      <a:endParaRPr lang="en-US" sz="2800" b="0" dirty="0">
                         <a:solidFill>
                           <a:schemeClr val="bg1"/>
                         </a:solidFill>
@@ -10575,11 +10832,12 @@
                     <a:bodyPr/>
                     <a:lstStyle/>
                     <a:p>
+                      <a:pPr algn="ctr"/>
                       <a:r>
-                        <a:rPr lang="en-US" dirty="0"/>
-                        <a:t>0.057607811633697756</a:t>
+                        <a:rPr lang="en-US" sz="2800" b="0" dirty="0"/>
+                        <a:t>0.0576</a:t>
                       </a:r>
-                      <a:endParaRPr lang="en-US" dirty="0">
+                      <a:endParaRPr lang="en-US" sz="2800" b="0" dirty="0">
                         <a:solidFill>
                           <a:schemeClr val="bg1"/>
                         </a:solidFill>
@@ -10594,7 +10852,7 @@
                   </a:ext>
                 </a:extLst>
               </a:tr>
-              <a:tr h="812421">
+              <a:tr h="848906">
                 <a:tc>
                   <a:txBody>
                     <a:bodyPr/>
@@ -10604,7 +10862,7 @@
                       <a:r>
                         <a:rPr lang="en-US" sz="2200" dirty="0">
                           <a:solidFill>
-                            <a:schemeClr val="bg1"/>
+                            <a:srgbClr val="00642D"/>
                           </a:solidFill>
                         </a:rPr>
                         <a:t>Dogecoin</a:t>
@@ -10615,7 +10873,7 @@
                       <a:r>
                         <a:rPr lang="en-US" sz="2200" dirty="0">
                           <a:solidFill>
-                            <a:schemeClr val="bg1"/>
+                            <a:srgbClr val="00642D"/>
                           </a:solidFill>
                         </a:rPr>
                         <a:t>(Doge)</a:t>
@@ -10629,7 +10887,12 @@
                     <a:bodyPr/>
                     <a:lstStyle/>
                     <a:p>
-                      <a:endParaRPr lang="en-US" dirty="0">
+                      <a:pPr algn="ctr"/>
+                      <a:r>
+                        <a:rPr lang="en-US" sz="2800" b="0" dirty="0"/>
+                        <a:t>0.0034</a:t>
+                      </a:r>
+                      <a:endParaRPr lang="en-US" sz="2800" b="0" dirty="0">
                         <a:solidFill>
                           <a:schemeClr val="bg1"/>
                         </a:solidFill>
@@ -10643,7 +10906,12 @@
                     <a:bodyPr/>
                     <a:lstStyle/>
                     <a:p>
-                      <a:endParaRPr lang="en-US" dirty="0">
+                      <a:pPr algn="ctr"/>
+                      <a:r>
+                        <a:rPr lang="en-US" sz="2800" b="0" dirty="0"/>
+                        <a:t>0.0444</a:t>
+                      </a:r>
+                      <a:endParaRPr lang="en-US" sz="2800" b="0" dirty="0">
                         <a:solidFill>
                           <a:schemeClr val="bg1"/>
                         </a:solidFill>
@@ -10657,7 +10925,12 @@
                     <a:bodyPr/>
                     <a:lstStyle/>
                     <a:p>
-                      <a:endParaRPr lang="en-US">
+                      <a:pPr algn="ctr"/>
+                      <a:r>
+                        <a:rPr lang="en-US" sz="2800" b="0" dirty="0"/>
+                        <a:t>0.7298</a:t>
+                      </a:r>
+                      <a:endParaRPr lang="en-US" sz="2800" b="0" dirty="0">
                         <a:solidFill>
                           <a:schemeClr val="bg1"/>
                         </a:solidFill>
@@ -10671,7 +10944,12 @@
                     <a:bodyPr/>
                     <a:lstStyle/>
                     <a:p>
-                      <a:endParaRPr lang="en-US" dirty="0">
+                      <a:pPr algn="ctr"/>
+                      <a:r>
+                        <a:rPr lang="en-US" sz="2800" b="0" dirty="0"/>
+                        <a:t>0.0586</a:t>
+                      </a:r>
+                      <a:endParaRPr lang="en-US" sz="2800" b="0" dirty="0">
                         <a:solidFill>
                           <a:schemeClr val="bg1"/>
                         </a:solidFill>
@@ -10696,7 +10974,7 @@
                       <a:r>
                         <a:rPr lang="en-US" sz="2200" dirty="0">
                           <a:solidFill>
-                            <a:schemeClr val="bg1"/>
+                            <a:srgbClr val="00642D"/>
                           </a:solidFill>
                         </a:rPr>
                         <a:t>Ethereum</a:t>
@@ -10707,7 +10985,7 @@
                       <a:r>
                         <a:rPr lang="en-US" sz="2200" dirty="0">
                           <a:solidFill>
-                            <a:schemeClr val="bg1"/>
+                            <a:srgbClr val="00642D"/>
                           </a:solidFill>
                         </a:rPr>
                         <a:t>(ETH)</a:t>
@@ -10721,7 +10999,12 @@
                     <a:bodyPr/>
                     <a:lstStyle/>
                     <a:p>
-                      <a:endParaRPr lang="en-US">
+                      <a:pPr algn="ctr"/>
+                      <a:r>
+                        <a:rPr lang="en-US" sz="2800" b="0" dirty="0"/>
+                        <a:t>0.0023</a:t>
+                      </a:r>
+                      <a:endParaRPr lang="en-US" sz="2800" b="0" dirty="0">
                         <a:solidFill>
                           <a:schemeClr val="bg1"/>
                         </a:solidFill>
@@ -10735,7 +11018,12 @@
                     <a:bodyPr/>
                     <a:lstStyle/>
                     <a:p>
-                      <a:endParaRPr lang="en-US" dirty="0">
+                      <a:pPr algn="ctr"/>
+                      <a:r>
+                        <a:rPr lang="en-US" sz="2800" b="0" dirty="0"/>
+                        <a:t>0.0342</a:t>
+                      </a:r>
+                      <a:endParaRPr lang="en-US" sz="2800" b="0" dirty="0">
                         <a:solidFill>
                           <a:schemeClr val="bg1"/>
                         </a:solidFill>
@@ -10749,7 +11037,12 @@
                     <a:bodyPr/>
                     <a:lstStyle/>
                     <a:p>
-                      <a:endParaRPr lang="en-US">
+                      <a:pPr algn="ctr"/>
+                      <a:r>
+                        <a:rPr lang="en-US" sz="2800" b="0" dirty="0"/>
+                        <a:t>0.9532</a:t>
+                      </a:r>
+                      <a:endParaRPr lang="en-US" sz="2800" b="0" dirty="0">
                         <a:solidFill>
                           <a:schemeClr val="bg1"/>
                         </a:solidFill>
@@ -10763,7 +11056,12 @@
                     <a:bodyPr/>
                     <a:lstStyle/>
                     <a:p>
-                      <a:endParaRPr lang="en-US" dirty="0">
+                      <a:pPr algn="ctr"/>
+                      <a:r>
+                        <a:rPr lang="en-US" sz="2800" b="0" dirty="0"/>
+                        <a:t>0.0483</a:t>
+                      </a:r>
+                      <a:endParaRPr lang="en-US" sz="2800" b="0" dirty="0">
                         <a:solidFill>
                           <a:schemeClr val="bg1"/>
                         </a:solidFill>
@@ -10788,7 +11086,7 @@
                       <a:r>
                         <a:rPr lang="en-US" sz="2200" dirty="0">
                           <a:solidFill>
-                            <a:schemeClr val="bg1"/>
+                            <a:srgbClr val="00642D"/>
                           </a:solidFill>
                         </a:rPr>
                         <a:t>Litecoin</a:t>
@@ -10799,7 +11097,7 @@
                       <a:r>
                         <a:rPr lang="en-US" sz="2200" dirty="0">
                           <a:solidFill>
-                            <a:schemeClr val="bg1"/>
+                            <a:srgbClr val="00642D"/>
                           </a:solidFill>
                         </a:rPr>
                         <a:t>(LTC)</a:t>
@@ -10813,7 +11111,12 @@
                     <a:bodyPr/>
                     <a:lstStyle/>
                     <a:p>
-                      <a:endParaRPr lang="en-US" dirty="0">
+                      <a:pPr algn="ctr"/>
+                      <a:r>
+                        <a:rPr lang="en-US" sz="2800" b="0" dirty="0"/>
+                        <a:t>0.0006</a:t>
+                      </a:r>
+                      <a:endParaRPr lang="en-US" sz="2800" b="0" dirty="0">
                         <a:solidFill>
                           <a:schemeClr val="bg1"/>
                         </a:solidFill>
@@ -10827,7 +11130,12 @@
                     <a:bodyPr/>
                     <a:lstStyle/>
                     <a:p>
-                      <a:endParaRPr lang="en-US" dirty="0">
+                      <a:pPr algn="ctr"/>
+                      <a:r>
+                        <a:rPr lang="en-US" sz="2800" b="0" dirty="0"/>
+                        <a:t>0.0135</a:t>
+                      </a:r>
+                      <a:endParaRPr lang="en-US" sz="2800" b="0" dirty="0">
                         <a:solidFill>
                           <a:schemeClr val="bg1"/>
                         </a:solidFill>
@@ -10841,7 +11149,12 @@
                     <a:bodyPr/>
                     <a:lstStyle/>
                     <a:p>
-                      <a:endParaRPr lang="en-US">
+                      <a:pPr algn="ctr"/>
+                      <a:r>
+                        <a:rPr lang="en-US" sz="2800" b="0" dirty="0"/>
+                        <a:t>0.9795</a:t>
+                      </a:r>
+                      <a:endParaRPr lang="en-US" sz="2800" b="0" dirty="0">
                         <a:solidFill>
                           <a:schemeClr val="bg1"/>
                         </a:solidFill>
@@ -10855,7 +11168,12 @@
                     <a:bodyPr/>
                     <a:lstStyle/>
                     <a:p>
-                      <a:endParaRPr lang="en-US">
+                      <a:pPr algn="ctr"/>
+                      <a:r>
+                        <a:rPr lang="en-US" sz="2800" b="0" dirty="0"/>
+                        <a:t>0.0244</a:t>
+                      </a:r>
+                      <a:endParaRPr lang="en-US" sz="2800" b="0" dirty="0">
                         <a:solidFill>
                           <a:schemeClr val="bg1"/>
                         </a:solidFill>
@@ -10880,7 +11198,7 @@
                       <a:r>
                         <a:rPr lang="en-US" sz="2200" dirty="0">
                           <a:solidFill>
-                            <a:schemeClr val="bg1"/>
+                            <a:srgbClr val="00642D"/>
                           </a:solidFill>
                         </a:rPr>
                         <a:t>Ripple</a:t>
@@ -10891,7 +11209,7 @@
                       <a:r>
                         <a:rPr lang="en-US" sz="2200" dirty="0">
                           <a:solidFill>
-                            <a:schemeClr val="bg1"/>
+                            <a:srgbClr val="00642D"/>
                           </a:solidFill>
                         </a:rPr>
                         <a:t>(XRP)</a:t>
@@ -10905,7 +11223,12 @@
                     <a:bodyPr/>
                     <a:lstStyle/>
                     <a:p>
-                      <a:endParaRPr lang="en-US">
+                      <a:pPr algn="ctr"/>
+                      <a:r>
+                        <a:rPr lang="en-US" sz="2800" b="0" dirty="0"/>
+                        <a:t>0.0002</a:t>
+                      </a:r>
+                      <a:endParaRPr lang="en-US" sz="2800" b="0" dirty="0">
                         <a:solidFill>
                           <a:schemeClr val="bg1"/>
                         </a:solidFill>
@@ -10919,7 +11242,12 @@
                     <a:bodyPr/>
                     <a:lstStyle/>
                     <a:p>
-                      <a:endParaRPr lang="en-US">
+                      <a:pPr algn="ctr"/>
+                      <a:r>
+                        <a:rPr lang="en-US" sz="2800" b="0" dirty="0"/>
+                        <a:t>0.0079</a:t>
+                      </a:r>
+                      <a:endParaRPr lang="en-US" sz="2800" b="0" dirty="0">
                         <a:solidFill>
                           <a:schemeClr val="bg1"/>
                         </a:solidFill>
@@ -10933,7 +11261,12 @@
                     <a:bodyPr/>
                     <a:lstStyle/>
                     <a:p>
-                      <a:endParaRPr lang="en-US">
+                      <a:pPr algn="ctr"/>
+                      <a:r>
+                        <a:rPr lang="en-US" sz="2800" b="0" dirty="0"/>
+                        <a:t>0.9855</a:t>
+                      </a:r>
+                      <a:endParaRPr lang="en-US" sz="2800" b="0" dirty="0">
                         <a:solidFill>
                           <a:schemeClr val="bg1"/>
                         </a:solidFill>
@@ -10947,7 +11280,12 @@
                     <a:bodyPr/>
                     <a:lstStyle/>
                     <a:p>
-                      <a:endParaRPr lang="en-US" dirty="0">
+                      <a:pPr algn="ctr"/>
+                      <a:r>
+                        <a:rPr lang="en-US" sz="2800" b="0" dirty="0"/>
+                        <a:t>0.0126</a:t>
+                      </a:r>
+                      <a:endParaRPr lang="en-US" sz="2800" b="0" dirty="0">
                         <a:solidFill>
                           <a:schemeClr val="bg1"/>
                         </a:solidFill>
@@ -11023,7 +11361,7 @@
           <a:lstStyle/>
           <a:p>
             <a:r>
-              <a:rPr lang="en-US" sz="4000" dirty="0">
+              <a:rPr lang="en-US" sz="4000" b="1" dirty="0">
                 <a:solidFill>
                   <a:schemeClr val="bg2">
                     <a:lumMod val="10000"/>
@@ -11031,17 +11369,19 @@
                   </a:schemeClr>
                 </a:solidFill>
                 <a:effectLst/>
+                <a:latin typeface="Calisto MT" panose="02040603050505030304" pitchFamily="18" charset="0"/>
                 <a:ea typeface="Calibri" panose="020F0502020204030204" pitchFamily="34" charset="0"/>
               </a:rPr>
               <a:t>Pricing Trends by Weekday</a:t>
             </a:r>
-            <a:endParaRPr lang="en-US" dirty="0">
+            <a:endParaRPr lang="en-US" b="1" dirty="0">
               <a:solidFill>
                 <a:schemeClr val="bg2">
                   <a:lumMod val="10000"/>
                   <a:lumOff val="90000"/>
                 </a:schemeClr>
               </a:solidFill>
+              <a:latin typeface="Calisto MT" panose="02040603050505030304" pitchFamily="18" charset="0"/>
             </a:endParaRPr>
           </a:p>
         </p:txBody>
@@ -11064,8 +11404,8 @@
         </p:nvSpPr>
         <p:spPr>
           <a:xfrm>
-            <a:off x="654716" y="1178390"/>
-            <a:ext cx="2548952" cy="4815840"/>
+            <a:off x="315686" y="1178390"/>
+            <a:ext cx="2887982" cy="4815840"/>
           </a:xfrm>
         </p:spPr>
         <p:txBody>
@@ -11083,7 +11423,7 @@
           <a:p>
             <a:r>
               <a:rPr lang="en-US" dirty="0"/>
-              <a:t>Dogecoin (Doge)</a:t>
+              <a:t>Dogecoin (DOGE)</a:t>
             </a:r>
           </a:p>
           <a:p>
@@ -11091,12 +11431,8 @@
           </a:p>
           <a:p>
             <a:r>
-              <a:rPr lang="en-US" dirty="0" err="1"/>
-              <a:t>Etherium</a:t>
-            </a:r>
-            <a:r>
               <a:rPr lang="en-US" dirty="0"/>
-              <a:t> (ETH)</a:t>
+              <a:t>Ethereum (ETH)</a:t>
             </a:r>
           </a:p>
           <a:p>
@@ -11149,7 +11485,11 @@
           <a:p>
             <a:pPr algn="l"/>
             <a:r>
-              <a:rPr lang="en-US" sz="2400" dirty="0"/>
+              <a:rPr lang="en-US" sz="2400" b="1" dirty="0">
+                <a:solidFill>
+                  <a:srgbClr val="FFC000"/>
+                </a:solidFill>
+              </a:rPr>
               <a:t>Low: </a:t>
             </a:r>
           </a:p>
@@ -11623,8 +11963,12 @@
           <a:p>
             <a:pPr algn="l"/>
             <a:r>
-              <a:rPr lang="en-US" sz="2400" dirty="0"/>
-              <a:t>High</a:t>
+              <a:rPr lang="en-US" sz="2400" b="1" dirty="0">
+                <a:solidFill>
+                  <a:srgbClr val="669900"/>
+                </a:solidFill>
+              </a:rPr>
+              <a:t>High:</a:t>
             </a:r>
           </a:p>
           <a:p>
@@ -11692,7 +12036,7 @@
                   <a:srgbClr val="0070C0"/>
                 </a:solidFill>
               </a:rPr>
-              <a:t>Sun, Wed &amp; Sat</a:t>
+              <a:t>Sun, Wed, &amp; Sat</a:t>
             </a:r>
           </a:p>
           <a:p>
@@ -11792,22 +12136,22 @@
           <a:lstStyle/>
           <a:p>
             <a:r>
-              <a:rPr lang="en-US" sz="900">
+              <a:rPr lang="en-US" sz="900" dirty="0">
                 <a:hlinkClick r:id="rId4" tooltip="https://freepngimg.com/png/26073-stock-market-graph-up-photos"/>
               </a:rPr>
               <a:t>This Photo</a:t>
             </a:r>
             <a:r>
-              <a:rPr lang="en-US" sz="900"/>
+              <a:rPr lang="en-US" sz="900" dirty="0"/>
               <a:t> by Unknown Author is licensed under </a:t>
             </a:r>
             <a:r>
-              <a:rPr lang="en-US" sz="900">
+              <a:rPr lang="en-US" sz="900" dirty="0">
                 <a:hlinkClick r:id="rId5" tooltip="https://creativecommons.org/licenses/by-nc/3.0/"/>
               </a:rPr>
               <a:t>CC BY-NC</a:t>
             </a:r>
-            <a:endParaRPr lang="en-US" sz="900"/>
+            <a:endParaRPr lang="en-US" sz="900" dirty="0"/>
           </a:p>
         </p:txBody>
       </p:sp>
@@ -11843,268 +12187,68 @@
       </p:grpSpPr>
       <p:sp>
         <p:nvSpPr>
-          <p:cNvPr id="2" name="Title 1">
+          <p:cNvPr id="9" name="Title 8">
             <a:extLst>
               <a:ext uri="{FF2B5EF4-FFF2-40B4-BE49-F238E27FC236}">
-                <a16:creationId xmlns:a16="http://schemas.microsoft.com/office/drawing/2014/main" id="{F6FD8A51-5624-DE7A-1CF6-EEE978C474D5}"/>
+                <a16:creationId xmlns:a16="http://schemas.microsoft.com/office/drawing/2014/main" id="{904A0E28-65CE-AE4C-B8C3-32619B528FB1}"/>
               </a:ext>
             </a:extLst>
           </p:cNvPr>
-          <p:cNvSpPr txBox="1">
-            <a:spLocks/>
-          </p:cNvSpPr>
-          <p:nvPr/>
+          <p:cNvSpPr>
+            <a:spLocks noGrp="1"/>
+          </p:cNvSpPr>
+          <p:nvPr>
+            <p:ph type="title"/>
+          </p:nvPr>
         </p:nvSpPr>
         <p:spPr>
           <a:xfrm>
-            <a:off x="831162" y="46892"/>
-            <a:ext cx="10353762" cy="970450"/>
+            <a:off x="1124192" y="350520"/>
+            <a:ext cx="6663448" cy="926199"/>
           </a:xfrm>
-          <a:prstGeom prst="rect">
-            <a:avLst/>
-          </a:prstGeom>
         </p:spPr>
         <p:txBody>
-          <a:bodyPr/>
-          <a:lstStyle>
-            <a:lvl1pPr algn="ctr" defTabSz="457200" rtl="0" eaLnBrk="1" latinLnBrk="0" hangingPunct="1">
-              <a:spcBef>
-                <a:spcPct val="0"/>
-              </a:spcBef>
-              <a:buNone/>
-              <a:defRPr sz="4000" kern="1200">
-                <a:ln>
-                  <a:solidFill>
-                    <a:schemeClr val="bg1">
-                      <a:lumMod val="75000"/>
-                      <a:lumOff val="25000"/>
-                      <a:alpha val="10000"/>
-                    </a:schemeClr>
-                  </a:solidFill>
-                </a:ln>
-                <a:solidFill>
-                  <a:schemeClr val="tx2"/>
-                </a:solidFill>
-                <a:effectLst>
-                  <a:outerShdw blurRad="9525" dist="25400" dir="14640000" algn="tl" rotWithShape="0">
-                    <a:schemeClr val="bg1">
-                      <a:alpha val="30000"/>
-                    </a:schemeClr>
-                  </a:outerShdw>
-                </a:effectLst>
-                <a:latin typeface="+mj-lt"/>
-                <a:ea typeface="+mj-ea"/>
-                <a:cs typeface="Trebuchet MS"/>
-              </a:defRPr>
-            </a:lvl1pPr>
-            <a:lvl2pPr eaLnBrk="1" hangingPunct="1">
-              <a:defRPr>
-                <a:solidFill>
-                  <a:schemeClr val="tx2"/>
-                </a:solidFill>
-              </a:defRPr>
-            </a:lvl2pPr>
-            <a:lvl3pPr eaLnBrk="1" hangingPunct="1">
-              <a:defRPr>
-                <a:solidFill>
-                  <a:schemeClr val="tx2"/>
-                </a:solidFill>
-              </a:defRPr>
-            </a:lvl3pPr>
-            <a:lvl4pPr eaLnBrk="1" hangingPunct="1">
-              <a:defRPr>
-                <a:solidFill>
-                  <a:schemeClr val="tx2"/>
-                </a:solidFill>
-              </a:defRPr>
-            </a:lvl4pPr>
-            <a:lvl5pPr eaLnBrk="1" hangingPunct="1">
-              <a:defRPr>
-                <a:solidFill>
-                  <a:schemeClr val="tx2"/>
-                </a:solidFill>
-              </a:defRPr>
-            </a:lvl5pPr>
-            <a:lvl6pPr eaLnBrk="1" hangingPunct="1">
-              <a:defRPr>
-                <a:solidFill>
-                  <a:schemeClr val="tx2"/>
-                </a:solidFill>
-              </a:defRPr>
-            </a:lvl6pPr>
-            <a:lvl7pPr eaLnBrk="1" hangingPunct="1">
-              <a:defRPr>
-                <a:solidFill>
-                  <a:schemeClr val="tx2"/>
-                </a:solidFill>
-              </a:defRPr>
-            </a:lvl7pPr>
-            <a:lvl8pPr eaLnBrk="1" hangingPunct="1">
-              <a:defRPr>
-                <a:solidFill>
-                  <a:schemeClr val="tx2"/>
-                </a:solidFill>
-              </a:defRPr>
-            </a:lvl8pPr>
-            <a:lvl9pPr eaLnBrk="1" hangingPunct="1">
-              <a:defRPr>
-                <a:solidFill>
-                  <a:schemeClr val="tx2"/>
-                </a:solidFill>
-              </a:defRPr>
-            </a:lvl9pPr>
-          </a:lstStyle>
-          <a:p>
-            <a:r>
-              <a:rPr lang="en-US" dirty="0">
-                <a:solidFill>
-                  <a:schemeClr val="bg2">
-                    <a:lumMod val="10000"/>
-                    <a:lumOff val="90000"/>
-                  </a:schemeClr>
-                </a:solidFill>
-                <a:effectLst/>
-                <a:latin typeface="Arial" panose="020B0604020202020204" pitchFamily="34" charset="0"/>
-                <a:ea typeface="Calibri" panose="020F0502020204030204" pitchFamily="34" charset="0"/>
+          <a:bodyPr>
+            <a:normAutofit/>
+          </a:bodyPr>
+          <a:lstStyle/>
+          <a:p>
+            <a:r>
+              <a:rPr lang="en-US" sz="4800" b="1" dirty="0">
+                <a:solidFill>
+                  <a:srgbClr val="A365D1"/>
+                </a:solidFill>
               </a:rPr>
               <a:t>Future Enhancements</a:t>
             </a:r>
-            <a:endParaRPr lang="en-US" dirty="0">
-              <a:solidFill>
-                <a:schemeClr val="bg2">
-                  <a:lumMod val="10000"/>
-                  <a:lumOff val="90000"/>
-                </a:schemeClr>
-              </a:solidFill>
-            </a:endParaRPr>
-          </a:p>
-        </p:txBody>
-      </p:sp>
-      <p:sp>
-        <p:nvSpPr>
-          <p:cNvPr id="6" name="Rectangle 2">
+          </a:p>
+        </p:txBody>
+      </p:sp>
+      <p:sp>
+        <p:nvSpPr>
+          <p:cNvPr id="11" name="Text Placeholder 10">
             <a:extLst>
               <a:ext uri="{FF2B5EF4-FFF2-40B4-BE49-F238E27FC236}">
-                <a16:creationId xmlns:a16="http://schemas.microsoft.com/office/drawing/2014/main" id="{3C0C2272-B21F-5B2A-EC75-56D812155395}"/>
+                <a16:creationId xmlns:a16="http://schemas.microsoft.com/office/drawing/2014/main" id="{196B1E9E-7AA7-6C00-4E84-4A04A352E78F}"/>
               </a:ext>
             </a:extLst>
           </p:cNvPr>
           <p:cNvSpPr>
-            <a:spLocks noChangeArrowheads="1"/>
-          </p:cNvSpPr>
-          <p:nvPr/>
-        </p:nvSpPr>
-        <p:spPr bwMode="auto">
+            <a:spLocks noGrp="1"/>
+          </p:cNvSpPr>
+          <p:nvPr>
+            <p:ph type="body" sz="half" idx="2"/>
+          </p:nvPr>
+        </p:nvSpPr>
+        <p:spPr>
           <a:xfrm>
-            <a:off x="913795" y="5758208"/>
-            <a:ext cx="65" cy="276999"/>
+            <a:off x="852835" y="1413879"/>
+            <a:ext cx="7605365" cy="4834521"/>
           </a:xfrm>
-          <a:prstGeom prst="rect">
-            <a:avLst/>
-          </a:prstGeom>
-          <a:solidFill>
-            <a:srgbClr val="FFFFFF"/>
-          </a:solidFill>
-          <a:ln>
-            <a:noFill/>
-          </a:ln>
-          <a:effectLst/>
-          <a:extLst>
-            <a:ext uri="{91240B29-F687-4F45-9708-019B960494DF}">
-              <a14:hiddenLine xmlns:a14="http://schemas.microsoft.com/office/drawing/2010/main" w="9525">
-                <a:solidFill>
-                  <a:schemeClr val="tx1"/>
-                </a:solidFill>
-                <a:miter lim="800000"/>
-                <a:headEnd/>
-                <a:tailEnd/>
-              </a14:hiddenLine>
-            </a:ext>
-            <a:ext uri="{AF507438-7753-43E0-B8FC-AC1667EBCBE1}">
-              <a14:hiddenEffects xmlns:a14="http://schemas.microsoft.com/office/drawing/2010/main">
-                <a:effectLst>
-                  <a:outerShdw dist="35921" dir="2700000" algn="ctr" rotWithShape="0">
-                    <a:schemeClr val="bg2"/>
-                  </a:outerShdw>
-                </a:effectLst>
-              </a14:hiddenEffects>
-            </a:ext>
-          </a:extLst>
         </p:spPr>
         <p:txBody>
-          <a:bodyPr vert="horz" wrap="none" lIns="0" tIns="0" rIns="0" bIns="0" numCol="1" anchor="ctr" anchorCtr="0" compatLnSpc="1">
-            <a:prstTxWarp prst="textNoShape">
-              <a:avLst/>
-            </a:prstTxWarp>
-            <a:spAutoFit/>
-          </a:bodyPr>
-          <a:lstStyle/>
-          <a:p>
-            <a:pPr marL="0" marR="0" lvl="0" indent="0" algn="l" defTabSz="914400" rtl="0" eaLnBrk="0" fontAlgn="base" latinLnBrk="0" hangingPunct="0">
-              <a:lnSpc>
-                <a:spcPct val="100000"/>
-              </a:lnSpc>
-              <a:spcBef>
-                <a:spcPct val="0"/>
-              </a:spcBef>
-              <a:spcAft>
-                <a:spcPct val="0"/>
-              </a:spcAft>
-              <a:buClrTx/>
-              <a:buSzTx/>
-              <a:buFontTx/>
-              <a:buNone/>
-              <a:tabLst/>
-            </a:pPr>
-            <a:endParaRPr kumimoji="0" lang="en-US" altLang="en-US" sz="1800" b="0" i="0" u="none" strike="noStrike" cap="none" normalizeH="0" baseline="0" dirty="0">
-              <a:ln>
-                <a:noFill/>
-              </a:ln>
-              <a:solidFill>
-                <a:schemeClr val="tx1"/>
-              </a:solidFill>
-              <a:effectLst/>
-              <a:latin typeface="Arial" panose="020B0604020202020204" pitchFamily="34" charset="0"/>
-            </a:endParaRPr>
-          </a:p>
-        </p:txBody>
-      </p:sp>
-      <p:sp>
-        <p:nvSpPr>
-          <p:cNvPr id="7" name="Rectangle 3">
-            <a:extLst>
-              <a:ext uri="{FF2B5EF4-FFF2-40B4-BE49-F238E27FC236}">
-                <a16:creationId xmlns:a16="http://schemas.microsoft.com/office/drawing/2014/main" id="{E96210A1-7454-778D-6E16-DE1ECAA0AA15}"/>
-              </a:ext>
-            </a:extLst>
-          </p:cNvPr>
-          <p:cNvSpPr>
-            <a:spLocks noChangeArrowheads="1"/>
-          </p:cNvSpPr>
-          <p:nvPr/>
-        </p:nvSpPr>
-        <p:spPr bwMode="auto">
-          <a:xfrm>
-            <a:off x="222738" y="929918"/>
-            <a:ext cx="11570611" cy="5478423"/>
-          </a:xfrm>
-          <a:prstGeom prst="rect">
-            <a:avLst/>
-          </a:prstGeom>
-          <a:solidFill>
-            <a:schemeClr val="bg1"/>
-          </a:solidFill>
-          <a:ln>
-            <a:noFill/>
-          </a:ln>
-          <a:effectLst/>
-        </p:spPr>
-        <p:txBody>
-          <a:bodyPr vert="horz" wrap="square" lIns="0" tIns="0" rIns="0" bIns="0" numCol="1" anchor="ctr" anchorCtr="0" compatLnSpc="1">
-            <a:prstTxWarp prst="textNoShape">
-              <a:avLst/>
-            </a:prstTxWarp>
-            <a:spAutoFit/>
+          <a:bodyPr>
+            <a:normAutofit/>
           </a:bodyPr>
           <a:lstStyle/>
           <a:p>
@@ -12125,7 +12269,7 @@
               <a:tabLst/>
             </a:pPr>
             <a:r>
-              <a:rPr lang="en-US" altLang="en-US" sz="2600" dirty="0">
+              <a:rPr lang="en-US" altLang="en-US" sz="2400" dirty="0">
                 <a:solidFill>
                   <a:schemeClr val="tx2">
                     <a:lumMod val="90000"/>
@@ -12153,7 +12297,7 @@
               <a:tabLst/>
             </a:pPr>
             <a:r>
-              <a:rPr kumimoji="0" lang="en-US" altLang="en-US" sz="2600" b="0" i="0" u="none" strike="noStrike" cap="none" normalizeH="0" baseline="0" dirty="0">
+              <a:rPr kumimoji="0" lang="en-US" altLang="en-US" sz="2400" b="0" i="0" u="none" strike="noStrike" cap="none" normalizeH="0" baseline="0" dirty="0">
                 <a:ln>
                   <a:noFill/>
                 </a:ln>
@@ -12167,7 +12311,7 @@
               <a:t>Link prediction model to AP</a:t>
             </a:r>
             <a:r>
-              <a:rPr lang="en-US" altLang="en-US" sz="2600" dirty="0">
+              <a:rPr lang="en-US" altLang="en-US" sz="2400" dirty="0">
                 <a:solidFill>
                   <a:schemeClr val="tx2">
                     <a:lumMod val="90000"/>
@@ -12195,7 +12339,7 @@
               <a:tabLst/>
             </a:pPr>
             <a:r>
-              <a:rPr kumimoji="0" lang="en-US" altLang="en-US" sz="2600" b="0" i="0" u="none" strike="noStrike" cap="none" normalizeH="0" baseline="0" dirty="0">
+              <a:rPr kumimoji="0" lang="en-US" altLang="en-US" sz="2400" b="0" i="0" u="none" strike="noStrike" cap="none" normalizeH="0" baseline="0" dirty="0">
                 <a:ln>
                   <a:noFill/>
                 </a:ln>
@@ -12227,7 +12371,7 @@
               <a:tabLst/>
             </a:pPr>
             <a:r>
-              <a:rPr kumimoji="0" lang="en-US" altLang="en-US" sz="2600" b="0" i="0" u="none" strike="noStrike" cap="none" normalizeH="0" baseline="0" dirty="0">
+              <a:rPr kumimoji="0" lang="en-US" altLang="en-US" sz="2400" b="0" i="0" u="none" strike="noStrike" cap="none" normalizeH="0" baseline="0" dirty="0">
                 <a:ln>
                   <a:noFill/>
                 </a:ln>
@@ -12259,14 +12403,14 @@
               <a:tabLst/>
             </a:pPr>
             <a:r>
-              <a:rPr lang="en-US" altLang="en-US" sz="2600" dirty="0">
+              <a:rPr lang="en-US" altLang="en-US" sz="2400" dirty="0">
                 <a:solidFill>
                   <a:schemeClr val="tx2">
                     <a:lumMod val="90000"/>
                   </a:schemeClr>
                 </a:solidFill>
               </a:rPr>
-              <a:t>Use Dropout to prevent overfitting</a:t>
+              <a:t>Use Dropout &amp; Early Stopping in Keras</a:t>
             </a:r>
           </a:p>
           <a:p>
@@ -12287,26 +12431,15 @@
               <a:tabLst/>
             </a:pPr>
             <a:r>
-              <a:rPr kumimoji="0" lang="en-US" altLang="en-US" sz="2600" b="0" i="0" u="none" strike="noStrike" cap="none" normalizeH="0" baseline="0" dirty="0">
-                <a:ln>
-                  <a:noFill/>
-                </a:ln>
+              <a:rPr lang="en-US" altLang="en-US" sz="2400" dirty="0">
                 <a:solidFill>
                   <a:schemeClr val="tx2">
                     <a:lumMod val="90000"/>
                   </a:schemeClr>
                 </a:solidFill>
-                <a:effectLst/>
-              </a:rPr>
-              <a:t>Use Early Stopping to prevent overfitting</a:t>
-            </a:r>
-            <a:endParaRPr lang="en-US" altLang="en-US" sz="2600" dirty="0">
-              <a:solidFill>
-                <a:schemeClr val="tx2">
-                  <a:lumMod val="90000"/>
-                </a:schemeClr>
-              </a:solidFill>
-            </a:endParaRPr>
+              </a:rPr>
+              <a:t>More features – technical indicators</a:t>
+            </a:r>
           </a:p>
           <a:p>
             <a:pPr marL="342900" marR="0" lvl="0" indent="-342900" algn="l" defTabSz="914400" rtl="0" eaLnBrk="0" fontAlgn="base" latinLnBrk="0" hangingPunct="0">
@@ -12326,14 +12459,18 @@
               <a:tabLst/>
             </a:pPr>
             <a:r>
-              <a:rPr lang="en-US" altLang="en-US" sz="2600" dirty="0">
+              <a:rPr kumimoji="0" lang="en-US" altLang="en-US" sz="2400" b="0" i="0" u="none" strike="noStrike" cap="none" normalizeH="0" baseline="0" dirty="0">
+                <a:ln>
+                  <a:noFill/>
+                </a:ln>
                 <a:solidFill>
                   <a:schemeClr val="tx2">
                     <a:lumMod val="90000"/>
                   </a:schemeClr>
                 </a:solidFill>
-              </a:rPr>
-              <a:t>More features – technical indicators</a:t>
+                <a:effectLst/>
+              </a:rPr>
+              <a:t>Use other models (RNN, CNN, Random Forest)</a:t>
             </a:r>
           </a:p>
           <a:p>
@@ -12354,7 +12491,7 @@
               <a:tabLst/>
             </a:pPr>
             <a:r>
-              <a:rPr kumimoji="0" lang="en-US" altLang="en-US" sz="2600" b="0" i="0" u="none" strike="noStrike" cap="none" normalizeH="0" baseline="0" dirty="0">
+              <a:rPr kumimoji="0" lang="en-US" altLang="en-US" sz="2400" b="0" i="0" u="none" strike="noStrike" cap="none" normalizeH="0" baseline="0" dirty="0">
                 <a:ln>
                   <a:noFill/>
                 </a:ln>
@@ -12365,7 +12502,17 @@
                 </a:solidFill>
                 <a:effectLst/>
               </a:rPr>
-              <a:t>Use other RNN, CNN Models</a:t>
+              <a:t>Optimize hyperparameters – learning rate, batch si</a:t>
+            </a:r>
+            <a:r>
+              <a:rPr lang="en-US" altLang="en-US" sz="2400" dirty="0">
+                <a:solidFill>
+                  <a:schemeClr val="tx2">
+                    <a:lumMod val="90000"/>
+                  </a:schemeClr>
+                </a:solidFill>
+              </a:rPr>
+              <a:t>ze, # of epochs</a:t>
             </a:r>
           </a:p>
           <a:p>
@@ -12386,14 +12533,18 @@
               <a:tabLst/>
             </a:pPr>
             <a:r>
-              <a:rPr lang="en-US" altLang="en-US" sz="2600" dirty="0">
+              <a:rPr kumimoji="0" lang="en-US" altLang="en-US" sz="2400" b="0" i="0" u="none" strike="noStrike" cap="none" normalizeH="0" baseline="0" dirty="0">
+                <a:ln>
+                  <a:noFill/>
+                </a:ln>
                 <a:solidFill>
                   <a:schemeClr val="tx2">
                     <a:lumMod val="90000"/>
                   </a:schemeClr>
                 </a:solidFill>
-              </a:rPr>
-              <a:t>Try ensemble methods like Random Forest</a:t>
+                <a:effectLst/>
+              </a:rPr>
+              <a:t>Different Loss Function (Mean Absolute Percentage Error)</a:t>
             </a:r>
           </a:p>
           <a:p>
@@ -12414,90 +12565,16 @@
               <a:tabLst/>
             </a:pPr>
             <a:r>
-              <a:rPr kumimoji="0" lang="en-US" altLang="en-US" sz="2600" b="0" i="0" u="none" strike="noStrike" cap="none" normalizeH="0" baseline="0" dirty="0">
-                <a:ln>
-                  <a:noFill/>
-                </a:ln>
+              <a:rPr lang="en-US" altLang="en-US" sz="2400" dirty="0">
                 <a:solidFill>
                   <a:schemeClr val="tx2">
                     <a:lumMod val="90000"/>
                   </a:schemeClr>
                 </a:solidFill>
-                <a:effectLst/>
-              </a:rPr>
-              <a:t>Optimize hyperparameters – learning rate, batch si</a:t>
-            </a:r>
-            <a:r>
-              <a:rPr lang="en-US" altLang="en-US" sz="2600" dirty="0">
-                <a:solidFill>
-                  <a:schemeClr val="tx2">
-                    <a:lumMod val="90000"/>
-                  </a:schemeClr>
-                </a:solidFill>
-              </a:rPr>
-              <a:t>ze, # of epochs</a:t>
-            </a:r>
-          </a:p>
-          <a:p>
-            <a:pPr marL="342900" marR="0" lvl="0" indent="-342900" algn="l" defTabSz="914400" rtl="0" eaLnBrk="0" fontAlgn="base" latinLnBrk="0" hangingPunct="0">
-              <a:lnSpc>
-                <a:spcPct val="100000"/>
-              </a:lnSpc>
-              <a:spcBef>
-                <a:spcPct val="0"/>
-              </a:spcBef>
-              <a:spcAft>
-                <a:spcPct val="0"/>
-              </a:spcAft>
-              <a:buClrTx/>
-              <a:buSzTx/>
-              <a:buFont typeface="Arial" panose="020B0604020202020204" pitchFamily="34" charset="0"/>
-              <a:buChar char="•"/>
-              <a:tabLst/>
-            </a:pPr>
-            <a:r>
-              <a:rPr kumimoji="0" lang="en-US" altLang="en-US" sz="2600" b="0" i="0" u="none" strike="noStrike" cap="none" normalizeH="0" baseline="0" dirty="0">
-                <a:ln>
-                  <a:noFill/>
-                </a:ln>
-                <a:solidFill>
-                  <a:schemeClr val="tx2">
-                    <a:lumMod val="90000"/>
-                  </a:schemeClr>
-                </a:solidFill>
-                <a:effectLst/>
-              </a:rPr>
-              <a:t>Try using Loss Function Mean Absolute Percentage Error (MAPE) to evaluate model</a:t>
-            </a:r>
-          </a:p>
-          <a:p>
-            <a:pPr marL="342900" marR="0" lvl="0" indent="-342900" algn="l" defTabSz="914400" rtl="0" eaLnBrk="0" fontAlgn="base" latinLnBrk="0" hangingPunct="0">
-              <a:lnSpc>
-                <a:spcPct val="100000"/>
-              </a:lnSpc>
-              <a:spcBef>
-                <a:spcPct val="0"/>
-              </a:spcBef>
-              <a:spcAft>
-                <a:spcPct val="0"/>
-              </a:spcAft>
-              <a:buClrTx/>
-              <a:buSzTx/>
-              <a:buFont typeface="Arial" panose="020B0604020202020204" pitchFamily="34" charset="0"/>
-              <a:buChar char="•"/>
-              <a:tabLst/>
-            </a:pPr>
-            <a:r>
-              <a:rPr lang="en-US" altLang="en-US" sz="2600" dirty="0">
-                <a:solidFill>
-                  <a:schemeClr val="tx2">
-                    <a:lumMod val="90000"/>
-                  </a:schemeClr>
-                </a:solidFill>
-              </a:rPr>
-              <a:t>Try different activation functions like Sigmoid or Tanh</a:t>
-            </a:r>
-            <a:endParaRPr kumimoji="0" lang="en-US" altLang="en-US" sz="2600" b="0" i="0" u="none" strike="noStrike" cap="none" normalizeH="0" baseline="0" dirty="0">
+              </a:rPr>
+              <a:t>Try different activation functions (Sigmoid or Tanh)</a:t>
+            </a:r>
+            <a:endParaRPr kumimoji="0" lang="en-US" altLang="en-US" sz="2400" b="0" i="0" u="none" strike="noStrike" cap="none" normalizeH="0" baseline="0" dirty="0">
               <a:ln>
                 <a:noFill/>
               </a:ln>
@@ -12510,46 +12587,21 @@
             </a:endParaRPr>
           </a:p>
           <a:p>
-            <a:pPr marL="0" marR="0" lvl="0" indent="0" algn="l" defTabSz="914400" rtl="0" eaLnBrk="0" fontAlgn="base" latinLnBrk="0" hangingPunct="0">
-              <a:lnSpc>
-                <a:spcPct val="100000"/>
-              </a:lnSpc>
-              <a:spcBef>
-                <a:spcPct val="0"/>
-              </a:spcBef>
-              <a:spcAft>
-                <a:spcPct val="0"/>
-              </a:spcAft>
-              <a:buClrTx/>
-              <a:buSzTx/>
-              <a:buFontTx/>
-              <a:buNone/>
-              <a:tabLst/>
-            </a:pPr>
-            <a:endParaRPr kumimoji="0" lang="en-US" altLang="en-US" sz="1800" b="0" i="0" u="none" strike="noStrike" cap="none" normalizeH="0" baseline="0" dirty="0">
-              <a:ln>
-                <a:noFill/>
-              </a:ln>
-              <a:solidFill>
-                <a:schemeClr val="tx1"/>
-              </a:solidFill>
-              <a:effectLst/>
-              <a:latin typeface="Arial" panose="020B0604020202020204" pitchFamily="34" charset="0"/>
-            </a:endParaRPr>
+            <a:endParaRPr lang="en-US" dirty="0"/>
           </a:p>
         </p:txBody>
       </p:sp>
       <p:pic>
         <p:nvPicPr>
-          <p:cNvPr id="9" name="Picture 8" descr="Background pattern&#10;&#10;Description automatically generated">
+          <p:cNvPr id="1026" name="Picture 2" descr="Neural-Network Hardware Drives the Latest Machine-Learning Craze |  Electronic Design">
             <a:extLst>
               <a:ext uri="{FF2B5EF4-FFF2-40B4-BE49-F238E27FC236}">
-                <a16:creationId xmlns:a16="http://schemas.microsoft.com/office/drawing/2014/main" id="{AFFEDF0A-EED9-F68D-EB16-87497A30F5EF}"/>
+                <a16:creationId xmlns:a16="http://schemas.microsoft.com/office/drawing/2014/main" id="{7856C69F-B2E6-4F8A-7B41-633E5ABCFD42}"/>
               </a:ext>
             </a:extLst>
           </p:cNvPr>
           <p:cNvPicPr>
-            <a:picLocks noChangeAspect="1"/>
+            <a:picLocks noChangeAspect="1" noChangeArrowheads="1"/>
           </p:cNvPicPr>
           <p:nvPr/>
         </p:nvPicPr>
@@ -12559,31 +12611,39 @@
               <a:ext uri="{28A0092B-C50C-407E-A947-70E740481C1C}">
                 <a14:useLocalDpi xmlns:a14="http://schemas.microsoft.com/office/drawing/2010/main" val="0"/>
               </a:ext>
-              <a:ext uri="{837473B0-CC2E-450A-ABE3-18F120FF3D39}">
-                <a1611:picAttrSrcUrl xmlns:a1611="http://schemas.microsoft.com/office/drawing/2016/11/main" r:id="rId4"/>
-              </a:ext>
             </a:extLst>
           </a:blip>
+          <a:srcRect/>
           <a:stretch>
             <a:fillRect/>
           </a:stretch>
         </p:blipFill>
-        <p:spPr>
+        <p:spPr bwMode="auto">
           <a:xfrm>
-            <a:off x="8063772" y="1121325"/>
-            <a:ext cx="3121152" cy="2081784"/>
+            <a:off x="7631430" y="1099185"/>
+            <a:ext cx="3971034" cy="2207895"/>
           </a:xfrm>
           <a:prstGeom prst="rect">
             <a:avLst/>
           </a:prstGeom>
+          <a:noFill/>
+          <a:extLst>
+            <a:ext uri="{909E8E84-426E-40DD-AFC4-6F175D3DCCD1}">
+              <a14:hiddenFill xmlns:a14="http://schemas.microsoft.com/office/drawing/2010/main">
+                <a:solidFill>
+                  <a:srgbClr val="FFFFFF"/>
+                </a:solidFill>
+              </a14:hiddenFill>
+            </a:ext>
+          </a:extLst>
         </p:spPr>
       </p:pic>
       <p:sp>
         <p:nvSpPr>
-          <p:cNvPr id="10" name="TextBox 9">
+          <p:cNvPr id="12" name="TextBox 11">
             <a:extLst>
               <a:ext uri="{FF2B5EF4-FFF2-40B4-BE49-F238E27FC236}">
-                <a16:creationId xmlns:a16="http://schemas.microsoft.com/office/drawing/2014/main" id="{44C281EF-5C34-BE1E-DF86-B505DEA5A92F}"/>
+                <a16:creationId xmlns:a16="http://schemas.microsoft.com/office/drawing/2014/main" id="{143F6494-0D23-3898-74DD-96818005C846}"/>
               </a:ext>
             </a:extLst>
           </p:cNvPr>
@@ -12592,8 +12652,8 @@
         </p:nvSpPr>
         <p:spPr>
           <a:xfrm>
-            <a:off x="8063772" y="3203109"/>
-            <a:ext cx="3121152" cy="369332"/>
+            <a:off x="7998821" y="3328824"/>
+            <a:ext cx="3236252" cy="369332"/>
           </a:xfrm>
           <a:prstGeom prst="rect">
             <a:avLst/>
@@ -12607,29 +12667,29 @@
           <a:lstStyle/>
           <a:p>
             <a:r>
-              <a:rPr lang="en-US" sz="900">
+              <a:rPr lang="en-US" sz="900" dirty="0">
                 <a:hlinkClick r:id="rId4" tooltip="https://technofaq.org/posts/2020/09/the-fashion-of-the-future-what-will-tech-bring-next/"/>
               </a:rPr>
               <a:t>This Photo</a:t>
             </a:r>
             <a:r>
-              <a:rPr lang="en-US" sz="900"/>
+              <a:rPr lang="en-US" sz="900" dirty="0"/>
               <a:t> by Unknown Author is licensed under </a:t>
             </a:r>
             <a:r>
-              <a:rPr lang="en-US" sz="900">
+              <a:rPr lang="en-US" sz="900" dirty="0">
                 <a:hlinkClick r:id="rId5" tooltip="https://creativecommons.org/licenses/by-nc-sa/3.0/"/>
               </a:rPr>
               <a:t>CC BY-SA-NC</a:t>
             </a:r>
-            <a:endParaRPr lang="en-US" sz="900"/>
+            <a:endParaRPr lang="en-US" sz="900" dirty="0"/>
           </a:p>
         </p:txBody>
       </p:sp>
     </p:spTree>
     <p:extLst>
       <p:ext uri="{BB962C8B-B14F-4D97-AF65-F5344CB8AC3E}">
-        <p14:creationId xmlns:p14="http://schemas.microsoft.com/office/powerpoint/2010/main" val="3026855493"/>
+        <p14:creationId xmlns:p14="http://schemas.microsoft.com/office/powerpoint/2010/main" val="2760630526"/>
       </p:ext>
     </p:extLst>
   </p:cSld>
@@ -12837,7 +12897,7 @@
     </p:spTree>
     <p:extLst>
       <p:ext uri="{BB962C8B-B14F-4D97-AF65-F5344CB8AC3E}">
-        <p14:creationId xmlns:p14="http://schemas.microsoft.com/office/powerpoint/2010/main" val="2079342973"/>
+        <p14:creationId xmlns:p14="http://schemas.microsoft.com/office/powerpoint/2010/main" val="3026855493"/>
       </p:ext>
     </p:extLst>
   </p:cSld>
@@ -12902,7 +12962,7 @@
         <p:spPr>
           <a:xfrm>
             <a:off x="913795" y="1097280"/>
-            <a:ext cx="3256177" cy="4626863"/>
+            <a:ext cx="3841085" cy="4626863"/>
           </a:xfrm>
         </p:spPr>
         <p:txBody>
@@ -12912,14 +12972,20 @@
           <a:lstStyle/>
           <a:p>
             <a:r>
-              <a:rPr lang="en-US" sz="2600" dirty="0"/>
+              <a:rPr lang="en-US" sz="3200" b="1" dirty="0"/>
               <a:t>Cryptocurrency</a:t>
             </a:r>
           </a:p>
           <a:p>
-            <a:pPr algn="l"/>
-            <a:r>
-              <a:rPr lang="en-US" dirty="0">
+            <a:endParaRPr lang="en-US" sz="3200" b="1" dirty="0"/>
+          </a:p>
+          <a:p>
+            <a:pPr marL="342900" indent="-342900" algn="l">
+              <a:buFont typeface="Arial" panose="020B0604020202020204" pitchFamily="34" charset="0"/>
+              <a:buChar char="•"/>
+            </a:pPr>
+            <a:r>
+              <a:rPr lang="en-US" sz="2400" dirty="0">
                 <a:solidFill>
                   <a:srgbClr val="0070C0"/>
                 </a:solidFill>
@@ -12928,9 +12994,12 @@
             </a:r>
           </a:p>
           <a:p>
-            <a:pPr algn="l"/>
-            <a:r>
-              <a:rPr lang="en-US" dirty="0">
+            <a:pPr marL="342900" indent="-342900" algn="l">
+              <a:buFont typeface="Arial" panose="020B0604020202020204" pitchFamily="34" charset="0"/>
+              <a:buChar char="•"/>
+            </a:pPr>
+            <a:r>
+              <a:rPr lang="en-US" sz="2400" dirty="0">
                 <a:solidFill>
                   <a:srgbClr val="0070C0"/>
                 </a:solidFill>
@@ -12939,14 +13008,17 @@
             </a:r>
           </a:p>
           <a:p>
-            <a:pPr algn="l"/>
-            <a:r>
-              <a:rPr lang="en-US" dirty="0">
+            <a:pPr marL="342900" indent="-342900" algn="l">
+              <a:buFont typeface="Arial" panose="020B0604020202020204" pitchFamily="34" charset="0"/>
+              <a:buChar char="•"/>
+            </a:pPr>
+            <a:r>
+              <a:rPr lang="en-US" sz="2400" dirty="0">
                 <a:solidFill>
                   <a:srgbClr val="0070C0"/>
                 </a:solidFill>
               </a:rPr>
-              <a:t>Hard to understand </a:t>
+              <a:t>Volatile &amp; Hard to Predict</a:t>
             </a:r>
           </a:p>
           <a:p>
@@ -13109,8 +13181,8 @@
         </p:nvSpPr>
         <p:spPr>
           <a:xfrm>
-            <a:off x="7857028" y="1078523"/>
-            <a:ext cx="4030172" cy="4440059"/>
+            <a:off x="7239000" y="2885436"/>
+            <a:ext cx="4648200" cy="2633146"/>
           </a:xfrm>
         </p:spPr>
         <p:txBody>
@@ -13125,8 +13197,12 @@
               </a:lnSpc>
             </a:pPr>
             <a:r>
-              <a:rPr lang="en-US" sz="4000" b="1" dirty="0"/>
-              <a:t>5 cryptocurrencies:</a:t>
+              <a:rPr lang="en-US" sz="4900" b="1" dirty="0">
+                <a:solidFill>
+                  <a:srgbClr val="669900"/>
+                </a:solidFill>
+              </a:rPr>
+              <a:t>Five Cryptocurrencies:</a:t>
             </a:r>
             <a:br>
               <a:rPr lang="en-US" sz="4000" dirty="0"/>
@@ -13203,7 +13279,7 @@
         </p:blipFill>
         <p:spPr>
           <a:xfrm>
-            <a:off x="1380489" y="1438360"/>
+            <a:off x="908049" y="1103298"/>
             <a:ext cx="5562032" cy="3835314"/>
           </a:xfrm>
           <a:prstGeom prst="rect">
@@ -13225,7 +13301,7 @@
         </p:nvSpPr>
         <p:spPr>
           <a:xfrm>
-            <a:off x="1380489" y="5319612"/>
+            <a:off x="1146382" y="4938612"/>
             <a:ext cx="2542683" cy="200055"/>
           </a:xfrm>
           <a:prstGeom prst="rect">
@@ -13359,8 +13435,8 @@
         </p:nvSpPr>
         <p:spPr>
           <a:xfrm>
-            <a:off x="328246" y="1097280"/>
-            <a:ext cx="4360985" cy="4626863"/>
+            <a:off x="913795" y="1097280"/>
+            <a:ext cx="3256177" cy="4626863"/>
           </a:xfrm>
         </p:spPr>
         <p:txBody>
@@ -13403,7 +13479,7 @@
               </a:spcAft>
             </a:pPr>
             <a:r>
-              <a:rPr lang="en-US" sz="3600" dirty="0">
+              <a:rPr lang="en-US" sz="4000" b="1" dirty="0">
                 <a:solidFill>
                   <a:schemeClr val="tx2"/>
                 </a:solidFill>
@@ -13412,7 +13488,7 @@
                 <a:ea typeface="Calibri" panose="020F0502020204030204" pitchFamily="34" charset="0"/>
                 <a:cs typeface="Times New Roman" panose="02020603050405020304" pitchFamily="18" charset="0"/>
               </a:rPr>
-              <a:t>Purpose: </a:t>
+              <a:t>Purpose:</a:t>
             </a:r>
           </a:p>
           <a:p>
@@ -13427,59 +13503,17 @@
                 <a:spcPts val="0"/>
               </a:spcAft>
             </a:pPr>
-            <a:endParaRPr lang="en-US" sz="3600" dirty="0">
-              <a:solidFill>
-                <a:schemeClr val="tx2"/>
-              </a:solidFill>
-              <a:effectLst/>
-              <a:latin typeface="+mj-lt"/>
-              <a:ea typeface="Calibri" panose="020F0502020204030204" pitchFamily="34" charset="0"/>
-              <a:cs typeface="Times New Roman" panose="02020603050405020304" pitchFamily="18" charset="0"/>
-            </a:endParaRPr>
-          </a:p>
-          <a:p>
-            <a:pPr marL="457200" marR="0" algn="l">
-              <a:lnSpc>
-                <a:spcPts val="1800"/>
-              </a:lnSpc>
-              <a:spcBef>
-                <a:spcPts val="0"/>
-              </a:spcBef>
-              <a:spcAft>
-                <a:spcPts val="0"/>
-              </a:spcAft>
-            </a:pPr>
-            <a:endParaRPr lang="en-US" sz="2400" dirty="0">
-              <a:solidFill>
-                <a:srgbClr val="0070C0"/>
-              </a:solidFill>
-              <a:effectLst/>
-              <a:ea typeface="Calibri" panose="020F0502020204030204" pitchFamily="34" charset="0"/>
-              <a:cs typeface="Times New Roman" panose="02020603050405020304" pitchFamily="18" charset="0"/>
-            </a:endParaRPr>
-          </a:p>
-          <a:p>
-            <a:pPr marL="457200" marR="0" algn="l">
-              <a:lnSpc>
-                <a:spcPts val="1800"/>
-              </a:lnSpc>
-              <a:spcBef>
-                <a:spcPts val="0"/>
-              </a:spcBef>
-              <a:spcAft>
-                <a:spcPts val="0"/>
-              </a:spcAft>
-            </a:pPr>
-            <a:r>
-              <a:rPr lang="en-US" sz="2800" dirty="0">
-                <a:solidFill>
-                  <a:srgbClr val="0070C0"/>
+            <a:r>
+              <a:rPr lang="en-US" sz="4000" b="1" dirty="0">
+                <a:solidFill>
+                  <a:schemeClr val="tx2"/>
                 </a:solidFill>
                 <a:effectLst/>
+                <a:latin typeface="+mj-lt"/>
                 <a:ea typeface="Calibri" panose="020F0502020204030204" pitchFamily="34" charset="0"/>
                 <a:cs typeface="Times New Roman" panose="02020603050405020304" pitchFamily="18" charset="0"/>
               </a:rPr>
-              <a:t>What type of market? </a:t>
+              <a:t> </a:t>
             </a:r>
           </a:p>
           <a:p>
@@ -13495,13 +13529,16 @@
               </a:spcAft>
             </a:pPr>
             <a:endParaRPr lang="en-US" sz="2800" dirty="0">
+              <a:solidFill>
+                <a:srgbClr val="0070C0"/>
+              </a:solidFill>
               <a:effectLst/>
               <a:ea typeface="Calibri" panose="020F0502020204030204" pitchFamily="34" charset="0"/>
               <a:cs typeface="Times New Roman" panose="02020603050405020304" pitchFamily="18" charset="0"/>
             </a:endParaRPr>
           </a:p>
           <a:p>
-            <a:pPr marL="457200" marR="0" algn="l">
+            <a:pPr marL="914400" marR="0" indent="-457200" algn="l">
               <a:lnSpc>
                 <a:spcPts val="1800"/>
               </a:lnSpc>
@@ -13511,21 +13548,23 @@
               <a:spcAft>
                 <a:spcPts val="0"/>
               </a:spcAft>
+              <a:buFont typeface="+mj-lt"/>
+              <a:buAutoNum type="arabicPeriod"/>
             </a:pPr>
             <a:r>
               <a:rPr lang="en-US" sz="2800" dirty="0">
                 <a:solidFill>
-                  <a:srgbClr val="0070C0"/>
+                  <a:srgbClr val="669900"/>
                 </a:solidFill>
                 <a:effectLst/>
                 <a:ea typeface="Calibri" panose="020F0502020204030204" pitchFamily="34" charset="0"/>
                 <a:cs typeface="Times New Roman" panose="02020603050405020304" pitchFamily="18" charset="0"/>
               </a:rPr>
-              <a:t>Is it a good time to invest?</a:t>
-            </a:r>
-          </a:p>
-          <a:p>
-            <a:pPr marL="457200" marR="0" algn="l">
+              <a:t>What type of market? </a:t>
+            </a:r>
+          </a:p>
+          <a:p>
+            <a:pPr marL="914400" marR="0" indent="-457200" algn="l">
               <a:lnSpc>
                 <a:spcPts val="1800"/>
               </a:lnSpc>
@@ -13535,15 +13574,20 @@
               <a:spcAft>
                 <a:spcPts val="0"/>
               </a:spcAft>
+              <a:buFont typeface="+mj-lt"/>
+              <a:buAutoNum type="arabicPeriod"/>
             </a:pPr>
             <a:endParaRPr lang="en-US" sz="2800" dirty="0">
+              <a:solidFill>
+                <a:srgbClr val="669900"/>
+              </a:solidFill>
               <a:effectLst/>
               <a:ea typeface="Calibri" panose="020F0502020204030204" pitchFamily="34" charset="0"/>
               <a:cs typeface="Times New Roman" panose="02020603050405020304" pitchFamily="18" charset="0"/>
             </a:endParaRPr>
           </a:p>
           <a:p>
-            <a:pPr marL="457200" marR="0" algn="l">
+            <a:pPr marL="914400" marR="0" indent="-457200" algn="l">
               <a:lnSpc>
                 <a:spcPts val="1800"/>
               </a:lnSpc>
@@ -13553,21 +13597,23 @@
               <a:spcAft>
                 <a:spcPts val="0"/>
               </a:spcAft>
+              <a:buFont typeface="+mj-lt"/>
+              <a:buAutoNum type="arabicPeriod"/>
             </a:pPr>
             <a:r>
               <a:rPr lang="en-US" sz="2800" dirty="0">
                 <a:solidFill>
-                  <a:srgbClr val="0070C0"/>
+                  <a:srgbClr val="669900"/>
                 </a:solidFill>
                 <a:effectLst/>
                 <a:ea typeface="Calibri" panose="020F0502020204030204" pitchFamily="34" charset="0"/>
                 <a:cs typeface="Times New Roman" panose="02020603050405020304" pitchFamily="18" charset="0"/>
               </a:rPr>
-              <a:t>Is it a good time to sell?  </a:t>
-            </a:r>
-          </a:p>
-          <a:p>
-            <a:pPr marL="457200" marR="0" algn="l">
+              <a:t>Is it a good time to invest?</a:t>
+            </a:r>
+          </a:p>
+          <a:p>
+            <a:pPr marL="914400" marR="0" indent="-457200" algn="l">
               <a:lnSpc>
                 <a:spcPts val="1800"/>
               </a:lnSpc>
@@ -13577,15 +13623,20 @@
               <a:spcAft>
                 <a:spcPts val="0"/>
               </a:spcAft>
+              <a:buFont typeface="+mj-lt"/>
+              <a:buAutoNum type="arabicPeriod"/>
             </a:pPr>
             <a:endParaRPr lang="en-US" sz="2800" dirty="0">
+              <a:solidFill>
+                <a:srgbClr val="669900"/>
+              </a:solidFill>
               <a:effectLst/>
               <a:ea typeface="Calibri" panose="020F0502020204030204" pitchFamily="34" charset="0"/>
               <a:cs typeface="Times New Roman" panose="02020603050405020304" pitchFamily="18" charset="0"/>
             </a:endParaRPr>
           </a:p>
           <a:p>
-            <a:pPr marL="457200" marR="0" algn="l">
+            <a:pPr marL="914400" marR="0" indent="-457200" algn="l">
               <a:lnSpc>
                 <a:spcPts val="1800"/>
               </a:lnSpc>
@@ -13595,23 +13646,69 @@
               <a:spcAft>
                 <a:spcPts val="0"/>
               </a:spcAft>
+              <a:buFont typeface="+mj-lt"/>
+              <a:buAutoNum type="arabicPeriod"/>
             </a:pPr>
             <a:r>
               <a:rPr lang="en-US" sz="2800" dirty="0">
                 <a:solidFill>
-                  <a:srgbClr val="0070C0"/>
+                  <a:srgbClr val="669900"/>
                 </a:solidFill>
                 <a:effectLst/>
                 <a:ea typeface="Calibri" panose="020F0502020204030204" pitchFamily="34" charset="0"/>
                 <a:cs typeface="Times New Roman" panose="02020603050405020304" pitchFamily="18" charset="0"/>
               </a:rPr>
-              <a:t>Are there any trends that may be relevant?</a:t>
-            </a:r>
+              <a:t>Is it a good time to sell?  </a:t>
+            </a:r>
+          </a:p>
+          <a:p>
+            <a:pPr marL="914400" marR="0" indent="-457200" algn="l">
+              <a:lnSpc>
+                <a:spcPts val="1800"/>
+              </a:lnSpc>
+              <a:spcBef>
+                <a:spcPts val="0"/>
+              </a:spcBef>
+              <a:spcAft>
+                <a:spcPts val="0"/>
+              </a:spcAft>
+              <a:buFont typeface="+mj-lt"/>
+              <a:buAutoNum type="arabicPeriod"/>
+            </a:pPr>
             <a:endParaRPr lang="en-US" sz="2800" dirty="0">
+              <a:solidFill>
+                <a:srgbClr val="669900"/>
+              </a:solidFill>
               <a:effectLst/>
               <a:ea typeface="Calibri" panose="020F0502020204030204" pitchFamily="34" charset="0"/>
               <a:cs typeface="Times New Roman" panose="02020603050405020304" pitchFamily="18" charset="0"/>
             </a:endParaRPr>
+          </a:p>
+          <a:p>
+            <a:pPr marL="914400" marR="0" indent="-457200" algn="l">
+              <a:lnSpc>
+                <a:spcPts val="1800"/>
+              </a:lnSpc>
+              <a:spcBef>
+                <a:spcPts val="0"/>
+              </a:spcBef>
+              <a:spcAft>
+                <a:spcPts val="0"/>
+              </a:spcAft>
+              <a:buFont typeface="+mj-lt"/>
+              <a:buAutoNum type="arabicPeriod"/>
+            </a:pPr>
+            <a:r>
+              <a:rPr lang="en-US" sz="2800" dirty="0">
+                <a:solidFill>
+                  <a:srgbClr val="669900"/>
+                </a:solidFill>
+                <a:effectLst/>
+                <a:ea typeface="Calibri" panose="020F0502020204030204" pitchFamily="34" charset="0"/>
+                <a:cs typeface="Times New Roman" panose="02020603050405020304" pitchFamily="18" charset="0"/>
+              </a:rPr>
+              <a:t>Are there any trends that may be relevant?</a:t>
+            </a:r>
           </a:p>
         </p:txBody>
       </p:sp>
@@ -13769,8 +13866,8 @@
         </p:nvSpPr>
         <p:spPr>
           <a:xfrm>
-            <a:off x="7433320" y="366150"/>
-            <a:ext cx="4362440" cy="6080370"/>
+            <a:off x="7890668" y="366150"/>
+            <a:ext cx="3905092" cy="6080370"/>
           </a:xfrm>
         </p:spPr>
         <p:txBody>
@@ -13791,7 +13888,7 @@
               </a:spcAft>
             </a:pPr>
             <a:r>
-              <a:rPr lang="en-US" sz="3600" b="1" dirty="0">
+              <a:rPr lang="en-US" sz="4000" b="1" dirty="0">
                 <a:solidFill>
                   <a:schemeClr val="tx2"/>
                 </a:solidFill>
@@ -13801,6 +13898,48 @@
               </a:rPr>
               <a:t>Data: </a:t>
             </a:r>
+          </a:p>
+          <a:p>
+            <a:pPr marL="457200" marR="0" algn="l">
+              <a:lnSpc>
+                <a:spcPts val="1800"/>
+              </a:lnSpc>
+              <a:spcBef>
+                <a:spcPts val="0"/>
+              </a:spcBef>
+              <a:spcAft>
+                <a:spcPts val="0"/>
+              </a:spcAft>
+            </a:pPr>
+            <a:endParaRPr lang="en-US" sz="4000" b="1" dirty="0">
+              <a:solidFill>
+                <a:schemeClr val="tx2"/>
+              </a:solidFill>
+              <a:effectLst/>
+              <a:ea typeface="Calibri" panose="020F0502020204030204" pitchFamily="34" charset="0"/>
+              <a:cs typeface="Times New Roman" panose="02020603050405020304" pitchFamily="18" charset="0"/>
+            </a:endParaRPr>
+          </a:p>
+          <a:p>
+            <a:pPr marL="457200" marR="0" algn="l">
+              <a:lnSpc>
+                <a:spcPts val="1800"/>
+              </a:lnSpc>
+              <a:spcBef>
+                <a:spcPts val="0"/>
+              </a:spcBef>
+              <a:spcAft>
+                <a:spcPts val="0"/>
+              </a:spcAft>
+            </a:pPr>
+            <a:endParaRPr lang="en-US" sz="4000" b="1" dirty="0">
+              <a:solidFill>
+                <a:schemeClr val="tx2"/>
+              </a:solidFill>
+              <a:effectLst/>
+              <a:ea typeface="Calibri" panose="020F0502020204030204" pitchFamily="34" charset="0"/>
+              <a:cs typeface="Times New Roman" panose="02020603050405020304" pitchFamily="18" charset="0"/>
+            </a:endParaRPr>
           </a:p>
           <a:p>
             <a:pPr marL="457200" marR="0" algn="l">
@@ -13829,13 +13968,31 @@
               <a:buChar char="•"/>
             </a:pPr>
             <a:r>
-              <a:rPr lang="en-US" sz="2800" b="0" i="0" dirty="0">
+              <a:rPr lang="en-US" sz="2400" b="0" i="0" dirty="0">
                 <a:solidFill>
                   <a:srgbClr val="0070C0"/>
                 </a:solidFill>
                 <a:effectLst/>
               </a:rPr>
-              <a:t>API connections </a:t>
+              <a:t> API </a:t>
+            </a:r>
+            <a:r>
+              <a:rPr lang="en-US" sz="2400" dirty="0">
+                <a:solidFill>
+                  <a:srgbClr val="0070C0"/>
+                </a:solidFill>
+                <a:effectLst/>
+              </a:rPr>
+              <a:t>R</a:t>
+            </a:r>
+            <a:r>
+              <a:rPr lang="en-US" sz="2400" b="0" i="0" dirty="0">
+                <a:solidFill>
+                  <a:srgbClr val="0070C0"/>
+                </a:solidFill>
+                <a:effectLst/>
+              </a:rPr>
+              <a:t>equests </a:t>
             </a:r>
           </a:p>
           <a:p>
@@ -13844,28 +14001,13 @@
               <a:buChar char="•"/>
             </a:pPr>
             <a:r>
-              <a:rPr lang="en-US" sz="2800" b="0" i="0" dirty="0">
+              <a:rPr lang="en-US" sz="2400" b="0" i="0" dirty="0">
                 <a:solidFill>
                   <a:srgbClr val="0070C0"/>
                 </a:solidFill>
                 <a:effectLst/>
               </a:rPr>
-              <a:t>Machine Learning Module</a:t>
-            </a:r>
-          </a:p>
-          <a:p>
-            <a:pPr algn="l">
-              <a:buFont typeface="Arial" panose="020B0604020202020204" pitchFamily="34" charset="0"/>
-              <a:buChar char="•"/>
-            </a:pPr>
-            <a:r>
-              <a:rPr lang="en-US" sz="2800" b="0" i="0" dirty="0">
-                <a:solidFill>
-                  <a:srgbClr val="0070C0"/>
-                </a:solidFill>
-                <a:effectLst/>
-              </a:rPr>
-              <a:t>Trends</a:t>
+              <a:t> Monthly/Daily Time Series (10 YEARS)</a:t>
             </a:r>
           </a:p>
         </p:txBody>
@@ -13901,8 +14043,8 @@
         </p:blipFill>
         <p:spPr>
           <a:xfrm>
-            <a:off x="633529" y="1528033"/>
-            <a:ext cx="6492240" cy="3651885"/>
+            <a:off x="616941" y="1264920"/>
+            <a:ext cx="6816379" cy="3834213"/>
           </a:xfrm>
           <a:prstGeom prst="rect">
             <a:avLst/>
@@ -14155,14 +14297,14 @@
           <p:nvPr>
             <p:extLst>
               <p:ext uri="{D42A27DB-BD31-4B8C-83A1-F6EECF244321}">
-                <p14:modId xmlns:p14="http://schemas.microsoft.com/office/powerpoint/2010/main" val="1305520546"/>
+                <p14:modId xmlns:p14="http://schemas.microsoft.com/office/powerpoint/2010/main" val="1452297807"/>
               </p:ext>
             </p:extLst>
           </p:nvPr>
         </p:nvGraphicFramePr>
         <p:xfrm>
-          <a:off x="1454641" y="1151740"/>
-          <a:ext cx="9362660" cy="5338110"/>
+          <a:off x="1409346" y="1066619"/>
+          <a:ext cx="9362660" cy="5298897"/>
         </p:xfrm>
         <a:graphic>
           <a:graphicData uri="http://schemas.openxmlformats.org/drawingml/2006/table">
@@ -14208,9 +14350,9 @@
                     <a:p>
                       <a:pPr algn="ctr"/>
                       <a:r>
-                        <a:rPr lang="en-US" sz="2400" dirty="0">
+                        <a:rPr lang="en-US" dirty="0">
                           <a:solidFill>
-                            <a:schemeClr val="bg1"/>
+                            <a:srgbClr val="00642D"/>
                           </a:solidFill>
                         </a:rPr>
                         <a:t>Software</a:t>
@@ -14226,9 +14368,9 @@
                     <a:p>
                       <a:pPr algn="ctr"/>
                       <a:r>
-                        <a:rPr lang="en-US" sz="2400" dirty="0">
+                        <a:rPr lang="en-US" dirty="0">
                           <a:solidFill>
-                            <a:schemeClr val="bg1"/>
+                            <a:srgbClr val="00642D"/>
                           </a:solidFill>
                         </a:rPr>
                         <a:t>Languages</a:t>
@@ -14244,9 +14386,9 @@
                     <a:p>
                       <a:pPr algn="ctr"/>
                       <a:r>
-                        <a:rPr lang="en-US" sz="2400" dirty="0">
+                        <a:rPr lang="en-US" dirty="0">
                           <a:solidFill>
-                            <a:schemeClr val="bg1"/>
+                            <a:srgbClr val="00642D"/>
                           </a:solidFill>
                         </a:rPr>
                         <a:t>Libraries</a:t>
@@ -14262,9 +14404,9 @@
                     <a:p>
                       <a:pPr algn="ctr"/>
                       <a:r>
-                        <a:rPr lang="en-US" sz="2400" dirty="0">
+                        <a:rPr lang="en-US" dirty="0">
                           <a:solidFill>
-                            <a:schemeClr val="bg1"/>
+                            <a:srgbClr val="00642D"/>
                           </a:solidFill>
                         </a:rPr>
                         <a:t>Sources</a:t>
@@ -14287,7 +14429,7 @@
                     <a:p>
                       <a:pPr algn="ctr"/>
                       <a:r>
-                        <a:rPr lang="en-US" sz="2000" dirty="0">
+                        <a:rPr lang="en-US" dirty="0">
                           <a:solidFill>
                             <a:schemeClr val="bg1"/>
                           </a:solidFill>
@@ -14305,7 +14447,7 @@
                     <a:p>
                       <a:pPr algn="ctr"/>
                       <a:r>
-                        <a:rPr lang="en-US" sz="2000" dirty="0">
+                        <a:rPr lang="en-US" dirty="0">
                           <a:solidFill>
                             <a:schemeClr val="bg1"/>
                           </a:solidFill>
@@ -14323,7 +14465,7 @@
                     <a:p>
                       <a:pPr algn="ctr"/>
                       <a:r>
-                        <a:rPr lang="en-US" sz="2000" b="0" i="0" kern="1200" dirty="0">
+                        <a:rPr lang="en-US" sz="1800" b="0" i="0" kern="1200" dirty="0">
                           <a:solidFill>
                             <a:schemeClr val="dk1"/>
                           </a:solidFill>
@@ -14334,7 +14476,7 @@
                         </a:rPr>
                         <a:t>TensorFlow</a:t>
                       </a:r>
-                      <a:endParaRPr lang="en-US" sz="2000" dirty="0">
+                      <a:endParaRPr lang="en-US" dirty="0">
                         <a:solidFill>
                           <a:schemeClr val="bg1"/>
                         </a:solidFill>
@@ -14350,7 +14492,7 @@
                     <a:p>
                       <a:pPr algn="ctr"/>
                       <a:r>
-                        <a:rPr lang="en-US" sz="2000" b="0" i="0" kern="1200" dirty="0">
+                        <a:rPr lang="en-US" sz="1800" b="0" i="0" kern="1200" dirty="0">
                           <a:solidFill>
                             <a:schemeClr val="dk1"/>
                           </a:solidFill>
@@ -14362,7 +14504,7 @@
                         <a:t> </a:t>
                       </a:r>
                       <a:r>
-                        <a:rPr lang="en-US" sz="2000" b="0" i="0" kern="1200" dirty="0" err="1">
+                        <a:rPr lang="en-US" sz="1800" b="0" i="0" kern="1200" dirty="0" err="1">
                           <a:solidFill>
                             <a:schemeClr val="dk1"/>
                           </a:solidFill>
@@ -14373,7 +14515,7 @@
                         </a:rPr>
                         <a:t>Coinmetrics</a:t>
                       </a:r>
-                      <a:endParaRPr lang="en-US" sz="2000" dirty="0">
+                      <a:endParaRPr lang="en-US" dirty="0">
                         <a:solidFill>
                           <a:schemeClr val="bg1"/>
                         </a:solidFill>
@@ -14396,7 +14538,7 @@
                     <a:p>
                       <a:pPr algn="ctr"/>
                       <a:r>
-                        <a:rPr lang="en-US" sz="2000" dirty="0">
+                        <a:rPr lang="en-US" dirty="0">
                           <a:solidFill>
                             <a:schemeClr val="bg1"/>
                           </a:solidFill>
@@ -14404,14 +14546,14 @@
                         <a:t>Google </a:t>
                       </a:r>
                       <a:r>
-                        <a:rPr lang="en-US" sz="2000" dirty="0" err="1">
+                        <a:rPr lang="en-US" dirty="0" err="1">
                           <a:solidFill>
                             <a:schemeClr val="bg1"/>
                           </a:solidFill>
                         </a:rPr>
                         <a:t>Colab</a:t>
                       </a:r>
-                      <a:endParaRPr lang="en-US" sz="2000" dirty="0">
+                      <a:endParaRPr lang="en-US" dirty="0">
                         <a:solidFill>
                           <a:schemeClr val="bg1"/>
                         </a:solidFill>
@@ -14443,14 +14585,14 @@
                         <a:defRPr/>
                       </a:pPr>
                       <a:r>
-                        <a:rPr lang="en-US" sz="2000" dirty="0" err="1">
+                        <a:rPr lang="en-US" dirty="0" err="1">
                           <a:solidFill>
                             <a:schemeClr val="bg1"/>
                           </a:solidFill>
                         </a:rPr>
                         <a:t>Javascript</a:t>
                       </a:r>
-                      <a:endParaRPr lang="en-US" sz="2000" dirty="0">
+                      <a:endParaRPr lang="en-US" dirty="0">
                         <a:solidFill>
                           <a:schemeClr val="bg1"/>
                         </a:solidFill>
@@ -14466,7 +14608,7 @@
                     <a:p>
                       <a:pPr algn="ctr"/>
                       <a:r>
-                        <a:rPr lang="en-US" sz="2000" b="0" i="0" kern="1200" dirty="0">
+                        <a:rPr lang="en-US" sz="1800" b="0" i="0" kern="1200" dirty="0">
                           <a:solidFill>
                             <a:schemeClr val="dk1"/>
                           </a:solidFill>
@@ -14477,7 +14619,7 @@
                         </a:rPr>
                         <a:t>Matplotlib</a:t>
                       </a:r>
-                      <a:endParaRPr lang="en-US" sz="2000" dirty="0">
+                      <a:endParaRPr lang="en-US" dirty="0">
                         <a:solidFill>
                           <a:schemeClr val="bg1"/>
                         </a:solidFill>
@@ -14493,7 +14635,7 @@
                     <a:p>
                       <a:pPr algn="ctr"/>
                       <a:r>
-                        <a:rPr lang="en-US" sz="2000" dirty="0">
+                        <a:rPr lang="en-US" dirty="0">
                           <a:solidFill>
                             <a:schemeClr val="bg1"/>
                           </a:solidFill>
@@ -14518,7 +14660,7 @@
                     <a:p>
                       <a:pPr algn="ctr"/>
                       <a:r>
-                        <a:rPr lang="en-US" sz="2000" dirty="0" err="1">
+                        <a:rPr lang="en-US" dirty="0" err="1">
                           <a:solidFill>
                             <a:schemeClr val="bg1"/>
                           </a:solidFill>
@@ -14526,7 +14668,7 @@
                         <a:t>Jupyter</a:t>
                       </a:r>
                       <a:r>
-                        <a:rPr lang="en-US" sz="2000" dirty="0">
+                        <a:rPr lang="en-US" dirty="0">
                           <a:solidFill>
                             <a:schemeClr val="bg1"/>
                           </a:solidFill>
@@ -14544,7 +14686,7 @@
                     <a:p>
                       <a:pPr algn="ctr"/>
                       <a:r>
-                        <a:rPr lang="en-US" sz="2000" dirty="0">
+                        <a:rPr lang="en-US" dirty="0">
                           <a:solidFill>
                             <a:schemeClr val="bg1"/>
                           </a:solidFill>
@@ -14562,7 +14704,7 @@
                     <a:p>
                       <a:pPr algn="ctr"/>
                       <a:r>
-                        <a:rPr lang="en-US" sz="2000" b="0" i="0" kern="1200" dirty="0">
+                        <a:rPr lang="en-US" sz="1800" b="0" i="0" kern="1200" dirty="0">
                           <a:solidFill>
                             <a:schemeClr val="dk1"/>
                           </a:solidFill>
@@ -14573,7 +14715,7 @@
                         </a:rPr>
                         <a:t>glob</a:t>
                       </a:r>
-                      <a:endParaRPr lang="en-US" sz="2000" dirty="0">
+                      <a:endParaRPr lang="en-US" dirty="0">
                         <a:solidFill>
                           <a:schemeClr val="bg1"/>
                         </a:solidFill>
@@ -14589,7 +14731,7 @@
                     <a:p>
                       <a:pPr algn="ctr"/>
                       <a:r>
-                        <a:rPr lang="en-US" sz="2000" dirty="0">
+                        <a:rPr lang="en-US" dirty="0">
                           <a:solidFill>
                             <a:schemeClr val="bg1"/>
                           </a:solidFill>
@@ -14614,7 +14756,7 @@
                     <a:p>
                       <a:pPr algn="ctr"/>
                       <a:r>
-                        <a:rPr lang="en-US" sz="2000" dirty="0">
+                        <a:rPr lang="en-US" dirty="0">
                           <a:solidFill>
                             <a:schemeClr val="bg1"/>
                           </a:solidFill>
@@ -14632,7 +14774,7 @@
                     <a:p>
                       <a:pPr algn="ctr"/>
                       <a:r>
-                        <a:rPr lang="en-US" sz="2000" dirty="0">
+                        <a:rPr lang="en-US" dirty="0">
                           <a:solidFill>
                             <a:schemeClr val="bg1"/>
                           </a:solidFill>
@@ -14650,7 +14792,7 @@
                     <a:p>
                       <a:pPr algn="ctr"/>
                       <a:r>
-                        <a:rPr lang="en-US" sz="2000" b="0" i="0" kern="1200" dirty="0" err="1">
+                        <a:rPr lang="en-US" sz="1800" b="0" i="0" kern="1200" dirty="0">
                           <a:solidFill>
                             <a:schemeClr val="dk1"/>
                           </a:solidFill>
@@ -14659,9 +14801,9 @@
                           <a:ea typeface="+mn-ea"/>
                           <a:cs typeface="+mn-cs"/>
                         </a:rPr>
-                        <a:t>Numpy</a:t>
+                        <a:t>NumPy</a:t>
                       </a:r>
-                      <a:endParaRPr lang="en-US" sz="2000" dirty="0">
+                      <a:endParaRPr lang="en-US" dirty="0">
                         <a:solidFill>
                           <a:schemeClr val="bg1"/>
                         </a:solidFill>
@@ -14677,7 +14819,7 @@
                     <a:p>
                       <a:pPr algn="ctr"/>
                       <a:r>
-                        <a:rPr lang="en-US" sz="2000" dirty="0">
+                        <a:rPr lang="en-US" dirty="0">
                           <a:solidFill>
                             <a:schemeClr val="bg1"/>
                           </a:solidFill>
@@ -14702,14 +14844,14 @@
                     <a:p>
                       <a:pPr algn="ctr"/>
                       <a:r>
-                        <a:rPr lang="en-US" sz="2000" dirty="0" err="1">
+                        <a:rPr lang="en-US" dirty="0" err="1">
                           <a:solidFill>
                             <a:schemeClr val="bg1"/>
                           </a:solidFill>
                         </a:rPr>
                         <a:t>QuickDBD</a:t>
                       </a:r>
-                      <a:endParaRPr lang="en-US" sz="2000" dirty="0">
+                      <a:endParaRPr lang="en-US" dirty="0">
                         <a:solidFill>
                           <a:schemeClr val="bg1"/>
                         </a:solidFill>
@@ -14724,7 +14866,7 @@
                     <a:lstStyle/>
                     <a:p>
                       <a:pPr algn="ctr"/>
-                      <a:endParaRPr lang="en-US" sz="2000" dirty="0">
+                      <a:endParaRPr lang="en-US" dirty="0">
                         <a:solidFill>
                           <a:schemeClr val="bg1"/>
                         </a:solidFill>
@@ -14740,7 +14882,7 @@
                     <a:p>
                       <a:pPr algn="ctr"/>
                       <a:r>
-                        <a:rPr lang="en-US" sz="2000" b="0" i="0" kern="1200" dirty="0">
+                        <a:rPr lang="en-US" sz="1800" b="0" i="0" kern="1200" dirty="0">
                           <a:solidFill>
                             <a:schemeClr val="dk1"/>
                           </a:solidFill>
@@ -14751,7 +14893,7 @@
                         </a:rPr>
                         <a:t>Scikit-learn</a:t>
                       </a:r>
-                      <a:endParaRPr lang="en-US" sz="2000" dirty="0">
+                      <a:endParaRPr lang="en-US" dirty="0">
                         <a:solidFill>
                           <a:schemeClr val="bg1"/>
                         </a:solidFill>
@@ -14767,7 +14909,7 @@
                     <a:p>
                       <a:pPr algn="ctr"/>
                       <a:r>
-                        <a:rPr lang="en-US" sz="2000" dirty="0">
+                        <a:rPr lang="en-US" dirty="0">
                           <a:solidFill>
                             <a:schemeClr val="bg1"/>
                           </a:solidFill>
@@ -14791,7 +14933,7 @@
                     <a:lstStyle/>
                     <a:p>
                       <a:pPr algn="ctr"/>
-                      <a:endParaRPr lang="en-US" sz="2000" dirty="0">
+                      <a:endParaRPr lang="en-US" dirty="0">
                         <a:solidFill>
                           <a:schemeClr val="bg1"/>
                         </a:solidFill>
@@ -14806,7 +14948,7 @@
                     <a:lstStyle/>
                     <a:p>
                       <a:pPr algn="ctr"/>
-                      <a:endParaRPr lang="en-US" sz="2000" dirty="0">
+                      <a:endParaRPr lang="en-US" dirty="0">
                         <a:solidFill>
                           <a:schemeClr val="bg1"/>
                         </a:solidFill>
@@ -14822,7 +14964,7 @@
                     <a:p>
                       <a:pPr algn="ctr"/>
                       <a:r>
-                        <a:rPr lang="en-US" sz="2000" dirty="0">
+                        <a:rPr lang="en-US" dirty="0">
                           <a:solidFill>
                             <a:schemeClr val="bg1"/>
                           </a:solidFill>
@@ -14840,7 +14982,7 @@
                     <a:p>
                       <a:pPr algn="ctr"/>
                       <a:r>
-                        <a:rPr lang="en-US" sz="2000" dirty="0" err="1">
+                        <a:rPr lang="en-US" dirty="0" err="1">
                           <a:solidFill>
                             <a:schemeClr val="bg1"/>
                           </a:solidFill>
@@ -14848,7 +14990,7 @@
                         <a:t>Coindesk</a:t>
                       </a:r>
                       <a:r>
-                        <a:rPr lang="en-US" sz="2000" dirty="0">
+                        <a:rPr lang="en-US" dirty="0">
                           <a:solidFill>
                             <a:schemeClr val="bg1"/>
                           </a:solidFill>
@@ -14872,7 +15014,7 @@
                     <a:lstStyle/>
                     <a:p>
                       <a:pPr algn="ctr"/>
-                      <a:endParaRPr lang="en-US" sz="2000">
+                      <a:endParaRPr lang="en-US">
                         <a:solidFill>
                           <a:schemeClr val="bg1"/>
                         </a:solidFill>
@@ -14887,7 +15029,7 @@
                     <a:lstStyle/>
                     <a:p>
                       <a:pPr algn="ctr"/>
-                      <a:endParaRPr lang="en-US" sz="2000">
+                      <a:endParaRPr lang="en-US">
                         <a:solidFill>
                           <a:schemeClr val="bg1"/>
                         </a:solidFill>
@@ -14919,7 +15061,7 @@
                         <a:defRPr/>
                       </a:pPr>
                       <a:r>
-                        <a:rPr lang="en-US" sz="2000" b="0" i="0" kern="1200" dirty="0">
+                        <a:rPr lang="en-US" sz="1800" b="0" i="0" kern="1200" dirty="0">
                           <a:solidFill>
                             <a:schemeClr val="dk1"/>
                           </a:solidFill>
@@ -14930,7 +15072,7 @@
                         </a:rPr>
                         <a:t> Requests</a:t>
                       </a:r>
-                      <a:endParaRPr lang="en-US" sz="2000" dirty="0">
+                      <a:endParaRPr lang="en-US" dirty="0">
                         <a:solidFill>
                           <a:schemeClr val="bg1"/>
                         </a:solidFill>
@@ -14945,7 +15087,7 @@
                     <a:lstStyle/>
                     <a:p>
                       <a:pPr algn="ctr"/>
-                      <a:endParaRPr lang="en-US" sz="2000" dirty="0">
+                      <a:endParaRPr lang="en-US" dirty="0">
                         <a:solidFill>
                           <a:schemeClr val="bg1"/>
                         </a:solidFill>
@@ -14967,7 +15109,7 @@
                     <a:lstStyle/>
                     <a:p>
                       <a:pPr algn="ctr"/>
-                      <a:endParaRPr lang="en-US" sz="2000">
+                      <a:endParaRPr lang="en-US">
                         <a:solidFill>
                           <a:schemeClr val="bg1"/>
                         </a:solidFill>
@@ -14982,7 +15124,7 @@
                     <a:lstStyle/>
                     <a:p>
                       <a:pPr algn="ctr"/>
-                      <a:endParaRPr lang="en-US" sz="2000">
+                      <a:endParaRPr lang="en-US">
                         <a:solidFill>
                           <a:schemeClr val="bg1"/>
                         </a:solidFill>
@@ -15014,7 +15156,7 @@
                         <a:defRPr/>
                       </a:pPr>
                       <a:r>
-                        <a:rPr lang="en-US" sz="2000" dirty="0">
+                        <a:rPr lang="en-US" dirty="0">
                           <a:solidFill>
                             <a:schemeClr val="bg1"/>
                           </a:solidFill>
@@ -15031,7 +15173,7 @@
                     <a:lstStyle/>
                     <a:p>
                       <a:pPr algn="ctr"/>
-                      <a:endParaRPr lang="en-US" sz="2000" dirty="0">
+                      <a:endParaRPr lang="en-US" dirty="0">
                         <a:solidFill>
                           <a:schemeClr val="bg1"/>
                         </a:solidFill>
@@ -15053,7 +15195,7 @@
                     <a:lstStyle/>
                     <a:p>
                       <a:pPr algn="ctr"/>
-                      <a:endParaRPr lang="en-US" sz="2000" dirty="0">
+                      <a:endParaRPr lang="en-US">
                         <a:solidFill>
                           <a:schemeClr val="bg1"/>
                         </a:solidFill>
@@ -15068,7 +15210,7 @@
                     <a:lstStyle/>
                     <a:p>
                       <a:pPr algn="ctr"/>
-                      <a:endParaRPr lang="en-US" sz="2000">
+                      <a:endParaRPr lang="en-US">
                         <a:solidFill>
                           <a:schemeClr val="bg1"/>
                         </a:solidFill>
@@ -15100,7 +15242,7 @@
                         <a:defRPr/>
                       </a:pPr>
                       <a:r>
-                        <a:rPr lang="en-US" sz="2000" dirty="0">
+                        <a:rPr lang="en-US" dirty="0">
                           <a:solidFill>
                             <a:schemeClr val="bg1"/>
                           </a:solidFill>
@@ -15117,7 +15259,7 @@
                     <a:lstStyle/>
                     <a:p>
                       <a:pPr algn="ctr"/>
-                      <a:endParaRPr lang="en-US" sz="2000" dirty="0">
+                      <a:endParaRPr lang="en-US" dirty="0">
                         <a:solidFill>
                           <a:schemeClr val="bg1"/>
                         </a:solidFill>
@@ -15139,7 +15281,7 @@
                     <a:lstStyle/>
                     <a:p>
                       <a:pPr algn="ctr"/>
-                      <a:endParaRPr lang="en-US" sz="2000">
+                      <a:endParaRPr lang="en-US">
                         <a:solidFill>
                           <a:schemeClr val="bg1"/>
                         </a:solidFill>
@@ -15154,7 +15296,7 @@
                     <a:lstStyle/>
                     <a:p>
                       <a:pPr algn="ctr"/>
-                      <a:endParaRPr lang="en-US" sz="2000">
+                      <a:endParaRPr lang="en-US">
                         <a:solidFill>
                           <a:schemeClr val="bg1"/>
                         </a:solidFill>
@@ -15186,18 +15328,13 @@
                         <a:defRPr/>
                       </a:pPr>
                       <a:r>
-                        <a:rPr lang="en-US" sz="2000" dirty="0" err="1">
+                        <a:rPr lang="en-US" dirty="0">
                           <a:solidFill>
                             <a:schemeClr val="bg1"/>
                           </a:solidFill>
                         </a:rPr>
                         <a:t>Keras</a:t>
                       </a:r>
-                      <a:endParaRPr lang="en-US" sz="2000" dirty="0">
-                        <a:solidFill>
-                          <a:schemeClr val="bg1"/>
-                        </a:solidFill>
-                      </a:endParaRPr>
                     </a:p>
                   </a:txBody>
                   <a:tcPr/>
@@ -15208,7 +15345,7 @@
                     <a:lstStyle/>
                     <a:p>
                       <a:pPr algn="ctr"/>
-                      <a:endParaRPr lang="en-US" sz="2000" dirty="0">
+                      <a:endParaRPr lang="en-US" dirty="0">
                         <a:solidFill>
                           <a:schemeClr val="bg1"/>
                         </a:solidFill>
@@ -15230,7 +15367,7 @@
                     <a:lstStyle/>
                     <a:p>
                       <a:pPr algn="ctr"/>
-                      <a:endParaRPr lang="en-US" sz="2000">
+                      <a:endParaRPr lang="en-US">
                         <a:solidFill>
                           <a:schemeClr val="bg1"/>
                         </a:solidFill>
@@ -15245,7 +15382,7 @@
                     <a:lstStyle/>
                     <a:p>
                       <a:pPr algn="ctr"/>
-                      <a:endParaRPr lang="en-US" sz="2000">
+                      <a:endParaRPr lang="en-US">
                         <a:solidFill>
                           <a:schemeClr val="bg1"/>
                         </a:solidFill>
@@ -15277,14 +15414,14 @@
                         <a:defRPr/>
                       </a:pPr>
                       <a:r>
-                        <a:rPr lang="en-US" sz="2000" dirty="0" err="1">
+                        <a:rPr lang="en-US" dirty="0" err="1">
                           <a:solidFill>
                             <a:schemeClr val="bg1"/>
                           </a:solidFill>
                         </a:rPr>
                         <a:t>DateTime</a:t>
                       </a:r>
-                      <a:endParaRPr lang="en-US" sz="2000" dirty="0">
+                      <a:endParaRPr lang="en-US" dirty="0">
                         <a:solidFill>
                           <a:schemeClr val="bg1"/>
                         </a:solidFill>
@@ -15299,7 +15436,7 @@
                     <a:lstStyle/>
                     <a:p>
                       <a:pPr algn="ctr"/>
-                      <a:endParaRPr lang="en-US" sz="2000" dirty="0">
+                      <a:endParaRPr lang="en-US" dirty="0">
                         <a:solidFill>
                           <a:schemeClr val="bg1"/>
                         </a:solidFill>
@@ -15336,7 +15473,7 @@
         </p:nvSpPr>
         <p:spPr>
           <a:xfrm>
-            <a:off x="913795" y="96520"/>
+            <a:off x="1035715" y="148949"/>
             <a:ext cx="10353762" cy="687070"/>
           </a:xfrm>
         </p:spPr>
@@ -15347,15 +15484,12 @@
           <a:lstStyle/>
           <a:p>
             <a:r>
-              <a:rPr lang="en-US" dirty="0">
-                <a:solidFill>
-                  <a:schemeClr val="bg2">
-                    <a:lumMod val="10000"/>
-                    <a:lumOff val="90000"/>
-                  </a:schemeClr>
-                </a:solidFill>
-              </a:rPr>
-              <a:t>Resources</a:t>
+              <a:rPr lang="en-US" b="1" dirty="0">
+                <a:solidFill>
+                  <a:srgbClr val="FFC000"/>
+                </a:solidFill>
+              </a:rPr>
+              <a:t>Tools &amp; Resources</a:t>
             </a:r>
           </a:p>
         </p:txBody>
@@ -15472,7 +15606,7 @@
         </p:spPr>
         <p:txBody>
           <a:bodyPr vert="horz" lIns="91440" tIns="45720" rIns="91440" bIns="45720" rtlCol="0" anchor="ctr">
-            <a:normAutofit fontScale="92500" lnSpcReduction="20000"/>
+            <a:normAutofit lnSpcReduction="10000"/>
           </a:bodyPr>
           <a:lstStyle/>
           <a:p>
@@ -15481,31 +15615,34 @@
               <a:buChar char="•"/>
             </a:pPr>
             <a:r>
-              <a:rPr lang="en-US" sz="2400" b="0" i="0" dirty="0">
+              <a:rPr lang="en-US" sz="2000" b="0" i="0" dirty="0">
                 <a:solidFill>
                   <a:srgbClr val="0070C0"/>
                 </a:solidFill>
                 <a:effectLst/>
-              </a:rPr>
-              <a:t>Convert  csv to </a:t>
-            </a:r>
-            <a:r>
-              <a:rPr lang="en-US" sz="2400" b="0" i="0" dirty="0" err="1">
+                <a:latin typeface="-apple-system"/>
+              </a:rPr>
+              <a:t> Convert CSV to </a:t>
+            </a:r>
+            <a:r>
+              <a:rPr lang="en-US" sz="2000" b="0" i="0" dirty="0" err="1">
                 <a:solidFill>
                   <a:srgbClr val="0070C0"/>
                 </a:solidFill>
                 <a:effectLst/>
+                <a:latin typeface="-apple-system"/>
               </a:rPr>
               <a:t>DataFrame</a:t>
             </a:r>
             <a:r>
-              <a:rPr lang="en-US" sz="2400" b="0" i="0" dirty="0">
+              <a:rPr lang="en-US" sz="2000" b="0" i="0" dirty="0">
                 <a:solidFill>
                   <a:srgbClr val="0070C0"/>
                 </a:solidFill>
                 <a:effectLst/>
-              </a:rPr>
-              <a:t> using glob</a:t>
+                <a:latin typeface="-apple-system"/>
+              </a:rPr>
+              <a:t> using Glob</a:t>
             </a:r>
           </a:p>
           <a:p>
@@ -15514,28 +15651,31 @@
               <a:buChar char="•"/>
             </a:pPr>
             <a:r>
-              <a:rPr lang="en-US" sz="2400" dirty="0">
+              <a:rPr lang="en-US" dirty="0">
                 <a:solidFill>
                   <a:srgbClr val="0070C0"/>
                 </a:solidFill>
                 <a:effectLst/>
-              </a:rPr>
-              <a:t>Combine into single </a:t>
-            </a:r>
-            <a:r>
-              <a:rPr lang="en-US" sz="2400" dirty="0" err="1">
+                <a:latin typeface="-apple-system"/>
+              </a:rPr>
+              <a:t> Merge into single </a:t>
+            </a:r>
+            <a:r>
+              <a:rPr lang="en-US" dirty="0" err="1">
                 <a:solidFill>
                   <a:srgbClr val="0070C0"/>
                 </a:solidFill>
                 <a:effectLst/>
+                <a:latin typeface="-apple-system"/>
               </a:rPr>
               <a:t>DataFrame</a:t>
             </a:r>
-            <a:endParaRPr lang="en-US" sz="2400" dirty="0">
+            <a:endParaRPr lang="en-US" dirty="0">
               <a:solidFill>
                 <a:srgbClr val="0070C0"/>
               </a:solidFill>
               <a:effectLst/>
+              <a:latin typeface="-apple-system"/>
             </a:endParaRPr>
           </a:p>
           <a:p>
@@ -15544,28 +15684,31 @@
               <a:buChar char="•"/>
             </a:pPr>
             <a:r>
-              <a:rPr lang="en-US" sz="2400" dirty="0">
+              <a:rPr lang="en-US" dirty="0">
                 <a:solidFill>
                   <a:srgbClr val="0070C0"/>
                 </a:solidFill>
                 <a:effectLst/>
-              </a:rPr>
-              <a:t>Convert </a:t>
-            </a:r>
-            <a:r>
-              <a:rPr lang="en-US" sz="2400" dirty="0" err="1">
+                <a:latin typeface="-apple-system"/>
+              </a:rPr>
+              <a:t> Convert </a:t>
+            </a:r>
+            <a:r>
+              <a:rPr lang="en-US" dirty="0" err="1">
                 <a:solidFill>
                   <a:srgbClr val="0070C0"/>
                 </a:solidFill>
                 <a:effectLst/>
+                <a:latin typeface="-apple-system"/>
               </a:rPr>
               <a:t>DataTypes</a:t>
             </a:r>
-            <a:endParaRPr lang="en-US" sz="2400" dirty="0">
+            <a:endParaRPr lang="en-US" dirty="0">
               <a:solidFill>
                 <a:srgbClr val="0070C0"/>
               </a:solidFill>
               <a:effectLst/>
+              <a:latin typeface="-apple-system"/>
             </a:endParaRPr>
           </a:p>
           <a:p>
@@ -15574,13 +15717,34 @@
               <a:buChar char="•"/>
             </a:pPr>
             <a:r>
-              <a:rPr lang="en-US" sz="2400" dirty="0">
+              <a:rPr lang="en-US" dirty="0">
                 <a:solidFill>
                   <a:srgbClr val="0070C0"/>
                 </a:solidFill>
                 <a:effectLst/>
-              </a:rPr>
-              <a:t>Drop Nan &amp; Duplicates</a:t>
+                <a:latin typeface="-apple-system"/>
+              </a:rPr>
+              <a:t> Drop </a:t>
+            </a:r>
+            <a:r>
+              <a:rPr lang="en-US" dirty="0" err="1">
+                <a:solidFill>
+                  <a:srgbClr val="0070C0"/>
+                </a:solidFill>
+                <a:effectLst/>
+                <a:latin typeface="-apple-system"/>
+              </a:rPr>
+              <a:t>NaN</a:t>
+            </a:r>
+            <a:r>
+              <a:rPr lang="en-US" dirty="0">
+                <a:solidFill>
+                  <a:srgbClr val="0070C0"/>
+                </a:solidFill>
+                <a:effectLst/>
+                <a:latin typeface="-apple-system"/>
+              </a:rPr>
+              <a:t> &amp; Duplicates</a:t>
             </a:r>
           </a:p>
           <a:p>
@@ -15589,13 +15753,14 @@
               <a:buChar char="•"/>
             </a:pPr>
             <a:r>
-              <a:rPr lang="en-US" sz="2400" dirty="0">
+              <a:rPr lang="en-US" dirty="0">
                 <a:solidFill>
                   <a:srgbClr val="0070C0"/>
                 </a:solidFill>
                 <a:effectLst/>
-              </a:rPr>
-              <a:t>Export to CSV</a:t>
+                <a:latin typeface="-apple-system"/>
+              </a:rPr>
+              <a:t> Export to CSV</a:t>
             </a:r>
           </a:p>
           <a:p>
@@ -15604,31 +15769,34 @@
               <a:buChar char="•"/>
             </a:pPr>
             <a:r>
-              <a:rPr lang="en-US" sz="2400" dirty="0">
+              <a:rPr lang="en-US" dirty="0">
                 <a:solidFill>
                   <a:srgbClr val="0070C0"/>
                 </a:solidFill>
                 <a:effectLst/>
-              </a:rPr>
-              <a:t>Create new </a:t>
-            </a:r>
-            <a:r>
-              <a:rPr lang="en-US" sz="2400" dirty="0" err="1">
+                <a:latin typeface="-apple-system"/>
+              </a:rPr>
+              <a:t> Create new </a:t>
+            </a:r>
+            <a:r>
+              <a:rPr lang="en-US" dirty="0" err="1">
                 <a:solidFill>
                   <a:srgbClr val="0070C0"/>
                 </a:solidFill>
                 <a:effectLst/>
+                <a:latin typeface="-apple-system"/>
               </a:rPr>
               <a:t>DataFrame</a:t>
             </a:r>
             <a:r>
-              <a:rPr lang="en-US" sz="2400" dirty="0">
+              <a:rPr lang="en-US" dirty="0">
                 <a:solidFill>
                   <a:srgbClr val="0070C0"/>
                 </a:solidFill>
                 <a:effectLst/>
-              </a:rPr>
-              <a:t> w/ selected columns</a:t>
+                <a:latin typeface="-apple-system"/>
+              </a:rPr>
+              <a:t> w/ selected features</a:t>
             </a:r>
           </a:p>
           <a:p>
@@ -15637,19 +15805,21 @@
               <a:buChar char="•"/>
             </a:pPr>
             <a:r>
-              <a:rPr lang="en-US" sz="2400" dirty="0">
+              <a:rPr lang="en-US" dirty="0">
                 <a:solidFill>
                   <a:srgbClr val="0070C0"/>
                 </a:solidFill>
                 <a:effectLst/>
-              </a:rPr>
-              <a:t>Calculate % change</a:t>
-            </a:r>
-            <a:endParaRPr lang="en-US" sz="2400" b="0" i="0" dirty="0">
+                <a:latin typeface="-apple-system"/>
+              </a:rPr>
+              <a:t> Calculate % Change</a:t>
+            </a:r>
+            <a:endParaRPr lang="en-US" sz="2000" b="0" i="0" dirty="0">
               <a:solidFill>
                 <a:srgbClr val="0070C0"/>
               </a:solidFill>
               <a:effectLst/>
+              <a:latin typeface="-apple-system"/>
             </a:endParaRPr>
           </a:p>
           <a:p>
@@ -15767,8 +15937,8 @@
         </p:nvSpPr>
         <p:spPr>
           <a:xfrm>
-            <a:off x="539263" y="1097280"/>
-            <a:ext cx="3172903" cy="4626863"/>
+            <a:off x="308511" y="1115568"/>
+            <a:ext cx="3256177" cy="4626863"/>
           </a:xfrm>
         </p:spPr>
         <p:txBody>
@@ -15777,51 +15947,69 @@
           </a:bodyPr>
           <a:lstStyle/>
           <a:p>
-            <a:pPr algn="l"/>
-            <a:r>
-              <a:rPr lang="en-US" sz="3600" dirty="0"/>
+            <a:r>
+              <a:rPr lang="en-US" sz="4000" b="1" dirty="0"/>
               <a:t>Market Type:</a:t>
             </a:r>
           </a:p>
           <a:p>
-            <a:pPr algn="l"/>
-            <a:r>
-              <a:rPr lang="en-US" sz="2800" dirty="0">
-                <a:solidFill>
-                  <a:srgbClr val="0070C0"/>
+            <a:endParaRPr lang="en-US" sz="3200" b="1" dirty="0"/>
+          </a:p>
+          <a:p>
+            <a:pPr marL="342900" indent="-342900">
+              <a:buFont typeface="Arial" panose="020B0604020202020204" pitchFamily="34" charset="0"/>
+              <a:buChar char="•"/>
+            </a:pPr>
+            <a:r>
+              <a:rPr lang="en-US" sz="3200" b="1" dirty="0">
+                <a:solidFill>
+                  <a:srgbClr val="00B050"/>
                 </a:solidFill>
                 <a:effectLst/>
+                <a:latin typeface="Arial" panose="020B0604020202020204" pitchFamily="34" charset="0"/>
                 <a:ea typeface="Calibri" panose="020F0502020204030204" pitchFamily="34" charset="0"/>
               </a:rPr>
               <a:t>Bull</a:t>
             </a:r>
           </a:p>
           <a:p>
-            <a:pPr algn="l"/>
-            <a:r>
-              <a:rPr lang="en-US" sz="2800" dirty="0">
-                <a:solidFill>
-                  <a:srgbClr val="0070C0"/>
+            <a:pPr marL="342900" indent="-342900">
+              <a:buFont typeface="Arial" panose="020B0604020202020204" pitchFamily="34" charset="0"/>
+              <a:buChar char="•"/>
+            </a:pPr>
+            <a:r>
+              <a:rPr lang="en-US" sz="3200" b="1" dirty="0">
+                <a:solidFill>
+                  <a:srgbClr val="FF0000"/>
                 </a:solidFill>
                 <a:effectLst/>
+                <a:latin typeface="Arial" panose="020B0604020202020204" pitchFamily="34" charset="0"/>
                 <a:ea typeface="Calibri" panose="020F0502020204030204" pitchFamily="34" charset="0"/>
               </a:rPr>
               <a:t>Bear</a:t>
             </a:r>
           </a:p>
           <a:p>
-            <a:pPr algn="l"/>
-            <a:r>
-              <a:rPr lang="en-US" sz="2800" dirty="0">
-                <a:solidFill>
-                  <a:srgbClr val="0070C0"/>
+            <a:pPr marL="342900" indent="-342900">
+              <a:buFont typeface="Arial" panose="020B0604020202020204" pitchFamily="34" charset="0"/>
+              <a:buChar char="•"/>
+            </a:pPr>
+            <a:r>
+              <a:rPr lang="en-US" sz="3200" b="1" dirty="0">
+                <a:solidFill>
+                  <a:srgbClr val="FFC000"/>
                 </a:solidFill>
                 <a:effectLst/>
+                <a:latin typeface="Arial" panose="020B0604020202020204" pitchFamily="34" charset="0"/>
                 <a:ea typeface="Calibri" panose="020F0502020204030204" pitchFamily="34" charset="0"/>
               </a:rPr>
               <a:t>Neutral</a:t>
             </a:r>
-            <a:endParaRPr lang="en-US" sz="2800" dirty="0"/>
+            <a:endParaRPr lang="en-US" sz="3200" b="1" dirty="0">
+              <a:solidFill>
+                <a:srgbClr val="FFC000"/>
+              </a:solidFill>
+            </a:endParaRPr>
           </a:p>
         </p:txBody>
       </p:sp>
@@ -15964,7 +16152,7 @@
           <a:lstStyle/>
           <a:p>
             <a:r>
-              <a:rPr lang="en-US" sz="4000" dirty="0">
+              <a:rPr lang="en-US" sz="4000" b="1" dirty="0">
                 <a:solidFill>
                   <a:schemeClr val="bg2">
                     <a:lumMod val="10000"/>
@@ -15972,17 +16160,19 @@
                   </a:schemeClr>
                 </a:solidFill>
                 <a:effectLst/>
+                <a:latin typeface="Calisto MT" panose="02040603050505030304" pitchFamily="18" charset="0"/>
                 <a:ea typeface="Calibri" panose="020F0502020204030204" pitchFamily="34" charset="0"/>
               </a:rPr>
               <a:t>Defining Code for Market Type</a:t>
             </a:r>
-            <a:endParaRPr lang="en-US" dirty="0">
+            <a:endParaRPr lang="en-US" b="1" dirty="0">
               <a:solidFill>
                 <a:schemeClr val="bg2">
                   <a:lumMod val="10000"/>
                   <a:lumOff val="90000"/>
                 </a:schemeClr>
               </a:solidFill>
+              <a:latin typeface="Calisto MT" panose="02040603050505030304" pitchFamily="18" charset="0"/>
             </a:endParaRPr>
           </a:p>
         </p:txBody>
@@ -16009,7 +16199,11 @@
           <a:lstStyle/>
           <a:p>
             <a:r>
-              <a:rPr lang="en-US" sz="3400" dirty="0"/>
+              <a:rPr lang="en-US" b="1" dirty="0">
+                <a:solidFill>
+                  <a:srgbClr val="FF0000"/>
+                </a:solidFill>
+              </a:rPr>
               <a:t>Bear</a:t>
             </a:r>
           </a:p>
@@ -16031,31 +16225,33 @@
             <p:ph type="body" sz="half" idx="15"/>
           </p:nvPr>
         </p:nvSpPr>
-        <p:spPr/>
+        <p:spPr>
+          <a:xfrm>
+            <a:off x="943435" y="2539093"/>
+            <a:ext cx="3300984" cy="3219450"/>
+          </a:xfrm>
+        </p:spPr>
         <p:txBody>
           <a:bodyPr>
             <a:normAutofit/>
           </a:bodyPr>
           <a:lstStyle/>
           <a:p>
-            <a:pPr algn="l"/>
-            <a:r>
-              <a:rPr lang="en-US" sz="2800" dirty="0"/>
-              <a:t>Bitcoin      by over:</a:t>
-            </a:r>
-          </a:p>
-          <a:p>
-            <a:pPr algn="l"/>
-            <a:r>
-              <a:rPr lang="en-US" sz="2800" dirty="0"/>
-              <a:t>	40% - 3 months</a:t>
-            </a:r>
-          </a:p>
-          <a:p>
-            <a:pPr algn="l"/>
-            <a:r>
-              <a:rPr lang="en-US" sz="2800" dirty="0"/>
-              <a:t>	60% - 6 months</a:t>
+            <a:r>
+              <a:rPr lang="en-US" sz="2000" dirty="0"/>
+              <a:t>Bitcoin     by over:</a:t>
+            </a:r>
+          </a:p>
+          <a:p>
+            <a:r>
+              <a:rPr lang="en-US" sz="2000" dirty="0"/>
+              <a:t>40% - 3 months</a:t>
+            </a:r>
+          </a:p>
+          <a:p>
+            <a:r>
+              <a:rPr lang="en-US" sz="2000" dirty="0"/>
+              <a:t>60% - 6 months</a:t>
             </a:r>
           </a:p>
           <a:p>
@@ -16086,7 +16282,11 @@
           <a:lstStyle/>
           <a:p>
             <a:r>
-              <a:rPr lang="en-US" sz="3400" dirty="0"/>
+              <a:rPr lang="en-US" b="1" dirty="0">
+                <a:solidFill>
+                  <a:srgbClr val="00B050"/>
+                </a:solidFill>
+              </a:rPr>
               <a:t>Bull</a:t>
             </a:r>
           </a:p>
@@ -16113,24 +16313,21 @@
           <a:bodyPr/>
           <a:lstStyle/>
           <a:p>
-            <a:pPr algn="l"/>
-            <a:r>
-              <a:rPr lang="en-US" sz="2800" dirty="0"/>
+            <a:r>
+              <a:rPr lang="en-US" sz="2000" dirty="0"/>
               <a:t>Bitcoin     by over:</a:t>
             </a:r>
           </a:p>
           <a:p>
-            <a:pPr algn="l"/>
-            <a:r>
-              <a:rPr lang="en-US" sz="2800" dirty="0"/>
-              <a:t>	70% - 3 months</a:t>
-            </a:r>
-          </a:p>
-          <a:p>
-            <a:pPr algn="l"/>
-            <a:r>
-              <a:rPr lang="en-US" sz="2800" dirty="0"/>
-              <a:t>	150% - 6 months</a:t>
+            <a:r>
+              <a:rPr lang="en-US" sz="2000" dirty="0"/>
+              <a:t>70% - 3 months</a:t>
+            </a:r>
+          </a:p>
+          <a:p>
+            <a:r>
+              <a:rPr lang="en-US" sz="2000" dirty="0"/>
+              <a:t>150% - 6 months</a:t>
             </a:r>
           </a:p>
           <a:p>
@@ -16154,13 +16351,22 @@
             <p:ph type="body" sz="quarter" idx="13"/>
           </p:nvPr>
         </p:nvSpPr>
-        <p:spPr/>
+        <p:spPr>
+          <a:xfrm>
+            <a:off x="8097201" y="1885950"/>
+            <a:ext cx="3300984" cy="576262"/>
+          </a:xfrm>
+        </p:spPr>
         <p:txBody>
           <a:bodyPr/>
           <a:lstStyle/>
           <a:p>
             <a:r>
-              <a:rPr lang="en-US" sz="3400" dirty="0"/>
+              <a:rPr lang="en-US" b="1" dirty="0">
+                <a:solidFill>
+                  <a:srgbClr val="FFC000"/>
+                </a:solidFill>
+              </a:rPr>
               <a:t>Neutral</a:t>
             </a:r>
           </a:p>
@@ -16189,40 +16395,33 @@
           </a:xfrm>
         </p:spPr>
         <p:txBody>
-          <a:bodyPr>
-            <a:normAutofit fontScale="92500" lnSpcReduction="20000"/>
-          </a:bodyPr>
+          <a:bodyPr/>
           <a:lstStyle/>
           <a:p>
-            <a:pPr algn="l"/>
-            <a:r>
-              <a:rPr lang="en-US" sz="2800" dirty="0"/>
+            <a:r>
+              <a:rPr lang="en-US" sz="2000" dirty="0"/>
               <a:t>Bitcoin stayed within</a:t>
             </a:r>
           </a:p>
           <a:p>
-            <a:pPr algn="l"/>
-            <a:r>
-              <a:rPr lang="en-US" sz="2800" dirty="0"/>
-              <a:t>	70% range - 3 months</a:t>
-            </a:r>
-          </a:p>
-          <a:p>
-            <a:pPr algn="l"/>
-            <a:endParaRPr lang="en-US" sz="2800" dirty="0"/>
-          </a:p>
-          <a:p>
-            <a:pPr algn="l"/>
-            <a:r>
-              <a:rPr lang="en-US" sz="2800" dirty="0"/>
+            <a:r>
+              <a:rPr lang="en-US" sz="2000" dirty="0"/>
+              <a:t>70% range - 3 months</a:t>
+            </a:r>
+          </a:p>
+          <a:p>
+            <a:endParaRPr lang="en-US" sz="2000" dirty="0"/>
+          </a:p>
+          <a:p>
+            <a:r>
+              <a:rPr lang="en-US" sz="2000" dirty="0"/>
               <a:t>Bitcoin neither increased/decreased more than:</a:t>
             </a:r>
           </a:p>
           <a:p>
-            <a:pPr algn="l"/>
-            <a:r>
-              <a:rPr lang="en-US" sz="2800" dirty="0"/>
-              <a:t>	150% - 6 months</a:t>
+            <a:r>
+              <a:rPr lang="en-US" sz="2000" dirty="0"/>
+              <a:t>150% - 6 months</a:t>
             </a:r>
           </a:p>
           <a:p>
@@ -16244,8 +16443,8 @@
         </p:nvSpPr>
         <p:spPr>
           <a:xfrm>
-            <a:off x="2131471" y="2733675"/>
-            <a:ext cx="432816" cy="323850"/>
+            <a:off x="2438392" y="2571750"/>
+            <a:ext cx="228600" cy="323850"/>
           </a:xfrm>
           <a:prstGeom prst="downArrow">
             <a:avLst/>
@@ -16290,7 +16489,7 @@
         </p:nvSpPr>
         <p:spPr>
           <a:xfrm>
-            <a:off x="5716172" y="2606187"/>
+            <a:off x="5941422" y="2571750"/>
             <a:ext cx="198120" cy="323850"/>
           </a:xfrm>
           <a:prstGeom prst="upArrow">
@@ -16336,13 +16535,18 @@
         </p:nvSpPr>
         <p:spPr>
           <a:xfrm>
-            <a:off x="792480" y="4937760"/>
-            <a:ext cx="6766560" cy="1200329"/>
+            <a:off x="831499" y="4654731"/>
+            <a:ext cx="6766560" cy="923330"/>
           </a:xfrm>
           <a:prstGeom prst="rect">
             <a:avLst/>
           </a:prstGeom>
           <a:noFill/>
+          <a:ln>
+            <a:solidFill>
+              <a:srgbClr val="7030A0"/>
+            </a:solidFill>
+          </a:ln>
         </p:spPr>
         <p:txBody>
           <a:bodyPr wrap="square" rtlCol="0">
@@ -16351,7 +16555,7 @@
           <a:lstStyle/>
           <a:p>
             <a:r>
-              <a:rPr lang="en-US" sz="2400" b="0" i="0" dirty="0">
+              <a:rPr lang="en-US" b="0" i="0" dirty="0">
                 <a:solidFill>
                   <a:schemeClr val="tx2"/>
                 </a:solidFill>
@@ -16360,7 +16564,7 @@
               </a:rPr>
               <a:t>If selected crypto only shows trend, but Bitcoin does not, then it may indicate project growth or failure but not a true bull market / bear market.</a:t>
             </a:r>
-            <a:endParaRPr lang="en-US" sz="2400" dirty="0">
+            <a:endParaRPr lang="en-US" dirty="0">
               <a:solidFill>
                 <a:schemeClr val="tx2"/>
               </a:solidFill>

</xml_diff>